<commit_message>
Updated the quality assurance report, updated the powerpoint with qa, upload pdf version of pdf
</commit_message>
<xml_diff>
--- a/documents/Milestone_5_-_Presentation.pptx
+++ b/documents/Milestone_5_-_Presentation.pptx
@@ -5,7 +5,7 @@
     <p:sldMasterId id="2147483648" r:id="rId1"/>
   </p:sldMasterIdLst>
   <p:notesMasterIdLst>
-    <p:notesMasterId r:id="rId21"/>
+    <p:notesMasterId r:id="rId23"/>
   </p:notesMasterIdLst>
   <p:sldIdLst>
     <p:sldId id="256" r:id="rId2"/>
@@ -23,10 +23,12 @@
     <p:sldId id="293" r:id="rId14"/>
     <p:sldId id="294" r:id="rId15"/>
     <p:sldId id="268" r:id="rId16"/>
-    <p:sldId id="270" r:id="rId17"/>
-    <p:sldId id="283" r:id="rId18"/>
-    <p:sldId id="282" r:id="rId19"/>
-    <p:sldId id="278" r:id="rId20"/>
+    <p:sldId id="297" r:id="rId17"/>
+    <p:sldId id="296" r:id="rId18"/>
+    <p:sldId id="270" r:id="rId19"/>
+    <p:sldId id="283" r:id="rId20"/>
+    <p:sldId id="282" r:id="rId21"/>
+    <p:sldId id="278" r:id="rId22"/>
   </p:sldIdLst>
   <p:sldSz cx="12192000" cy="6858000"/>
   <p:notesSz cx="6858000" cy="9144000"/>
@@ -133,6 +135,3434 @@
 </p:presentation>
 </file>
 
+<file path=ppt/charts/chart1.xml><?xml version="1.0" encoding="utf-8"?>
+<c:chartSpace xmlns:c="http://schemas.openxmlformats.org/drawingml/2006/chart" xmlns:a="http://schemas.openxmlformats.org/drawingml/2006/main" xmlns:r="http://schemas.openxmlformats.org/officeDocument/2006/relationships" xmlns:c16r2="http://schemas.microsoft.com/office/drawing/2015/06/chart">
+  <c:date1904 val="0"/>
+  <c:lang val="en-US"/>
+  <c:roundedCorners val="0"/>
+  <mc:AlternateContent xmlns:mc="http://schemas.openxmlformats.org/markup-compatibility/2006">
+    <mc:Choice xmlns:c14="http://schemas.microsoft.com/office/drawing/2007/8/2/chart" Requires="c14">
+      <c14:style val="102"/>
+    </mc:Choice>
+    <mc:Fallback>
+      <c:style val="2"/>
+    </mc:Fallback>
+  </mc:AlternateContent>
+  <c:chart>
+    <c:title>
+      <c:tx>
+        <c:rich>
+          <a:bodyPr rot="0" spcFirstLastPara="1" vertOverflow="ellipsis" vert="horz" wrap="square" anchor="ctr" anchorCtr="1"/>
+          <a:lstStyle/>
+          <a:p>
+            <a:pPr>
+              <a:defRPr sz="1400" b="0" i="0" u="none" strike="noStrike" kern="1200" spc="0" baseline="0">
+                <a:solidFill>
+                  <a:schemeClr val="tx1">
+                    <a:lumMod val="65000"/>
+                    <a:lumOff val="35000"/>
+                  </a:schemeClr>
+                </a:solidFill>
+                <a:latin typeface="+mn-lt"/>
+                <a:ea typeface="+mn-ea"/>
+                <a:cs typeface="+mn-cs"/>
+              </a:defRPr>
+            </a:pPr>
+            <a:r>
+              <a:rPr lang="en-GB" sz="1400" b="0" i="0" u="none" strike="noStrike" baseline="0">
+                <a:effectLst/>
+              </a:rPr>
+              <a:t>code coverage</a:t>
+            </a:r>
+            <a:endParaRPr lang="en-GB"/>
+          </a:p>
+        </c:rich>
+      </c:tx>
+      <c:overlay val="0"/>
+      <c:spPr>
+        <a:noFill/>
+        <a:ln>
+          <a:noFill/>
+        </a:ln>
+        <a:effectLst/>
+      </c:spPr>
+      <c:txPr>
+        <a:bodyPr rot="0" spcFirstLastPara="1" vertOverflow="ellipsis" vert="horz" wrap="square" anchor="ctr" anchorCtr="1"/>
+        <a:lstStyle/>
+        <a:p>
+          <a:pPr>
+            <a:defRPr sz="1400" b="0" i="0" u="none" strike="noStrike" kern="1200" spc="0" baseline="0">
+              <a:solidFill>
+                <a:schemeClr val="tx1">
+                  <a:lumMod val="65000"/>
+                  <a:lumOff val="35000"/>
+                </a:schemeClr>
+              </a:solidFill>
+              <a:latin typeface="+mn-lt"/>
+              <a:ea typeface="+mn-ea"/>
+              <a:cs typeface="+mn-cs"/>
+            </a:defRPr>
+          </a:pPr>
+          <a:endParaRPr lang="en-US"/>
+        </a:p>
+      </c:txPr>
+    </c:title>
+    <c:autoTitleDeleted val="0"/>
+    <c:plotArea>
+      <c:layout/>
+      <c:barChart>
+        <c:barDir val="col"/>
+        <c:grouping val="clustered"/>
+        <c:varyColors val="0"/>
+        <c:ser>
+          <c:idx val="0"/>
+          <c:order val="0"/>
+          <c:tx>
+            <c:strRef>
+              <c:f>Sheet1!$C$4</c:f>
+              <c:strCache>
+                <c:ptCount val="1"/>
+                <c:pt idx="0">
+                  <c:v>M3</c:v>
+                </c:pt>
+              </c:strCache>
+            </c:strRef>
+          </c:tx>
+          <c:spPr>
+            <a:solidFill>
+              <a:schemeClr val="accent1"/>
+            </a:solidFill>
+            <a:ln>
+              <a:noFill/>
+            </a:ln>
+            <a:effectLst/>
+          </c:spPr>
+          <c:invertIfNegative val="0"/>
+          <c:cat>
+            <c:strRef>
+              <c:f>Sheet1!$B$7</c:f>
+              <c:strCache>
+                <c:ptCount val="1"/>
+                <c:pt idx="0">
+                  <c:v>logging statements normalized</c:v>
+                </c:pt>
+              </c:strCache>
+            </c:strRef>
+          </c:cat>
+          <c:val>
+            <c:numRef>
+              <c:f>Sheet1!$C$9</c:f>
+              <c:numCache>
+                <c:formatCode>General</c:formatCode>
+                <c:ptCount val="1"/>
+                <c:pt idx="0">
+                  <c:v>0</c:v>
+                </c:pt>
+              </c:numCache>
+            </c:numRef>
+          </c:val>
+          <c:extLst>
+            <c:ext xmlns:c16="http://schemas.microsoft.com/office/drawing/2014/chart" uri="{C3380CC4-5D6E-409C-BE32-E72D297353CC}">
+              <c16:uniqueId val="{00000000-744E-4C70-A0D8-750CFF0344A5}"/>
+            </c:ext>
+          </c:extLst>
+        </c:ser>
+        <c:ser>
+          <c:idx val="1"/>
+          <c:order val="1"/>
+          <c:tx>
+            <c:strRef>
+              <c:f>Sheet1!$D$4</c:f>
+              <c:strCache>
+                <c:ptCount val="1"/>
+                <c:pt idx="0">
+                  <c:v>M4</c:v>
+                </c:pt>
+              </c:strCache>
+            </c:strRef>
+          </c:tx>
+          <c:spPr>
+            <a:solidFill>
+              <a:schemeClr val="accent2"/>
+            </a:solidFill>
+            <a:ln>
+              <a:noFill/>
+            </a:ln>
+            <a:effectLst/>
+          </c:spPr>
+          <c:invertIfNegative val="0"/>
+          <c:cat>
+            <c:strRef>
+              <c:f>Sheet1!$B$7</c:f>
+              <c:strCache>
+                <c:ptCount val="1"/>
+                <c:pt idx="0">
+                  <c:v>logging statements normalized</c:v>
+                </c:pt>
+              </c:strCache>
+            </c:strRef>
+          </c:cat>
+          <c:val>
+            <c:numRef>
+              <c:f>Sheet1!$D$9</c:f>
+              <c:numCache>
+                <c:formatCode>General</c:formatCode>
+                <c:ptCount val="1"/>
+                <c:pt idx="0">
+                  <c:v>34</c:v>
+                </c:pt>
+              </c:numCache>
+            </c:numRef>
+          </c:val>
+          <c:extLst>
+            <c:ext xmlns:c16="http://schemas.microsoft.com/office/drawing/2014/chart" uri="{C3380CC4-5D6E-409C-BE32-E72D297353CC}">
+              <c16:uniqueId val="{00000001-744E-4C70-A0D8-750CFF0344A5}"/>
+            </c:ext>
+          </c:extLst>
+        </c:ser>
+        <c:ser>
+          <c:idx val="2"/>
+          <c:order val="2"/>
+          <c:tx>
+            <c:strRef>
+              <c:f>Sheet1!$E$4</c:f>
+              <c:strCache>
+                <c:ptCount val="1"/>
+                <c:pt idx="0">
+                  <c:v>M5</c:v>
+                </c:pt>
+              </c:strCache>
+            </c:strRef>
+          </c:tx>
+          <c:spPr>
+            <a:solidFill>
+              <a:schemeClr val="accent3"/>
+            </a:solidFill>
+            <a:ln>
+              <a:noFill/>
+            </a:ln>
+            <a:effectLst/>
+          </c:spPr>
+          <c:invertIfNegative val="0"/>
+          <c:cat>
+            <c:strRef>
+              <c:f>Sheet1!$B$7</c:f>
+              <c:strCache>
+                <c:ptCount val="1"/>
+                <c:pt idx="0">
+                  <c:v>logging statements normalized</c:v>
+                </c:pt>
+              </c:strCache>
+            </c:strRef>
+          </c:cat>
+          <c:val>
+            <c:numRef>
+              <c:f>Sheet1!$E$9</c:f>
+              <c:numCache>
+                <c:formatCode>General</c:formatCode>
+                <c:ptCount val="1"/>
+                <c:pt idx="0">
+                  <c:v>26</c:v>
+                </c:pt>
+              </c:numCache>
+            </c:numRef>
+          </c:val>
+          <c:extLst>
+            <c:ext xmlns:c16="http://schemas.microsoft.com/office/drawing/2014/chart" uri="{C3380CC4-5D6E-409C-BE32-E72D297353CC}">
+              <c16:uniqueId val="{00000002-744E-4C70-A0D8-750CFF0344A5}"/>
+            </c:ext>
+          </c:extLst>
+        </c:ser>
+        <c:dLbls>
+          <c:showLegendKey val="0"/>
+          <c:showVal val="0"/>
+          <c:showCatName val="0"/>
+          <c:showSerName val="0"/>
+          <c:showPercent val="0"/>
+          <c:showBubbleSize val="0"/>
+        </c:dLbls>
+        <c:gapWidth val="150"/>
+        <c:axId val="1117434688"/>
+        <c:axId val="1117421376"/>
+      </c:barChart>
+      <c:catAx>
+        <c:axId val="1117434688"/>
+        <c:scaling>
+          <c:orientation val="minMax"/>
+        </c:scaling>
+        <c:delete val="1"/>
+        <c:axPos val="b"/>
+        <c:majorGridlines>
+          <c:spPr>
+            <a:ln w="9525" cap="flat" cmpd="sng" algn="ctr">
+              <a:solidFill>
+                <a:schemeClr val="tx1">
+                  <a:lumMod val="15000"/>
+                  <a:lumOff val="85000"/>
+                </a:schemeClr>
+              </a:solidFill>
+              <a:round/>
+            </a:ln>
+            <a:effectLst/>
+          </c:spPr>
+        </c:majorGridlines>
+        <c:numFmt formatCode="General" sourceLinked="1"/>
+        <c:majorTickMark val="out"/>
+        <c:minorTickMark val="none"/>
+        <c:tickLblPos val="nextTo"/>
+        <c:crossAx val="1117421376"/>
+        <c:crosses val="autoZero"/>
+        <c:auto val="1"/>
+        <c:lblAlgn val="ctr"/>
+        <c:lblOffset val="100"/>
+        <c:tickMarkSkip val="1"/>
+        <c:noMultiLvlLbl val="0"/>
+      </c:catAx>
+      <c:valAx>
+        <c:axId val="1117421376"/>
+        <c:scaling>
+          <c:orientation val="minMax"/>
+        </c:scaling>
+        <c:delete val="0"/>
+        <c:axPos val="l"/>
+        <c:majorGridlines>
+          <c:spPr>
+            <a:ln w="9525" cap="flat" cmpd="sng" algn="ctr">
+              <a:solidFill>
+                <a:schemeClr val="tx1">
+                  <a:lumMod val="15000"/>
+                  <a:lumOff val="85000"/>
+                </a:schemeClr>
+              </a:solidFill>
+              <a:round/>
+            </a:ln>
+            <a:effectLst/>
+          </c:spPr>
+        </c:majorGridlines>
+        <c:title>
+          <c:tx>
+            <c:rich>
+              <a:bodyPr rot="-5400000" spcFirstLastPara="1" vertOverflow="ellipsis" vert="horz" wrap="square" anchor="ctr" anchorCtr="1"/>
+              <a:lstStyle/>
+              <a:p>
+                <a:pPr>
+                  <a:defRPr sz="1000" b="0" i="0" u="none" strike="noStrike" kern="1200" baseline="0">
+                    <a:solidFill>
+                      <a:schemeClr val="tx1">
+                        <a:lumMod val="65000"/>
+                        <a:lumOff val="35000"/>
+                      </a:schemeClr>
+                    </a:solidFill>
+                    <a:latin typeface="+mn-lt"/>
+                    <a:ea typeface="+mn-ea"/>
+                    <a:cs typeface="+mn-cs"/>
+                  </a:defRPr>
+                </a:pPr>
+                <a:r>
+                  <a:rPr lang="en-GB"/>
+                  <a:t>%</a:t>
+                </a:r>
+                <a:r>
+                  <a:rPr lang="en-GB" baseline="0"/>
+                  <a:t> tested </a:t>
+                </a:r>
+                <a:endParaRPr lang="en-GB"/>
+              </a:p>
+            </c:rich>
+          </c:tx>
+          <c:overlay val="0"/>
+          <c:spPr>
+            <a:noFill/>
+            <a:ln>
+              <a:noFill/>
+            </a:ln>
+            <a:effectLst/>
+          </c:spPr>
+          <c:txPr>
+            <a:bodyPr rot="-5400000" spcFirstLastPara="1" vertOverflow="ellipsis" vert="horz" wrap="square" anchor="ctr" anchorCtr="1"/>
+            <a:lstStyle/>
+            <a:p>
+              <a:pPr>
+                <a:defRPr sz="1000" b="0" i="0" u="none" strike="noStrike" kern="1200" baseline="0">
+                  <a:solidFill>
+                    <a:schemeClr val="tx1">
+                      <a:lumMod val="65000"/>
+                      <a:lumOff val="35000"/>
+                    </a:schemeClr>
+                  </a:solidFill>
+                  <a:latin typeface="+mn-lt"/>
+                  <a:ea typeface="+mn-ea"/>
+                  <a:cs typeface="+mn-cs"/>
+                </a:defRPr>
+              </a:pPr>
+              <a:endParaRPr lang="en-US"/>
+            </a:p>
+          </c:txPr>
+        </c:title>
+        <c:numFmt formatCode="General" sourceLinked="1"/>
+        <c:majorTickMark val="out"/>
+        <c:minorTickMark val="none"/>
+        <c:tickLblPos val="nextTo"/>
+        <c:spPr>
+          <a:noFill/>
+          <a:ln w="9525" cap="flat" cmpd="sng" algn="ctr">
+            <a:solidFill>
+              <a:schemeClr val="tx1">
+                <a:lumMod val="25000"/>
+                <a:lumOff val="75000"/>
+              </a:schemeClr>
+            </a:solidFill>
+            <a:round/>
+          </a:ln>
+          <a:effectLst/>
+        </c:spPr>
+        <c:txPr>
+          <a:bodyPr rot="-60000000" spcFirstLastPara="1" vertOverflow="ellipsis" vert="horz" wrap="square" anchor="ctr" anchorCtr="1"/>
+          <a:lstStyle/>
+          <a:p>
+            <a:pPr>
+              <a:defRPr sz="900" b="0" i="0" u="none" strike="noStrike" kern="1200" baseline="0">
+                <a:solidFill>
+                  <a:schemeClr val="tx1">
+                    <a:lumMod val="65000"/>
+                    <a:lumOff val="35000"/>
+                  </a:schemeClr>
+                </a:solidFill>
+                <a:latin typeface="+mn-lt"/>
+                <a:ea typeface="+mn-ea"/>
+                <a:cs typeface="+mn-cs"/>
+              </a:defRPr>
+            </a:pPr>
+            <a:endParaRPr lang="en-US"/>
+          </a:p>
+        </c:txPr>
+        <c:crossAx val="1117434688"/>
+        <c:crossesAt val="0"/>
+        <c:crossBetween val="between"/>
+      </c:valAx>
+      <c:spPr>
+        <a:noFill/>
+        <a:ln>
+          <a:noFill/>
+        </a:ln>
+        <a:effectLst/>
+      </c:spPr>
+    </c:plotArea>
+    <c:legend>
+      <c:legendPos val="b"/>
+      <c:overlay val="0"/>
+      <c:spPr>
+        <a:noFill/>
+        <a:ln>
+          <a:noFill/>
+        </a:ln>
+        <a:effectLst/>
+      </c:spPr>
+      <c:txPr>
+        <a:bodyPr rot="0" spcFirstLastPara="1" vertOverflow="ellipsis" vert="horz" wrap="square" anchor="ctr" anchorCtr="1"/>
+        <a:lstStyle/>
+        <a:p>
+          <a:pPr>
+            <a:defRPr sz="900" b="0" i="0" u="none" strike="noStrike" kern="1200" baseline="0">
+              <a:solidFill>
+                <a:schemeClr val="tx1">
+                  <a:lumMod val="65000"/>
+                  <a:lumOff val="35000"/>
+                </a:schemeClr>
+              </a:solidFill>
+              <a:latin typeface="+mn-lt"/>
+              <a:ea typeface="+mn-ea"/>
+              <a:cs typeface="+mn-cs"/>
+            </a:defRPr>
+          </a:pPr>
+          <a:endParaRPr lang="en-US"/>
+        </a:p>
+      </c:txPr>
+    </c:legend>
+    <c:plotVisOnly val="1"/>
+    <c:dispBlanksAs val="gap"/>
+    <c:extLst>
+      <c:ext xmlns:c16r3="http://schemas.microsoft.com/office/drawing/2017/03/chart" uri="{56B9EC1D-385E-4148-901F-78D8002777C0}">
+        <c16r3:dataDisplayOptions16>
+          <c16r3:dispNaAsBlank val="1"/>
+        </c16r3:dataDisplayOptions16>
+      </c:ext>
+    </c:extLst>
+    <c:showDLblsOverMax val="0"/>
+  </c:chart>
+  <c:spPr>
+    <a:noFill/>
+    <a:ln>
+      <a:noFill/>
+    </a:ln>
+    <a:effectLst/>
+  </c:spPr>
+  <c:txPr>
+    <a:bodyPr/>
+    <a:lstStyle/>
+    <a:p>
+      <a:pPr>
+        <a:defRPr/>
+      </a:pPr>
+      <a:endParaRPr lang="en-US"/>
+    </a:p>
+  </c:txPr>
+  <c:externalData r:id="rId3">
+    <c:autoUpdate val="0"/>
+  </c:externalData>
+</c:chartSpace>
+</file>
+
+<file path=ppt/charts/chart2.xml><?xml version="1.0" encoding="utf-8"?>
+<c:chartSpace xmlns:c="http://schemas.openxmlformats.org/drawingml/2006/chart" xmlns:a="http://schemas.openxmlformats.org/drawingml/2006/main" xmlns:r="http://schemas.openxmlformats.org/officeDocument/2006/relationships" xmlns:c16r2="http://schemas.microsoft.com/office/drawing/2015/06/chart">
+  <c:date1904 val="0"/>
+  <c:lang val="en-US"/>
+  <c:roundedCorners val="0"/>
+  <mc:AlternateContent xmlns:mc="http://schemas.openxmlformats.org/markup-compatibility/2006">
+    <mc:Choice xmlns:c14="http://schemas.microsoft.com/office/drawing/2007/8/2/chart" Requires="c14">
+      <c14:style val="102"/>
+    </mc:Choice>
+    <mc:Fallback>
+      <c:style val="2"/>
+    </mc:Fallback>
+  </mc:AlternateContent>
+  <c:chart>
+    <c:title>
+      <c:tx>
+        <c:rich>
+          <a:bodyPr rot="0" spcFirstLastPara="1" vertOverflow="ellipsis" vert="horz" wrap="square" anchor="ctr" anchorCtr="1"/>
+          <a:lstStyle/>
+          <a:p>
+            <a:pPr>
+              <a:defRPr sz="1400" b="0" i="0" u="none" strike="noStrike" kern="1200" spc="0" baseline="0">
+                <a:solidFill>
+                  <a:schemeClr val="tx1">
+                    <a:lumMod val="65000"/>
+                    <a:lumOff val="35000"/>
+                  </a:schemeClr>
+                </a:solidFill>
+                <a:latin typeface="+mn-lt"/>
+                <a:ea typeface="+mn-ea"/>
+                <a:cs typeface="+mn-cs"/>
+              </a:defRPr>
+            </a:pPr>
+            <a:r>
+              <a:rPr lang="en-GB" sz="1400" b="0" i="0" u="none" strike="noStrike" baseline="0">
+                <a:effectLst/>
+              </a:rPr>
+              <a:t>lines of code (LOC) per class</a:t>
+            </a:r>
+            <a:r>
+              <a:rPr lang="en-GB" sz="1400" b="0" i="0" u="none" strike="noStrike" baseline="0"/>
+              <a:t> </a:t>
+            </a:r>
+            <a:endParaRPr lang="en-GB"/>
+          </a:p>
+        </c:rich>
+      </c:tx>
+      <c:overlay val="0"/>
+      <c:spPr>
+        <a:noFill/>
+        <a:ln>
+          <a:noFill/>
+        </a:ln>
+        <a:effectLst/>
+      </c:spPr>
+      <c:txPr>
+        <a:bodyPr rot="0" spcFirstLastPara="1" vertOverflow="ellipsis" vert="horz" wrap="square" anchor="ctr" anchorCtr="1"/>
+        <a:lstStyle/>
+        <a:p>
+          <a:pPr>
+            <a:defRPr sz="1400" b="0" i="0" u="none" strike="noStrike" kern="1200" spc="0" baseline="0">
+              <a:solidFill>
+                <a:schemeClr val="tx1">
+                  <a:lumMod val="65000"/>
+                  <a:lumOff val="35000"/>
+                </a:schemeClr>
+              </a:solidFill>
+              <a:latin typeface="+mn-lt"/>
+              <a:ea typeface="+mn-ea"/>
+              <a:cs typeface="+mn-cs"/>
+            </a:defRPr>
+          </a:pPr>
+          <a:endParaRPr lang="en-US"/>
+        </a:p>
+      </c:txPr>
+    </c:title>
+    <c:autoTitleDeleted val="0"/>
+    <c:plotArea>
+      <c:layout/>
+      <c:lineChart>
+        <c:grouping val="standard"/>
+        <c:varyColors val="0"/>
+        <c:ser>
+          <c:idx val="0"/>
+          <c:order val="0"/>
+          <c:tx>
+            <c:strRef>
+              <c:f>Sheet1!$B$17</c:f>
+              <c:strCache>
+                <c:ptCount val="1"/>
+                <c:pt idx="0">
+                  <c:v>min</c:v>
+                </c:pt>
+              </c:strCache>
+            </c:strRef>
+          </c:tx>
+          <c:spPr>
+            <a:ln w="25400" cap="rnd">
+              <a:noFill/>
+              <a:round/>
+            </a:ln>
+            <a:effectLst/>
+          </c:spPr>
+          <c:marker>
+            <c:symbol val="dash"/>
+            <c:size val="10"/>
+            <c:spPr>
+              <a:solidFill>
+                <a:schemeClr val="accent1"/>
+              </a:solidFill>
+              <a:ln w="9525">
+                <a:solidFill>
+                  <a:schemeClr val="accent1"/>
+                </a:solidFill>
+              </a:ln>
+              <a:effectLst/>
+            </c:spPr>
+          </c:marker>
+          <c:cat>
+            <c:numRef>
+              <c:f>Sheet1!$C$10:$E$10</c:f>
+              <c:numCache>
+                <c:formatCode>General</c:formatCode>
+                <c:ptCount val="3"/>
+              </c:numCache>
+            </c:numRef>
+          </c:cat>
+          <c:val>
+            <c:numRef>
+              <c:f>Sheet1!$C$17:$E$17</c:f>
+              <c:numCache>
+                <c:formatCode>General</c:formatCode>
+                <c:ptCount val="3"/>
+                <c:pt idx="0">
+                  <c:v>5</c:v>
+                </c:pt>
+                <c:pt idx="1">
+                  <c:v>10</c:v>
+                </c:pt>
+                <c:pt idx="2">
+                  <c:v>18</c:v>
+                </c:pt>
+              </c:numCache>
+            </c:numRef>
+          </c:val>
+          <c:smooth val="0"/>
+          <c:extLst>
+            <c:ext xmlns:c16="http://schemas.microsoft.com/office/drawing/2014/chart" uri="{C3380CC4-5D6E-409C-BE32-E72D297353CC}">
+              <c16:uniqueId val="{00000000-F659-4F0B-8431-2C261100D881}"/>
+            </c:ext>
+          </c:extLst>
+        </c:ser>
+        <c:ser>
+          <c:idx val="1"/>
+          <c:order val="1"/>
+          <c:tx>
+            <c:strRef>
+              <c:f>Sheet1!$B$18</c:f>
+              <c:strCache>
+                <c:ptCount val="1"/>
+                <c:pt idx="0">
+                  <c:v>max</c:v>
+                </c:pt>
+              </c:strCache>
+            </c:strRef>
+          </c:tx>
+          <c:spPr>
+            <a:ln w="25400" cap="rnd">
+              <a:noFill/>
+              <a:round/>
+            </a:ln>
+            <a:effectLst/>
+          </c:spPr>
+          <c:marker>
+            <c:symbol val="dash"/>
+            <c:size val="10"/>
+            <c:spPr>
+              <a:solidFill>
+                <a:srgbClr val="FF0000"/>
+              </a:solidFill>
+              <a:ln w="9525">
+                <a:solidFill>
+                  <a:srgbClr val="FF0000"/>
+                </a:solidFill>
+              </a:ln>
+              <a:effectLst/>
+            </c:spPr>
+          </c:marker>
+          <c:cat>
+            <c:numRef>
+              <c:f>Sheet1!$C$10:$E$10</c:f>
+              <c:numCache>
+                <c:formatCode>General</c:formatCode>
+                <c:ptCount val="3"/>
+              </c:numCache>
+            </c:numRef>
+          </c:cat>
+          <c:val>
+            <c:numRef>
+              <c:f>Sheet1!$C$18:$E$18</c:f>
+              <c:numCache>
+                <c:formatCode>General</c:formatCode>
+                <c:ptCount val="3"/>
+                <c:pt idx="0">
+                  <c:v>391</c:v>
+                </c:pt>
+                <c:pt idx="1">
+                  <c:v>488</c:v>
+                </c:pt>
+                <c:pt idx="2">
+                  <c:v>919</c:v>
+                </c:pt>
+              </c:numCache>
+            </c:numRef>
+          </c:val>
+          <c:smooth val="0"/>
+          <c:extLst>
+            <c:ext xmlns:c16="http://schemas.microsoft.com/office/drawing/2014/chart" uri="{C3380CC4-5D6E-409C-BE32-E72D297353CC}">
+              <c16:uniqueId val="{00000001-F659-4F0B-8431-2C261100D881}"/>
+            </c:ext>
+          </c:extLst>
+        </c:ser>
+        <c:ser>
+          <c:idx val="2"/>
+          <c:order val="2"/>
+          <c:tx>
+            <c:strRef>
+              <c:f>Sheet1!$B$19</c:f>
+              <c:strCache>
+                <c:ptCount val="1"/>
+                <c:pt idx="0">
+                  <c:v>avg</c:v>
+                </c:pt>
+              </c:strCache>
+            </c:strRef>
+          </c:tx>
+          <c:spPr>
+            <a:ln w="25400" cap="rnd">
+              <a:noFill/>
+              <a:round/>
+            </a:ln>
+            <a:effectLst/>
+          </c:spPr>
+          <c:marker>
+            <c:symbol val="diamond"/>
+            <c:size val="10"/>
+            <c:spPr>
+              <a:solidFill>
+                <a:srgbClr val="00B050"/>
+              </a:solidFill>
+              <a:ln w="9525">
+                <a:solidFill>
+                  <a:srgbClr val="00B050"/>
+                </a:solidFill>
+              </a:ln>
+              <a:effectLst/>
+            </c:spPr>
+          </c:marker>
+          <c:cat>
+            <c:numRef>
+              <c:f>Sheet1!$C$10:$E$10</c:f>
+              <c:numCache>
+                <c:formatCode>General</c:formatCode>
+                <c:ptCount val="3"/>
+              </c:numCache>
+            </c:numRef>
+          </c:cat>
+          <c:val>
+            <c:numRef>
+              <c:f>Sheet1!$C$19:$E$19</c:f>
+              <c:numCache>
+                <c:formatCode>0.0</c:formatCode>
+                <c:ptCount val="3"/>
+                <c:pt idx="0">
+                  <c:v>74.24444444444444</c:v>
+                </c:pt>
+                <c:pt idx="1">
+                  <c:v>87.692307692307693</c:v>
+                </c:pt>
+                <c:pt idx="2">
+                  <c:v>111.76470588235294</c:v>
+                </c:pt>
+              </c:numCache>
+            </c:numRef>
+          </c:val>
+          <c:smooth val="0"/>
+          <c:extLst>
+            <c:ext xmlns:c16="http://schemas.microsoft.com/office/drawing/2014/chart" uri="{C3380CC4-5D6E-409C-BE32-E72D297353CC}">
+              <c16:uniqueId val="{00000002-F659-4F0B-8431-2C261100D881}"/>
+            </c:ext>
+          </c:extLst>
+        </c:ser>
+        <c:dLbls>
+          <c:showLegendKey val="0"/>
+          <c:showVal val="0"/>
+          <c:showCatName val="0"/>
+          <c:showSerName val="0"/>
+          <c:showPercent val="0"/>
+          <c:showBubbleSize val="0"/>
+        </c:dLbls>
+        <c:hiLowLines>
+          <c:spPr>
+            <a:ln w="9525" cap="flat" cmpd="sng" algn="ctr">
+              <a:solidFill>
+                <a:schemeClr val="tx1">
+                  <a:lumMod val="75000"/>
+                  <a:lumOff val="25000"/>
+                </a:schemeClr>
+              </a:solidFill>
+              <a:round/>
+            </a:ln>
+            <a:effectLst/>
+          </c:spPr>
+        </c:hiLowLines>
+        <c:marker val="1"/>
+        <c:smooth val="0"/>
+        <c:axId val="1019361072"/>
+        <c:axId val="1113314224"/>
+      </c:lineChart>
+      <c:catAx>
+        <c:axId val="1019361072"/>
+        <c:scaling>
+          <c:orientation val="minMax"/>
+        </c:scaling>
+        <c:delete val="0"/>
+        <c:axPos val="b"/>
+        <c:title>
+          <c:tx>
+            <c:rich>
+              <a:bodyPr rot="0" spcFirstLastPara="1" vertOverflow="ellipsis" vert="horz" wrap="square" anchor="ctr" anchorCtr="1"/>
+              <a:lstStyle/>
+              <a:p>
+                <a:pPr>
+                  <a:defRPr sz="1000" b="0" i="0" u="none" strike="noStrike" kern="1200" baseline="0">
+                    <a:solidFill>
+                      <a:schemeClr val="tx1">
+                        <a:lumMod val="65000"/>
+                        <a:lumOff val="35000"/>
+                      </a:schemeClr>
+                    </a:solidFill>
+                    <a:latin typeface="+mn-lt"/>
+                    <a:ea typeface="+mn-ea"/>
+                    <a:cs typeface="+mn-cs"/>
+                  </a:defRPr>
+                </a:pPr>
+                <a:r>
+                  <a:rPr lang="en-GB" dirty="0"/>
+                  <a:t>M3                            M4</a:t>
+                </a:r>
+                <a:r>
+                  <a:rPr lang="en-GB" baseline="0" dirty="0"/>
+                  <a:t>                             </a:t>
+                </a:r>
+                <a:r>
+                  <a:rPr lang="en-GB" dirty="0"/>
+                  <a:t>M5</a:t>
+                </a:r>
+              </a:p>
+            </c:rich>
+          </c:tx>
+          <c:layout>
+            <c:manualLayout>
+              <c:xMode val="edge"/>
+              <c:yMode val="edge"/>
+              <c:x val="0.28598321249447783"/>
+              <c:y val="0.77145343409255052"/>
+            </c:manualLayout>
+          </c:layout>
+          <c:overlay val="0"/>
+          <c:spPr>
+            <a:noFill/>
+            <a:ln>
+              <a:noFill/>
+            </a:ln>
+            <a:effectLst/>
+          </c:spPr>
+          <c:txPr>
+            <a:bodyPr rot="0" spcFirstLastPara="1" vertOverflow="ellipsis" vert="horz" wrap="square" anchor="ctr" anchorCtr="1"/>
+            <a:lstStyle/>
+            <a:p>
+              <a:pPr>
+                <a:defRPr sz="1000" b="0" i="0" u="none" strike="noStrike" kern="1200" baseline="0">
+                  <a:solidFill>
+                    <a:schemeClr val="tx1">
+                      <a:lumMod val="65000"/>
+                      <a:lumOff val="35000"/>
+                    </a:schemeClr>
+                  </a:solidFill>
+                  <a:latin typeface="+mn-lt"/>
+                  <a:ea typeface="+mn-ea"/>
+                  <a:cs typeface="+mn-cs"/>
+                </a:defRPr>
+              </a:pPr>
+              <a:endParaRPr lang="en-US"/>
+            </a:p>
+          </c:txPr>
+        </c:title>
+        <c:numFmt formatCode="General" sourceLinked="1"/>
+        <c:majorTickMark val="none"/>
+        <c:minorTickMark val="none"/>
+        <c:tickLblPos val="nextTo"/>
+        <c:spPr>
+          <a:noFill/>
+          <a:ln w="9525" cap="flat" cmpd="sng" algn="ctr">
+            <a:solidFill>
+              <a:schemeClr val="tx1">
+                <a:lumMod val="15000"/>
+                <a:lumOff val="85000"/>
+              </a:schemeClr>
+            </a:solidFill>
+            <a:round/>
+          </a:ln>
+          <a:effectLst/>
+        </c:spPr>
+        <c:txPr>
+          <a:bodyPr rot="-60000000" spcFirstLastPara="1" vertOverflow="ellipsis" vert="horz" wrap="square" anchor="ctr" anchorCtr="1"/>
+          <a:lstStyle/>
+          <a:p>
+            <a:pPr>
+              <a:defRPr sz="900" b="0" i="0" u="none" strike="noStrike" kern="1200" baseline="0">
+                <a:solidFill>
+                  <a:schemeClr val="tx1">
+                    <a:lumMod val="65000"/>
+                    <a:lumOff val="35000"/>
+                  </a:schemeClr>
+                </a:solidFill>
+                <a:latin typeface="+mn-lt"/>
+                <a:ea typeface="+mn-ea"/>
+                <a:cs typeface="+mn-cs"/>
+              </a:defRPr>
+            </a:pPr>
+            <a:endParaRPr lang="en-US"/>
+          </a:p>
+        </c:txPr>
+        <c:crossAx val="1113314224"/>
+        <c:crosses val="autoZero"/>
+        <c:auto val="1"/>
+        <c:lblAlgn val="ctr"/>
+        <c:lblOffset val="100"/>
+        <c:noMultiLvlLbl val="0"/>
+      </c:catAx>
+      <c:valAx>
+        <c:axId val="1113314224"/>
+        <c:scaling>
+          <c:orientation val="minMax"/>
+        </c:scaling>
+        <c:delete val="0"/>
+        <c:axPos val="l"/>
+        <c:majorGridlines>
+          <c:spPr>
+            <a:ln w="9525" cap="flat" cmpd="sng" algn="ctr">
+              <a:solidFill>
+                <a:schemeClr val="tx1">
+                  <a:lumMod val="15000"/>
+                  <a:lumOff val="85000"/>
+                </a:schemeClr>
+              </a:solidFill>
+              <a:round/>
+            </a:ln>
+            <a:effectLst/>
+          </c:spPr>
+        </c:majorGridlines>
+        <c:title>
+          <c:tx>
+            <c:rich>
+              <a:bodyPr rot="-5400000" spcFirstLastPara="1" vertOverflow="ellipsis" vert="horz" wrap="square" anchor="ctr" anchorCtr="1"/>
+              <a:lstStyle/>
+              <a:p>
+                <a:pPr>
+                  <a:defRPr sz="1000" b="0" i="0" u="none" strike="noStrike" kern="1200" baseline="0">
+                    <a:solidFill>
+                      <a:schemeClr val="tx1">
+                        <a:lumMod val="65000"/>
+                        <a:lumOff val="35000"/>
+                      </a:schemeClr>
+                    </a:solidFill>
+                    <a:latin typeface="+mn-lt"/>
+                    <a:ea typeface="+mn-ea"/>
+                    <a:cs typeface="+mn-cs"/>
+                  </a:defRPr>
+                </a:pPr>
+                <a:r>
+                  <a:rPr lang="en-GB" sz="1000" b="0" i="0" u="none" strike="noStrike" baseline="0">
+                    <a:effectLst/>
+                  </a:rPr>
+                  <a:t>LOC per class</a:t>
+                </a:r>
+                <a:r>
+                  <a:rPr lang="en-GB" sz="1000" b="0" i="0" u="none" strike="noStrike" baseline="0"/>
+                  <a:t> </a:t>
+                </a:r>
+                <a:endParaRPr lang="en-GB"/>
+              </a:p>
+            </c:rich>
+          </c:tx>
+          <c:overlay val="0"/>
+          <c:spPr>
+            <a:noFill/>
+            <a:ln>
+              <a:noFill/>
+            </a:ln>
+            <a:effectLst/>
+          </c:spPr>
+          <c:txPr>
+            <a:bodyPr rot="-5400000" spcFirstLastPara="1" vertOverflow="ellipsis" vert="horz" wrap="square" anchor="ctr" anchorCtr="1"/>
+            <a:lstStyle/>
+            <a:p>
+              <a:pPr>
+                <a:defRPr sz="1000" b="0" i="0" u="none" strike="noStrike" kern="1200" baseline="0">
+                  <a:solidFill>
+                    <a:schemeClr val="tx1">
+                      <a:lumMod val="65000"/>
+                      <a:lumOff val="35000"/>
+                    </a:schemeClr>
+                  </a:solidFill>
+                  <a:latin typeface="+mn-lt"/>
+                  <a:ea typeface="+mn-ea"/>
+                  <a:cs typeface="+mn-cs"/>
+                </a:defRPr>
+              </a:pPr>
+              <a:endParaRPr lang="en-US"/>
+            </a:p>
+          </c:txPr>
+        </c:title>
+        <c:numFmt formatCode="General" sourceLinked="1"/>
+        <c:majorTickMark val="none"/>
+        <c:minorTickMark val="none"/>
+        <c:tickLblPos val="nextTo"/>
+        <c:spPr>
+          <a:noFill/>
+          <a:ln>
+            <a:noFill/>
+          </a:ln>
+          <a:effectLst/>
+        </c:spPr>
+        <c:txPr>
+          <a:bodyPr rot="-60000000" spcFirstLastPara="1" vertOverflow="ellipsis" vert="horz" wrap="square" anchor="ctr" anchorCtr="1"/>
+          <a:lstStyle/>
+          <a:p>
+            <a:pPr>
+              <a:defRPr sz="900" b="0" i="0" u="none" strike="noStrike" kern="1200" baseline="0">
+                <a:solidFill>
+                  <a:schemeClr val="tx1">
+                    <a:lumMod val="65000"/>
+                    <a:lumOff val="35000"/>
+                  </a:schemeClr>
+                </a:solidFill>
+                <a:latin typeface="+mn-lt"/>
+                <a:ea typeface="+mn-ea"/>
+                <a:cs typeface="+mn-cs"/>
+              </a:defRPr>
+            </a:pPr>
+            <a:endParaRPr lang="en-US"/>
+          </a:p>
+        </c:txPr>
+        <c:crossAx val="1019361072"/>
+        <c:crosses val="autoZero"/>
+        <c:crossBetween val="between"/>
+      </c:valAx>
+      <c:spPr>
+        <a:noFill/>
+        <a:ln>
+          <a:noFill/>
+        </a:ln>
+        <a:effectLst/>
+      </c:spPr>
+    </c:plotArea>
+    <c:legend>
+      <c:legendPos val="b"/>
+      <c:layout>
+        <c:manualLayout>
+          <c:xMode val="edge"/>
+          <c:yMode val="edge"/>
+          <c:x val="0.35480912658194952"/>
+          <c:y val="0.87975338653138158"/>
+          <c:w val="0.28378108677009434"/>
+          <c:h val="7.5503884162130747E-2"/>
+        </c:manualLayout>
+      </c:layout>
+      <c:overlay val="0"/>
+      <c:spPr>
+        <a:noFill/>
+        <a:ln>
+          <a:noFill/>
+        </a:ln>
+        <a:effectLst/>
+      </c:spPr>
+      <c:txPr>
+        <a:bodyPr rot="0" spcFirstLastPara="1" vertOverflow="ellipsis" vert="horz" wrap="square" anchor="ctr" anchorCtr="1"/>
+        <a:lstStyle/>
+        <a:p>
+          <a:pPr>
+            <a:defRPr sz="900" b="0" i="0" u="none" strike="noStrike" kern="1200" baseline="0">
+              <a:solidFill>
+                <a:schemeClr val="tx1">
+                  <a:lumMod val="65000"/>
+                  <a:lumOff val="35000"/>
+                </a:schemeClr>
+              </a:solidFill>
+              <a:latin typeface="+mn-lt"/>
+              <a:ea typeface="+mn-ea"/>
+              <a:cs typeface="+mn-cs"/>
+            </a:defRPr>
+          </a:pPr>
+          <a:endParaRPr lang="en-US"/>
+        </a:p>
+      </c:txPr>
+    </c:legend>
+    <c:plotVisOnly val="1"/>
+    <c:dispBlanksAs val="gap"/>
+    <c:extLst>
+      <c:ext xmlns:c16r3="http://schemas.microsoft.com/office/drawing/2017/03/chart" uri="{56B9EC1D-385E-4148-901F-78D8002777C0}">
+        <c16r3:dataDisplayOptions16>
+          <c16r3:dispNaAsBlank val="1"/>
+        </c16r3:dataDisplayOptions16>
+      </c:ext>
+    </c:extLst>
+    <c:showDLblsOverMax val="0"/>
+  </c:chart>
+  <c:spPr>
+    <a:noFill/>
+    <a:ln>
+      <a:noFill/>
+    </a:ln>
+    <a:effectLst/>
+  </c:spPr>
+  <c:txPr>
+    <a:bodyPr/>
+    <a:lstStyle/>
+    <a:p>
+      <a:pPr>
+        <a:defRPr/>
+      </a:pPr>
+      <a:endParaRPr lang="en-US"/>
+    </a:p>
+  </c:txPr>
+  <c:externalData r:id="rId3">
+    <c:autoUpdate val="0"/>
+  </c:externalData>
+</c:chartSpace>
+</file>
+
+<file path=ppt/charts/chart3.xml><?xml version="1.0" encoding="utf-8"?>
+<c:chartSpace xmlns:c="http://schemas.openxmlformats.org/drawingml/2006/chart" xmlns:a="http://schemas.openxmlformats.org/drawingml/2006/main" xmlns:r="http://schemas.openxmlformats.org/officeDocument/2006/relationships" xmlns:c16r2="http://schemas.microsoft.com/office/drawing/2015/06/chart">
+  <c:date1904 val="0"/>
+  <c:lang val="en-US"/>
+  <c:roundedCorners val="0"/>
+  <mc:AlternateContent xmlns:mc="http://schemas.openxmlformats.org/markup-compatibility/2006">
+    <mc:Choice xmlns:c14="http://schemas.microsoft.com/office/drawing/2007/8/2/chart" Requires="c14">
+      <c14:style val="102"/>
+    </mc:Choice>
+    <mc:Fallback>
+      <c:style val="2"/>
+    </mc:Fallback>
+  </mc:AlternateContent>
+  <c:chart>
+    <c:title>
+      <c:tx>
+        <c:rich>
+          <a:bodyPr rot="0" spcFirstLastPara="1" vertOverflow="ellipsis" vert="horz" wrap="square" anchor="ctr" anchorCtr="1"/>
+          <a:lstStyle/>
+          <a:p>
+            <a:pPr>
+              <a:defRPr sz="1400" b="0" i="0" u="none" strike="noStrike" kern="1200" spc="0" baseline="0">
+                <a:solidFill>
+                  <a:schemeClr val="tx1">
+                    <a:lumMod val="65000"/>
+                    <a:lumOff val="35000"/>
+                  </a:schemeClr>
+                </a:solidFill>
+                <a:latin typeface="+mn-lt"/>
+                <a:ea typeface="+mn-ea"/>
+                <a:cs typeface="+mn-cs"/>
+              </a:defRPr>
+            </a:pPr>
+            <a:r>
+              <a:rPr lang="en-GB" sz="1400" b="0" i="0" u="none" strike="noStrike" baseline="0">
+                <a:effectLst/>
+              </a:rPr>
+              <a:t>lines of code (LOC) per class</a:t>
+            </a:r>
+            <a:r>
+              <a:rPr lang="en-GB" sz="1400" b="0" i="0" u="none" strike="noStrike" baseline="0"/>
+              <a:t> </a:t>
+            </a:r>
+            <a:endParaRPr lang="en-GB"/>
+          </a:p>
+        </c:rich>
+      </c:tx>
+      <c:layout>
+        <c:manualLayout>
+          <c:xMode val="edge"/>
+          <c:yMode val="edge"/>
+          <c:x val="0.22276396143551361"/>
+          <c:y val="1.7897091722595078E-2"/>
+        </c:manualLayout>
+      </c:layout>
+      <c:overlay val="0"/>
+      <c:spPr>
+        <a:noFill/>
+        <a:ln>
+          <a:noFill/>
+        </a:ln>
+        <a:effectLst/>
+      </c:spPr>
+      <c:txPr>
+        <a:bodyPr rot="0" spcFirstLastPara="1" vertOverflow="ellipsis" vert="horz" wrap="square" anchor="ctr" anchorCtr="1"/>
+        <a:lstStyle/>
+        <a:p>
+          <a:pPr>
+            <a:defRPr sz="1400" b="0" i="0" u="none" strike="noStrike" kern="1200" spc="0" baseline="0">
+              <a:solidFill>
+                <a:schemeClr val="tx1">
+                  <a:lumMod val="65000"/>
+                  <a:lumOff val="35000"/>
+                </a:schemeClr>
+              </a:solidFill>
+              <a:latin typeface="+mn-lt"/>
+              <a:ea typeface="+mn-ea"/>
+              <a:cs typeface="+mn-cs"/>
+            </a:defRPr>
+          </a:pPr>
+          <a:endParaRPr lang="en-US"/>
+        </a:p>
+      </c:txPr>
+    </c:title>
+    <c:autoTitleDeleted val="0"/>
+    <c:plotArea>
+      <c:layout/>
+      <c:lineChart>
+        <c:grouping val="standard"/>
+        <c:varyColors val="0"/>
+        <c:ser>
+          <c:idx val="0"/>
+          <c:order val="0"/>
+          <c:tx>
+            <c:strRef>
+              <c:f>Sheet1!$B$17</c:f>
+              <c:strCache>
+                <c:ptCount val="1"/>
+                <c:pt idx="0">
+                  <c:v>min</c:v>
+                </c:pt>
+              </c:strCache>
+            </c:strRef>
+          </c:tx>
+          <c:spPr>
+            <a:ln w="25400" cap="rnd">
+              <a:noFill/>
+              <a:round/>
+            </a:ln>
+            <a:effectLst/>
+          </c:spPr>
+          <c:marker>
+            <c:symbol val="dash"/>
+            <c:size val="10"/>
+            <c:spPr>
+              <a:solidFill>
+                <a:schemeClr val="accent1"/>
+              </a:solidFill>
+              <a:ln w="9525">
+                <a:solidFill>
+                  <a:schemeClr val="accent1"/>
+                </a:solidFill>
+              </a:ln>
+              <a:effectLst/>
+            </c:spPr>
+          </c:marker>
+          <c:cat>
+            <c:numRef>
+              <c:f>Sheet1!$C$10:$E$10</c:f>
+              <c:numCache>
+                <c:formatCode>General</c:formatCode>
+                <c:ptCount val="3"/>
+              </c:numCache>
+            </c:numRef>
+          </c:cat>
+          <c:val>
+            <c:numRef>
+              <c:f>Sheet1!$C$17:$E$17</c:f>
+              <c:numCache>
+                <c:formatCode>General</c:formatCode>
+                <c:ptCount val="3"/>
+                <c:pt idx="0">
+                  <c:v>5</c:v>
+                </c:pt>
+                <c:pt idx="1">
+                  <c:v>10</c:v>
+                </c:pt>
+                <c:pt idx="2">
+                  <c:v>18</c:v>
+                </c:pt>
+              </c:numCache>
+            </c:numRef>
+          </c:val>
+          <c:smooth val="0"/>
+          <c:extLst>
+            <c:ext xmlns:c16="http://schemas.microsoft.com/office/drawing/2014/chart" uri="{C3380CC4-5D6E-409C-BE32-E72D297353CC}">
+              <c16:uniqueId val="{00000000-B9B8-45D5-BA39-A4FD221957A0}"/>
+            </c:ext>
+          </c:extLst>
+        </c:ser>
+        <c:ser>
+          <c:idx val="1"/>
+          <c:order val="1"/>
+          <c:tx>
+            <c:strRef>
+              <c:f>Sheet1!$B$18</c:f>
+              <c:strCache>
+                <c:ptCount val="1"/>
+                <c:pt idx="0">
+                  <c:v>max</c:v>
+                </c:pt>
+              </c:strCache>
+            </c:strRef>
+          </c:tx>
+          <c:spPr>
+            <a:ln w="25400" cap="rnd">
+              <a:noFill/>
+              <a:round/>
+            </a:ln>
+            <a:effectLst/>
+          </c:spPr>
+          <c:marker>
+            <c:symbol val="dash"/>
+            <c:size val="10"/>
+            <c:spPr>
+              <a:solidFill>
+                <a:srgbClr val="FF0000"/>
+              </a:solidFill>
+              <a:ln w="9525">
+                <a:solidFill>
+                  <a:srgbClr val="FF0000"/>
+                </a:solidFill>
+              </a:ln>
+              <a:effectLst/>
+            </c:spPr>
+          </c:marker>
+          <c:cat>
+            <c:numRef>
+              <c:f>Sheet1!$C$10:$E$10</c:f>
+              <c:numCache>
+                <c:formatCode>General</c:formatCode>
+                <c:ptCount val="3"/>
+              </c:numCache>
+            </c:numRef>
+          </c:cat>
+          <c:val>
+            <c:numRef>
+              <c:f>Sheet1!$C$18:$E$18</c:f>
+              <c:numCache>
+                <c:formatCode>General</c:formatCode>
+                <c:ptCount val="3"/>
+                <c:pt idx="0">
+                  <c:v>391</c:v>
+                </c:pt>
+                <c:pt idx="1">
+                  <c:v>488</c:v>
+                </c:pt>
+                <c:pt idx="2">
+                  <c:v>919</c:v>
+                </c:pt>
+              </c:numCache>
+            </c:numRef>
+          </c:val>
+          <c:smooth val="0"/>
+          <c:extLst>
+            <c:ext xmlns:c16="http://schemas.microsoft.com/office/drawing/2014/chart" uri="{C3380CC4-5D6E-409C-BE32-E72D297353CC}">
+              <c16:uniqueId val="{00000001-B9B8-45D5-BA39-A4FD221957A0}"/>
+            </c:ext>
+          </c:extLst>
+        </c:ser>
+        <c:ser>
+          <c:idx val="2"/>
+          <c:order val="2"/>
+          <c:tx>
+            <c:strRef>
+              <c:f>Sheet1!$B$19</c:f>
+              <c:strCache>
+                <c:ptCount val="1"/>
+                <c:pt idx="0">
+                  <c:v>avg</c:v>
+                </c:pt>
+              </c:strCache>
+            </c:strRef>
+          </c:tx>
+          <c:spPr>
+            <a:ln w="25400" cap="rnd">
+              <a:noFill/>
+              <a:round/>
+            </a:ln>
+            <a:effectLst/>
+          </c:spPr>
+          <c:marker>
+            <c:symbol val="diamond"/>
+            <c:size val="10"/>
+            <c:spPr>
+              <a:solidFill>
+                <a:srgbClr val="00B050"/>
+              </a:solidFill>
+              <a:ln w="9525">
+                <a:solidFill>
+                  <a:srgbClr val="00B050"/>
+                </a:solidFill>
+              </a:ln>
+              <a:effectLst/>
+            </c:spPr>
+          </c:marker>
+          <c:cat>
+            <c:numRef>
+              <c:f>Sheet1!$C$10:$E$10</c:f>
+              <c:numCache>
+                <c:formatCode>General</c:formatCode>
+                <c:ptCount val="3"/>
+              </c:numCache>
+            </c:numRef>
+          </c:cat>
+          <c:val>
+            <c:numRef>
+              <c:f>Sheet1!$C$19:$E$19</c:f>
+              <c:numCache>
+                <c:formatCode>0.0</c:formatCode>
+                <c:ptCount val="3"/>
+                <c:pt idx="0">
+                  <c:v>74.24444444444444</c:v>
+                </c:pt>
+                <c:pt idx="1">
+                  <c:v>87.692307692307693</c:v>
+                </c:pt>
+                <c:pt idx="2">
+                  <c:v>111.76470588235294</c:v>
+                </c:pt>
+              </c:numCache>
+            </c:numRef>
+          </c:val>
+          <c:smooth val="0"/>
+          <c:extLst>
+            <c:ext xmlns:c16="http://schemas.microsoft.com/office/drawing/2014/chart" uri="{C3380CC4-5D6E-409C-BE32-E72D297353CC}">
+              <c16:uniqueId val="{00000002-B9B8-45D5-BA39-A4FD221957A0}"/>
+            </c:ext>
+          </c:extLst>
+        </c:ser>
+        <c:dLbls>
+          <c:showLegendKey val="0"/>
+          <c:showVal val="0"/>
+          <c:showCatName val="0"/>
+          <c:showSerName val="0"/>
+          <c:showPercent val="0"/>
+          <c:showBubbleSize val="0"/>
+        </c:dLbls>
+        <c:hiLowLines>
+          <c:spPr>
+            <a:ln w="9525" cap="flat" cmpd="sng" algn="ctr">
+              <a:solidFill>
+                <a:schemeClr val="tx1">
+                  <a:lumMod val="75000"/>
+                  <a:lumOff val="25000"/>
+                </a:schemeClr>
+              </a:solidFill>
+              <a:round/>
+            </a:ln>
+            <a:effectLst/>
+          </c:spPr>
+        </c:hiLowLines>
+        <c:marker val="1"/>
+        <c:smooth val="0"/>
+        <c:axId val="1019361072"/>
+        <c:axId val="1113314224"/>
+      </c:lineChart>
+      <c:catAx>
+        <c:axId val="1019361072"/>
+        <c:scaling>
+          <c:orientation val="minMax"/>
+        </c:scaling>
+        <c:delete val="0"/>
+        <c:axPos val="b"/>
+        <c:title>
+          <c:tx>
+            <c:rich>
+              <a:bodyPr rot="0" spcFirstLastPara="1" vertOverflow="ellipsis" vert="horz" wrap="square" anchor="ctr" anchorCtr="1"/>
+              <a:lstStyle/>
+              <a:p>
+                <a:pPr>
+                  <a:defRPr sz="1000" b="0" i="0" u="none" strike="noStrike" kern="1200" baseline="0">
+                    <a:solidFill>
+                      <a:schemeClr val="tx1">
+                        <a:lumMod val="65000"/>
+                        <a:lumOff val="35000"/>
+                      </a:schemeClr>
+                    </a:solidFill>
+                    <a:latin typeface="+mn-lt"/>
+                    <a:ea typeface="+mn-ea"/>
+                    <a:cs typeface="+mn-cs"/>
+                  </a:defRPr>
+                </a:pPr>
+                <a:r>
+                  <a:rPr lang="en-GB" dirty="0"/>
+                  <a:t>M3                             M4</a:t>
+                </a:r>
+                <a:r>
+                  <a:rPr lang="en-GB" baseline="0" dirty="0"/>
+                  <a:t>                             </a:t>
+                </a:r>
+                <a:r>
+                  <a:rPr lang="en-GB" dirty="0"/>
+                  <a:t>M5</a:t>
+                </a:r>
+              </a:p>
+            </c:rich>
+          </c:tx>
+          <c:layout>
+            <c:manualLayout>
+              <c:xMode val="edge"/>
+              <c:yMode val="edge"/>
+              <c:x val="0.27278189236246458"/>
+              <c:y val="0.77592770702319924"/>
+            </c:manualLayout>
+          </c:layout>
+          <c:overlay val="0"/>
+          <c:spPr>
+            <a:noFill/>
+            <a:ln>
+              <a:noFill/>
+            </a:ln>
+            <a:effectLst/>
+          </c:spPr>
+          <c:txPr>
+            <a:bodyPr rot="0" spcFirstLastPara="1" vertOverflow="ellipsis" vert="horz" wrap="square" anchor="ctr" anchorCtr="1"/>
+            <a:lstStyle/>
+            <a:p>
+              <a:pPr>
+                <a:defRPr sz="1000" b="0" i="0" u="none" strike="noStrike" kern="1200" baseline="0">
+                  <a:solidFill>
+                    <a:schemeClr val="tx1">
+                      <a:lumMod val="65000"/>
+                      <a:lumOff val="35000"/>
+                    </a:schemeClr>
+                  </a:solidFill>
+                  <a:latin typeface="+mn-lt"/>
+                  <a:ea typeface="+mn-ea"/>
+                  <a:cs typeface="+mn-cs"/>
+                </a:defRPr>
+              </a:pPr>
+              <a:endParaRPr lang="en-US"/>
+            </a:p>
+          </c:txPr>
+        </c:title>
+        <c:numFmt formatCode="General" sourceLinked="1"/>
+        <c:majorTickMark val="none"/>
+        <c:minorTickMark val="none"/>
+        <c:tickLblPos val="nextTo"/>
+        <c:spPr>
+          <a:noFill/>
+          <a:ln w="9525" cap="flat" cmpd="sng" algn="ctr">
+            <a:solidFill>
+              <a:schemeClr val="tx1">
+                <a:lumMod val="15000"/>
+                <a:lumOff val="85000"/>
+              </a:schemeClr>
+            </a:solidFill>
+            <a:round/>
+          </a:ln>
+          <a:effectLst/>
+        </c:spPr>
+        <c:txPr>
+          <a:bodyPr rot="-60000000" spcFirstLastPara="1" vertOverflow="ellipsis" vert="horz" wrap="square" anchor="ctr" anchorCtr="1"/>
+          <a:lstStyle/>
+          <a:p>
+            <a:pPr>
+              <a:defRPr sz="900" b="0" i="0" u="none" strike="noStrike" kern="1200" baseline="0">
+                <a:solidFill>
+                  <a:schemeClr val="tx1">
+                    <a:lumMod val="65000"/>
+                    <a:lumOff val="35000"/>
+                  </a:schemeClr>
+                </a:solidFill>
+                <a:latin typeface="+mn-lt"/>
+                <a:ea typeface="+mn-ea"/>
+                <a:cs typeface="+mn-cs"/>
+              </a:defRPr>
+            </a:pPr>
+            <a:endParaRPr lang="en-US"/>
+          </a:p>
+        </c:txPr>
+        <c:crossAx val="1113314224"/>
+        <c:crosses val="autoZero"/>
+        <c:auto val="1"/>
+        <c:lblAlgn val="ctr"/>
+        <c:lblOffset val="100"/>
+        <c:noMultiLvlLbl val="0"/>
+      </c:catAx>
+      <c:valAx>
+        <c:axId val="1113314224"/>
+        <c:scaling>
+          <c:orientation val="minMax"/>
+        </c:scaling>
+        <c:delete val="0"/>
+        <c:axPos val="l"/>
+        <c:majorGridlines>
+          <c:spPr>
+            <a:ln w="9525" cap="flat" cmpd="sng" algn="ctr">
+              <a:solidFill>
+                <a:schemeClr val="tx1">
+                  <a:lumMod val="15000"/>
+                  <a:lumOff val="85000"/>
+                </a:schemeClr>
+              </a:solidFill>
+              <a:round/>
+            </a:ln>
+            <a:effectLst/>
+          </c:spPr>
+        </c:majorGridlines>
+        <c:title>
+          <c:tx>
+            <c:rich>
+              <a:bodyPr rot="-5400000" spcFirstLastPara="1" vertOverflow="ellipsis" vert="horz" wrap="square" anchor="ctr" anchorCtr="1"/>
+              <a:lstStyle/>
+              <a:p>
+                <a:pPr>
+                  <a:defRPr sz="1000" b="0" i="0" u="none" strike="noStrike" kern="1200" baseline="0">
+                    <a:solidFill>
+                      <a:schemeClr val="tx1">
+                        <a:lumMod val="65000"/>
+                        <a:lumOff val="35000"/>
+                      </a:schemeClr>
+                    </a:solidFill>
+                    <a:latin typeface="+mn-lt"/>
+                    <a:ea typeface="+mn-ea"/>
+                    <a:cs typeface="+mn-cs"/>
+                  </a:defRPr>
+                </a:pPr>
+                <a:r>
+                  <a:rPr lang="en-GB" sz="1000" b="0" i="0" u="none" strike="noStrike" baseline="0">
+                    <a:effectLst/>
+                  </a:rPr>
+                  <a:t>LOC per class</a:t>
+                </a:r>
+                <a:r>
+                  <a:rPr lang="en-GB" sz="1000" b="0" i="0" u="none" strike="noStrike" baseline="0"/>
+                  <a:t> </a:t>
+                </a:r>
+                <a:endParaRPr lang="en-GB"/>
+              </a:p>
+            </c:rich>
+          </c:tx>
+          <c:overlay val="0"/>
+          <c:spPr>
+            <a:noFill/>
+            <a:ln>
+              <a:noFill/>
+            </a:ln>
+            <a:effectLst/>
+          </c:spPr>
+          <c:txPr>
+            <a:bodyPr rot="-5400000" spcFirstLastPara="1" vertOverflow="ellipsis" vert="horz" wrap="square" anchor="ctr" anchorCtr="1"/>
+            <a:lstStyle/>
+            <a:p>
+              <a:pPr>
+                <a:defRPr sz="1000" b="0" i="0" u="none" strike="noStrike" kern="1200" baseline="0">
+                  <a:solidFill>
+                    <a:schemeClr val="tx1">
+                      <a:lumMod val="65000"/>
+                      <a:lumOff val="35000"/>
+                    </a:schemeClr>
+                  </a:solidFill>
+                  <a:latin typeface="+mn-lt"/>
+                  <a:ea typeface="+mn-ea"/>
+                  <a:cs typeface="+mn-cs"/>
+                </a:defRPr>
+              </a:pPr>
+              <a:endParaRPr lang="en-US"/>
+            </a:p>
+          </c:txPr>
+        </c:title>
+        <c:numFmt formatCode="General" sourceLinked="1"/>
+        <c:majorTickMark val="none"/>
+        <c:minorTickMark val="none"/>
+        <c:tickLblPos val="nextTo"/>
+        <c:spPr>
+          <a:noFill/>
+          <a:ln>
+            <a:noFill/>
+          </a:ln>
+          <a:effectLst/>
+        </c:spPr>
+        <c:txPr>
+          <a:bodyPr rot="-60000000" spcFirstLastPara="1" vertOverflow="ellipsis" vert="horz" wrap="square" anchor="ctr" anchorCtr="1"/>
+          <a:lstStyle/>
+          <a:p>
+            <a:pPr>
+              <a:defRPr sz="900" b="0" i="0" u="none" strike="noStrike" kern="1200" baseline="0">
+                <a:solidFill>
+                  <a:schemeClr val="tx1">
+                    <a:lumMod val="65000"/>
+                    <a:lumOff val="35000"/>
+                  </a:schemeClr>
+                </a:solidFill>
+                <a:latin typeface="+mn-lt"/>
+                <a:ea typeface="+mn-ea"/>
+                <a:cs typeface="+mn-cs"/>
+              </a:defRPr>
+            </a:pPr>
+            <a:endParaRPr lang="en-US"/>
+          </a:p>
+        </c:txPr>
+        <c:crossAx val="1019361072"/>
+        <c:crosses val="autoZero"/>
+        <c:crossBetween val="between"/>
+      </c:valAx>
+      <c:spPr>
+        <a:noFill/>
+        <a:ln>
+          <a:noFill/>
+        </a:ln>
+        <a:effectLst/>
+      </c:spPr>
+    </c:plotArea>
+    <c:legend>
+      <c:legendPos val="b"/>
+      <c:overlay val="0"/>
+      <c:spPr>
+        <a:noFill/>
+        <a:ln>
+          <a:noFill/>
+        </a:ln>
+        <a:effectLst/>
+      </c:spPr>
+      <c:txPr>
+        <a:bodyPr rot="0" spcFirstLastPara="1" vertOverflow="ellipsis" vert="horz" wrap="square" anchor="ctr" anchorCtr="1"/>
+        <a:lstStyle/>
+        <a:p>
+          <a:pPr>
+            <a:defRPr sz="900" b="0" i="0" u="none" strike="noStrike" kern="1200" baseline="0">
+              <a:solidFill>
+                <a:schemeClr val="tx1">
+                  <a:lumMod val="65000"/>
+                  <a:lumOff val="35000"/>
+                </a:schemeClr>
+              </a:solidFill>
+              <a:latin typeface="+mn-lt"/>
+              <a:ea typeface="+mn-ea"/>
+              <a:cs typeface="+mn-cs"/>
+            </a:defRPr>
+          </a:pPr>
+          <a:endParaRPr lang="en-US"/>
+        </a:p>
+      </c:txPr>
+    </c:legend>
+    <c:plotVisOnly val="1"/>
+    <c:dispBlanksAs val="gap"/>
+    <c:extLst>
+      <c:ext xmlns:c16r3="http://schemas.microsoft.com/office/drawing/2017/03/chart" uri="{56B9EC1D-385E-4148-901F-78D8002777C0}">
+        <c16r3:dataDisplayOptions16>
+          <c16r3:dispNaAsBlank val="1"/>
+        </c16r3:dataDisplayOptions16>
+      </c:ext>
+    </c:extLst>
+    <c:showDLblsOverMax val="0"/>
+  </c:chart>
+  <c:spPr>
+    <a:noFill/>
+    <a:ln>
+      <a:noFill/>
+    </a:ln>
+    <a:effectLst/>
+  </c:spPr>
+  <c:txPr>
+    <a:bodyPr/>
+    <a:lstStyle/>
+    <a:p>
+      <a:pPr>
+        <a:defRPr/>
+      </a:pPr>
+      <a:endParaRPr lang="en-US"/>
+    </a:p>
+  </c:txPr>
+  <c:externalData r:id="rId3">
+    <c:autoUpdate val="0"/>
+  </c:externalData>
+</c:chartSpace>
+</file>
+
+<file path=ppt/charts/colors1.xml><?xml version="1.0" encoding="utf-8"?>
+<cs:colorStyle xmlns:cs="http://schemas.microsoft.com/office/drawing/2012/chartStyle" xmlns:a="http://schemas.openxmlformats.org/drawingml/2006/main" meth="cycle" id="10">
+  <a:schemeClr val="accent1"/>
+  <a:schemeClr val="accent2"/>
+  <a:schemeClr val="accent3"/>
+  <a:schemeClr val="accent4"/>
+  <a:schemeClr val="accent5"/>
+  <a:schemeClr val="accent6"/>
+  <cs:variation/>
+  <cs:variation>
+    <a:lumMod val="60000"/>
+  </cs:variation>
+  <cs:variation>
+    <a:lumMod val="80000"/>
+    <a:lumOff val="20000"/>
+  </cs:variation>
+  <cs:variation>
+    <a:lumMod val="80000"/>
+  </cs:variation>
+  <cs:variation>
+    <a:lumMod val="60000"/>
+    <a:lumOff val="40000"/>
+  </cs:variation>
+  <cs:variation>
+    <a:lumMod val="50000"/>
+  </cs:variation>
+  <cs:variation>
+    <a:lumMod val="70000"/>
+    <a:lumOff val="30000"/>
+  </cs:variation>
+  <cs:variation>
+    <a:lumMod val="70000"/>
+  </cs:variation>
+  <cs:variation>
+    <a:lumMod val="50000"/>
+    <a:lumOff val="50000"/>
+  </cs:variation>
+</cs:colorStyle>
+</file>
+
+<file path=ppt/charts/colors2.xml><?xml version="1.0" encoding="utf-8"?>
+<cs:colorStyle xmlns:cs="http://schemas.microsoft.com/office/drawing/2012/chartStyle" xmlns:a="http://schemas.openxmlformats.org/drawingml/2006/main" meth="cycle" id="10">
+  <a:schemeClr val="accent1"/>
+  <a:schemeClr val="accent2"/>
+  <a:schemeClr val="accent3"/>
+  <a:schemeClr val="accent4"/>
+  <a:schemeClr val="accent5"/>
+  <a:schemeClr val="accent6"/>
+  <cs:variation/>
+  <cs:variation>
+    <a:lumMod val="60000"/>
+  </cs:variation>
+  <cs:variation>
+    <a:lumMod val="80000"/>
+    <a:lumOff val="20000"/>
+  </cs:variation>
+  <cs:variation>
+    <a:lumMod val="80000"/>
+  </cs:variation>
+  <cs:variation>
+    <a:lumMod val="60000"/>
+    <a:lumOff val="40000"/>
+  </cs:variation>
+  <cs:variation>
+    <a:lumMod val="50000"/>
+  </cs:variation>
+  <cs:variation>
+    <a:lumMod val="70000"/>
+    <a:lumOff val="30000"/>
+  </cs:variation>
+  <cs:variation>
+    <a:lumMod val="70000"/>
+  </cs:variation>
+  <cs:variation>
+    <a:lumMod val="50000"/>
+    <a:lumOff val="50000"/>
+  </cs:variation>
+</cs:colorStyle>
+</file>
+
+<file path=ppt/charts/colors3.xml><?xml version="1.0" encoding="utf-8"?>
+<cs:colorStyle xmlns:cs="http://schemas.microsoft.com/office/drawing/2012/chartStyle" xmlns:a="http://schemas.openxmlformats.org/drawingml/2006/main" meth="cycle" id="10">
+  <a:schemeClr val="accent1"/>
+  <a:schemeClr val="accent2"/>
+  <a:schemeClr val="accent3"/>
+  <a:schemeClr val="accent4"/>
+  <a:schemeClr val="accent5"/>
+  <a:schemeClr val="accent6"/>
+  <cs:variation/>
+  <cs:variation>
+    <a:lumMod val="60000"/>
+  </cs:variation>
+  <cs:variation>
+    <a:lumMod val="80000"/>
+    <a:lumOff val="20000"/>
+  </cs:variation>
+  <cs:variation>
+    <a:lumMod val="80000"/>
+  </cs:variation>
+  <cs:variation>
+    <a:lumMod val="60000"/>
+    <a:lumOff val="40000"/>
+  </cs:variation>
+  <cs:variation>
+    <a:lumMod val="50000"/>
+  </cs:variation>
+  <cs:variation>
+    <a:lumMod val="70000"/>
+    <a:lumOff val="30000"/>
+  </cs:variation>
+  <cs:variation>
+    <a:lumMod val="70000"/>
+  </cs:variation>
+  <cs:variation>
+    <a:lumMod val="50000"/>
+    <a:lumOff val="50000"/>
+  </cs:variation>
+</cs:colorStyle>
+</file>
+
+<file path=ppt/charts/style1.xml><?xml version="1.0" encoding="utf-8"?>
+<cs:chartStyle xmlns:cs="http://schemas.microsoft.com/office/drawing/2012/chartStyle" xmlns:a="http://schemas.openxmlformats.org/drawingml/2006/main" id="240">
+  <cs:axisTitle>
+    <cs:lnRef idx="0"/>
+    <cs:fillRef idx="0"/>
+    <cs:effectRef idx="0"/>
+    <cs:fontRef idx="minor">
+      <a:schemeClr val="tx1">
+        <a:lumMod val="65000"/>
+        <a:lumOff val="35000"/>
+      </a:schemeClr>
+    </cs:fontRef>
+    <cs:defRPr sz="1000" kern="1200"/>
+  </cs:axisTitle>
+  <cs:categoryAxis>
+    <cs:lnRef idx="0"/>
+    <cs:fillRef idx="0"/>
+    <cs:effectRef idx="0"/>
+    <cs:fontRef idx="minor">
+      <a:schemeClr val="tx1">
+        <a:lumMod val="65000"/>
+        <a:lumOff val="35000"/>
+      </a:schemeClr>
+    </cs:fontRef>
+    <cs:spPr>
+      <a:ln w="9525" cap="flat" cmpd="sng" algn="ctr">
+        <a:solidFill>
+          <a:schemeClr val="tx1">
+            <a:lumMod val="25000"/>
+            <a:lumOff val="75000"/>
+          </a:schemeClr>
+        </a:solidFill>
+        <a:round/>
+      </a:ln>
+    </cs:spPr>
+    <cs:defRPr sz="900" kern="1200"/>
+  </cs:categoryAxis>
+  <cs:chartArea mods="allowNoFillOverride allowNoLineOverride">
+    <cs:lnRef idx="0"/>
+    <cs:fillRef idx="0"/>
+    <cs:effectRef idx="0"/>
+    <cs:fontRef idx="minor">
+      <a:schemeClr val="tx1"/>
+    </cs:fontRef>
+    <cs:spPr>
+      <a:solidFill>
+        <a:schemeClr val="bg1"/>
+      </a:solidFill>
+      <a:ln w="9525" cap="flat" cmpd="sng" algn="ctr">
+        <a:solidFill>
+          <a:schemeClr val="tx1">
+            <a:lumMod val="15000"/>
+            <a:lumOff val="85000"/>
+          </a:schemeClr>
+        </a:solidFill>
+        <a:round/>
+      </a:ln>
+    </cs:spPr>
+    <cs:defRPr sz="1000" kern="1200"/>
+  </cs:chartArea>
+  <cs:dataLabel>
+    <cs:lnRef idx="0"/>
+    <cs:fillRef idx="0"/>
+    <cs:effectRef idx="0"/>
+    <cs:fontRef idx="minor">
+      <a:schemeClr val="tx1">
+        <a:lumMod val="75000"/>
+        <a:lumOff val="25000"/>
+      </a:schemeClr>
+    </cs:fontRef>
+    <cs:defRPr sz="900" kern="1200"/>
+  </cs:dataLabel>
+  <cs:dataLabelCallout>
+    <cs:lnRef idx="0"/>
+    <cs:fillRef idx="0"/>
+    <cs:effectRef idx="0"/>
+    <cs:fontRef idx="minor">
+      <a:schemeClr val="dk1">
+        <a:lumMod val="65000"/>
+        <a:lumOff val="35000"/>
+      </a:schemeClr>
+    </cs:fontRef>
+    <cs:spPr>
+      <a:solidFill>
+        <a:schemeClr val="lt1"/>
+      </a:solidFill>
+      <a:ln>
+        <a:solidFill>
+          <a:schemeClr val="dk1">
+            <a:lumMod val="25000"/>
+            <a:lumOff val="75000"/>
+          </a:schemeClr>
+        </a:solidFill>
+      </a:ln>
+    </cs:spPr>
+    <cs:defRPr sz="900" kern="1200"/>
+    <cs:bodyPr rot="0" spcFirstLastPara="1" vertOverflow="clip" horzOverflow="clip" vert="horz" wrap="square" lIns="36576" tIns="18288" rIns="36576" bIns="18288" anchor="ctr" anchorCtr="1">
+      <a:spAutoFit/>
+    </cs:bodyPr>
+  </cs:dataLabelCallout>
+  <cs:dataPoint>
+    <cs:lnRef idx="0"/>
+    <cs:fillRef idx="1">
+      <cs:styleClr val="auto"/>
+    </cs:fillRef>
+    <cs:effectRef idx="0"/>
+    <cs:fontRef idx="minor">
+      <a:schemeClr val="tx1"/>
+    </cs:fontRef>
+  </cs:dataPoint>
+  <cs:dataPoint3D>
+    <cs:lnRef idx="0"/>
+    <cs:fillRef idx="1">
+      <cs:styleClr val="auto"/>
+    </cs:fillRef>
+    <cs:effectRef idx="0"/>
+    <cs:fontRef idx="minor">
+      <a:schemeClr val="tx1"/>
+    </cs:fontRef>
+  </cs:dataPoint3D>
+  <cs:dataPointLine>
+    <cs:lnRef idx="0">
+      <cs:styleClr val="auto"/>
+    </cs:lnRef>
+    <cs:fillRef idx="1"/>
+    <cs:effectRef idx="0"/>
+    <cs:fontRef idx="minor">
+      <a:schemeClr val="tx1"/>
+    </cs:fontRef>
+    <cs:spPr>
+      <a:ln w="19050" cap="rnd">
+        <a:solidFill>
+          <a:schemeClr val="phClr"/>
+        </a:solidFill>
+        <a:round/>
+      </a:ln>
+    </cs:spPr>
+  </cs:dataPointLine>
+  <cs:dataPointMarker>
+    <cs:lnRef idx="0">
+      <cs:styleClr val="auto"/>
+    </cs:lnRef>
+    <cs:fillRef idx="1">
+      <cs:styleClr val="auto"/>
+    </cs:fillRef>
+    <cs:effectRef idx="0"/>
+    <cs:fontRef idx="minor">
+      <a:schemeClr val="tx1"/>
+    </cs:fontRef>
+    <cs:spPr>
+      <a:ln w="9525">
+        <a:solidFill>
+          <a:schemeClr val="phClr"/>
+        </a:solidFill>
+      </a:ln>
+    </cs:spPr>
+  </cs:dataPointMarker>
+  <cs:dataPointMarkerLayout symbol="circle" size="5"/>
+  <cs:dataPointWireframe>
+    <cs:lnRef idx="0">
+      <cs:styleClr val="auto"/>
+    </cs:lnRef>
+    <cs:fillRef idx="0"/>
+    <cs:effectRef idx="0"/>
+    <cs:fontRef idx="minor">
+      <a:schemeClr val="dk1"/>
+    </cs:fontRef>
+    <cs:spPr>
+      <a:ln w="9525" cap="rnd">
+        <a:solidFill>
+          <a:schemeClr val="phClr"/>
+        </a:solidFill>
+        <a:round/>
+      </a:ln>
+    </cs:spPr>
+  </cs:dataPointWireframe>
+  <cs:dataTable>
+    <cs:lnRef idx="0"/>
+    <cs:fillRef idx="0"/>
+    <cs:effectRef idx="0"/>
+    <cs:fontRef idx="minor">
+      <a:schemeClr val="tx1">
+        <a:lumMod val="65000"/>
+        <a:lumOff val="35000"/>
+      </a:schemeClr>
+    </cs:fontRef>
+    <cs:spPr>
+      <a:noFill/>
+      <a:ln w="9525" cap="flat" cmpd="sng" algn="ctr">
+        <a:solidFill>
+          <a:schemeClr val="tx1">
+            <a:lumMod val="15000"/>
+            <a:lumOff val="85000"/>
+          </a:schemeClr>
+        </a:solidFill>
+        <a:round/>
+      </a:ln>
+    </cs:spPr>
+    <cs:defRPr sz="900" kern="1200"/>
+  </cs:dataTable>
+  <cs:downBar>
+    <cs:lnRef idx="0"/>
+    <cs:fillRef idx="0"/>
+    <cs:effectRef idx="0"/>
+    <cs:fontRef idx="minor">
+      <a:schemeClr val="tx1"/>
+    </cs:fontRef>
+    <cs:spPr>
+      <a:solidFill>
+        <a:schemeClr val="dk1">
+          <a:lumMod val="75000"/>
+          <a:lumOff val="25000"/>
+        </a:schemeClr>
+      </a:solidFill>
+      <a:ln w="9525" cap="flat" cmpd="sng" algn="ctr">
+        <a:solidFill>
+          <a:schemeClr val="tx1">
+            <a:lumMod val="65000"/>
+            <a:lumOff val="35000"/>
+          </a:schemeClr>
+        </a:solidFill>
+        <a:round/>
+      </a:ln>
+    </cs:spPr>
+  </cs:downBar>
+  <cs:dropLine>
+    <cs:lnRef idx="0"/>
+    <cs:fillRef idx="0"/>
+    <cs:effectRef idx="0"/>
+    <cs:fontRef idx="minor">
+      <a:schemeClr val="tx1"/>
+    </cs:fontRef>
+    <cs:spPr>
+      <a:ln w="9525" cap="flat" cmpd="sng" algn="ctr">
+        <a:solidFill>
+          <a:schemeClr val="tx1">
+            <a:lumMod val="35000"/>
+            <a:lumOff val="65000"/>
+          </a:schemeClr>
+        </a:solidFill>
+        <a:round/>
+      </a:ln>
+    </cs:spPr>
+  </cs:dropLine>
+  <cs:errorBar>
+    <cs:lnRef idx="0"/>
+    <cs:fillRef idx="0"/>
+    <cs:effectRef idx="0"/>
+    <cs:fontRef idx="minor">
+      <a:schemeClr val="tx1"/>
+    </cs:fontRef>
+    <cs:spPr>
+      <a:ln w="9525" cap="flat" cmpd="sng" algn="ctr">
+        <a:solidFill>
+          <a:schemeClr val="tx1">
+            <a:lumMod val="65000"/>
+            <a:lumOff val="35000"/>
+          </a:schemeClr>
+        </a:solidFill>
+        <a:round/>
+      </a:ln>
+    </cs:spPr>
+  </cs:errorBar>
+  <cs:floor>
+    <cs:lnRef idx="0"/>
+    <cs:fillRef idx="0"/>
+    <cs:effectRef idx="0"/>
+    <cs:fontRef idx="minor">
+      <a:schemeClr val="tx1"/>
+    </cs:fontRef>
+    <cs:spPr>
+      <a:noFill/>
+      <a:ln>
+        <a:noFill/>
+      </a:ln>
+    </cs:spPr>
+  </cs:floor>
+  <cs:gridlineMajor>
+    <cs:lnRef idx="0"/>
+    <cs:fillRef idx="0"/>
+    <cs:effectRef idx="0"/>
+    <cs:fontRef idx="minor">
+      <a:schemeClr val="tx1"/>
+    </cs:fontRef>
+    <cs:spPr>
+      <a:ln w="9525" cap="flat" cmpd="sng" algn="ctr">
+        <a:solidFill>
+          <a:schemeClr val="tx1">
+            <a:lumMod val="15000"/>
+            <a:lumOff val="85000"/>
+          </a:schemeClr>
+        </a:solidFill>
+        <a:round/>
+      </a:ln>
+    </cs:spPr>
+  </cs:gridlineMajor>
+  <cs:gridlineMinor>
+    <cs:lnRef idx="0"/>
+    <cs:fillRef idx="0"/>
+    <cs:effectRef idx="0"/>
+    <cs:fontRef idx="minor">
+      <a:schemeClr val="tx1"/>
+    </cs:fontRef>
+    <cs:spPr>
+      <a:ln w="9525" cap="flat" cmpd="sng" algn="ctr">
+        <a:solidFill>
+          <a:schemeClr val="tx1">
+            <a:lumMod val="5000"/>
+            <a:lumOff val="95000"/>
+          </a:schemeClr>
+        </a:solidFill>
+        <a:round/>
+      </a:ln>
+    </cs:spPr>
+  </cs:gridlineMinor>
+  <cs:hiLoLine>
+    <cs:lnRef idx="0"/>
+    <cs:fillRef idx="0"/>
+    <cs:effectRef idx="0"/>
+    <cs:fontRef idx="minor">
+      <a:schemeClr val="tx1"/>
+    </cs:fontRef>
+    <cs:spPr>
+      <a:ln w="9525" cap="flat" cmpd="sng" algn="ctr">
+        <a:solidFill>
+          <a:schemeClr val="tx1">
+            <a:lumMod val="50000"/>
+            <a:lumOff val="50000"/>
+          </a:schemeClr>
+        </a:solidFill>
+        <a:round/>
+      </a:ln>
+    </cs:spPr>
+  </cs:hiLoLine>
+  <cs:leaderLine>
+    <cs:lnRef idx="0"/>
+    <cs:fillRef idx="0"/>
+    <cs:effectRef idx="0"/>
+    <cs:fontRef idx="minor">
+      <a:schemeClr val="tx1"/>
+    </cs:fontRef>
+    <cs:spPr>
+      <a:ln w="9525" cap="flat" cmpd="sng" algn="ctr">
+        <a:solidFill>
+          <a:schemeClr val="tx1">
+            <a:lumMod val="35000"/>
+            <a:lumOff val="65000"/>
+          </a:schemeClr>
+        </a:solidFill>
+        <a:round/>
+      </a:ln>
+    </cs:spPr>
+  </cs:leaderLine>
+  <cs:legend>
+    <cs:lnRef idx="0"/>
+    <cs:fillRef idx="0"/>
+    <cs:effectRef idx="0"/>
+    <cs:fontRef idx="minor">
+      <a:schemeClr val="tx1">
+        <a:lumMod val="65000"/>
+        <a:lumOff val="35000"/>
+      </a:schemeClr>
+    </cs:fontRef>
+    <cs:defRPr sz="900" kern="1200"/>
+  </cs:legend>
+  <cs:plotArea mods="allowNoFillOverride allowNoLineOverride">
+    <cs:lnRef idx="0"/>
+    <cs:fillRef idx="0"/>
+    <cs:effectRef idx="0"/>
+    <cs:fontRef idx="minor">
+      <a:schemeClr val="tx1"/>
+    </cs:fontRef>
+  </cs:plotArea>
+  <cs:plotArea3D mods="allowNoFillOverride allowNoLineOverride">
+    <cs:lnRef idx="0"/>
+    <cs:fillRef idx="0"/>
+    <cs:effectRef idx="0"/>
+    <cs:fontRef idx="minor">
+      <a:schemeClr val="tx1"/>
+    </cs:fontRef>
+  </cs:plotArea3D>
+  <cs:seriesAxis>
+    <cs:lnRef idx="0"/>
+    <cs:fillRef idx="0"/>
+    <cs:effectRef idx="0"/>
+    <cs:fontRef idx="minor">
+      <a:schemeClr val="tx1">
+        <a:lumMod val="65000"/>
+        <a:lumOff val="35000"/>
+      </a:schemeClr>
+    </cs:fontRef>
+    <cs:defRPr sz="900" kern="1200"/>
+  </cs:seriesAxis>
+  <cs:seriesLine>
+    <cs:lnRef idx="0"/>
+    <cs:fillRef idx="0"/>
+    <cs:effectRef idx="0"/>
+    <cs:fontRef idx="minor">
+      <a:schemeClr val="tx1"/>
+    </cs:fontRef>
+    <cs:spPr>
+      <a:ln w="9525" cap="flat" cmpd="sng" algn="ctr">
+        <a:solidFill>
+          <a:schemeClr val="tx1">
+            <a:lumMod val="35000"/>
+            <a:lumOff val="65000"/>
+          </a:schemeClr>
+        </a:solidFill>
+        <a:round/>
+      </a:ln>
+    </cs:spPr>
+  </cs:seriesLine>
+  <cs:title>
+    <cs:lnRef idx="0"/>
+    <cs:fillRef idx="0"/>
+    <cs:effectRef idx="0"/>
+    <cs:fontRef idx="minor">
+      <a:schemeClr val="tx1">
+        <a:lumMod val="65000"/>
+        <a:lumOff val="35000"/>
+      </a:schemeClr>
+    </cs:fontRef>
+    <cs:defRPr sz="1400" b="0" kern="1200" spc="0" baseline="0"/>
+  </cs:title>
+  <cs:trendline>
+    <cs:lnRef idx="0">
+      <cs:styleClr val="auto"/>
+    </cs:lnRef>
+    <cs:fillRef idx="0"/>
+    <cs:effectRef idx="0"/>
+    <cs:fontRef idx="minor">
+      <a:schemeClr val="tx1"/>
+    </cs:fontRef>
+    <cs:spPr>
+      <a:ln w="19050" cap="rnd">
+        <a:solidFill>
+          <a:schemeClr val="phClr"/>
+        </a:solidFill>
+        <a:prstDash val="sysDot"/>
+      </a:ln>
+    </cs:spPr>
+  </cs:trendline>
+  <cs:trendlineLabel>
+    <cs:lnRef idx="0"/>
+    <cs:fillRef idx="0"/>
+    <cs:effectRef idx="0"/>
+    <cs:fontRef idx="minor">
+      <a:schemeClr val="tx1">
+        <a:lumMod val="65000"/>
+        <a:lumOff val="35000"/>
+      </a:schemeClr>
+    </cs:fontRef>
+    <cs:defRPr sz="900" kern="1200"/>
+  </cs:trendlineLabel>
+  <cs:upBar>
+    <cs:lnRef idx="0"/>
+    <cs:fillRef idx="0"/>
+    <cs:effectRef idx="0"/>
+    <cs:fontRef idx="minor">
+      <a:schemeClr val="tx1"/>
+    </cs:fontRef>
+    <cs:spPr>
+      <a:solidFill>
+        <a:schemeClr val="lt1"/>
+      </a:solidFill>
+      <a:ln w="9525" cap="flat" cmpd="sng" algn="ctr">
+        <a:solidFill>
+          <a:schemeClr val="tx1">
+            <a:lumMod val="65000"/>
+            <a:lumOff val="35000"/>
+          </a:schemeClr>
+        </a:solidFill>
+        <a:round/>
+      </a:ln>
+    </cs:spPr>
+  </cs:upBar>
+  <cs:valueAxis>
+    <cs:lnRef idx="0"/>
+    <cs:fillRef idx="0"/>
+    <cs:effectRef idx="0"/>
+    <cs:fontRef idx="minor">
+      <a:schemeClr val="tx1">
+        <a:lumMod val="65000"/>
+        <a:lumOff val="35000"/>
+      </a:schemeClr>
+    </cs:fontRef>
+    <cs:spPr>
+      <a:ln w="9525" cap="flat" cmpd="sng" algn="ctr">
+        <a:solidFill>
+          <a:schemeClr val="tx1">
+            <a:lumMod val="25000"/>
+            <a:lumOff val="75000"/>
+          </a:schemeClr>
+        </a:solidFill>
+        <a:round/>
+      </a:ln>
+    </cs:spPr>
+    <cs:defRPr sz="900" kern="1200"/>
+  </cs:valueAxis>
+  <cs:wall>
+    <cs:lnRef idx="0"/>
+    <cs:fillRef idx="0"/>
+    <cs:effectRef idx="0"/>
+    <cs:fontRef idx="minor">
+      <a:schemeClr val="tx1"/>
+    </cs:fontRef>
+    <cs:spPr>
+      <a:noFill/>
+      <a:ln>
+        <a:noFill/>
+      </a:ln>
+    </cs:spPr>
+  </cs:wall>
+</cs:chartStyle>
+</file>
+
+<file path=ppt/charts/style2.xml><?xml version="1.0" encoding="utf-8"?>
+<cs:chartStyle xmlns:cs="http://schemas.microsoft.com/office/drawing/2012/chartStyle" xmlns:a="http://schemas.openxmlformats.org/drawingml/2006/main" id="227">
+  <cs:axisTitle>
+    <cs:lnRef idx="0"/>
+    <cs:fillRef idx="0"/>
+    <cs:effectRef idx="0"/>
+    <cs:fontRef idx="minor">
+      <a:schemeClr val="tx1">
+        <a:lumMod val="65000"/>
+        <a:lumOff val="35000"/>
+      </a:schemeClr>
+    </cs:fontRef>
+    <cs:defRPr sz="1000" kern="1200"/>
+  </cs:axisTitle>
+  <cs:categoryAxis>
+    <cs:lnRef idx="0"/>
+    <cs:fillRef idx="0"/>
+    <cs:effectRef idx="0"/>
+    <cs:fontRef idx="minor">
+      <a:schemeClr val="tx1">
+        <a:lumMod val="65000"/>
+        <a:lumOff val="35000"/>
+      </a:schemeClr>
+    </cs:fontRef>
+    <cs:spPr>
+      <a:ln w="9525" cap="flat" cmpd="sng" algn="ctr">
+        <a:solidFill>
+          <a:schemeClr val="tx1">
+            <a:lumMod val="15000"/>
+            <a:lumOff val="85000"/>
+          </a:schemeClr>
+        </a:solidFill>
+        <a:round/>
+      </a:ln>
+    </cs:spPr>
+    <cs:defRPr sz="900" kern="1200"/>
+  </cs:categoryAxis>
+  <cs:chartArea mods="allowNoFillOverride allowNoLineOverride">
+    <cs:lnRef idx="0"/>
+    <cs:fillRef idx="0"/>
+    <cs:effectRef idx="0"/>
+    <cs:fontRef idx="minor">
+      <a:schemeClr val="tx1"/>
+    </cs:fontRef>
+    <cs:spPr>
+      <a:solidFill>
+        <a:schemeClr val="bg1"/>
+      </a:solidFill>
+      <a:ln w="9525" cap="flat" cmpd="sng" algn="ctr">
+        <a:solidFill>
+          <a:schemeClr val="tx1">
+            <a:lumMod val="15000"/>
+            <a:lumOff val="85000"/>
+          </a:schemeClr>
+        </a:solidFill>
+        <a:round/>
+      </a:ln>
+    </cs:spPr>
+    <cs:defRPr sz="1000" kern="1200"/>
+  </cs:chartArea>
+  <cs:dataLabel>
+    <cs:lnRef idx="0"/>
+    <cs:fillRef idx="0"/>
+    <cs:effectRef idx="0"/>
+    <cs:fontRef idx="minor">
+      <a:schemeClr val="tx1">
+        <a:lumMod val="75000"/>
+        <a:lumOff val="25000"/>
+      </a:schemeClr>
+    </cs:fontRef>
+    <cs:defRPr sz="900" kern="1200"/>
+  </cs:dataLabel>
+  <cs:dataLabelCallout>
+    <cs:lnRef idx="0"/>
+    <cs:fillRef idx="0"/>
+    <cs:effectRef idx="0"/>
+    <cs:fontRef idx="minor">
+      <a:schemeClr val="dk1">
+        <a:lumMod val="65000"/>
+        <a:lumOff val="35000"/>
+      </a:schemeClr>
+    </cs:fontRef>
+    <cs:spPr>
+      <a:solidFill>
+        <a:schemeClr val="lt1"/>
+      </a:solidFill>
+      <a:ln>
+        <a:solidFill>
+          <a:schemeClr val="dk1">
+            <a:lumMod val="25000"/>
+            <a:lumOff val="75000"/>
+          </a:schemeClr>
+        </a:solidFill>
+      </a:ln>
+    </cs:spPr>
+    <cs:defRPr sz="900" kern="1200"/>
+    <cs:bodyPr rot="0" spcFirstLastPara="1" vertOverflow="clip" horzOverflow="clip" vert="horz" wrap="square" lIns="36576" tIns="18288" rIns="36576" bIns="18288" anchor="ctr" anchorCtr="1">
+      <a:spAutoFit/>
+    </cs:bodyPr>
+  </cs:dataLabelCallout>
+  <cs:dataPoint>
+    <cs:lnRef idx="0"/>
+    <cs:fillRef idx="1">
+      <cs:styleClr val="auto"/>
+    </cs:fillRef>
+    <cs:effectRef idx="0"/>
+    <cs:fontRef idx="minor">
+      <a:schemeClr val="tx1"/>
+    </cs:fontRef>
+    <cs:spPr>
+      <a:solidFill>
+        <a:schemeClr val="phClr"/>
+      </a:solidFill>
+    </cs:spPr>
+  </cs:dataPoint>
+  <cs:dataPoint3D>
+    <cs:lnRef idx="0"/>
+    <cs:fillRef idx="1">
+      <cs:styleClr val="auto"/>
+    </cs:fillRef>
+    <cs:effectRef idx="0"/>
+    <cs:fontRef idx="minor">
+      <a:schemeClr val="tx1"/>
+    </cs:fontRef>
+    <cs:spPr>
+      <a:solidFill>
+        <a:schemeClr val="phClr"/>
+      </a:solidFill>
+    </cs:spPr>
+  </cs:dataPoint3D>
+  <cs:dataPointLine>
+    <cs:lnRef idx="0">
+      <cs:styleClr val="auto"/>
+    </cs:lnRef>
+    <cs:fillRef idx="1"/>
+    <cs:effectRef idx="0"/>
+    <cs:fontRef idx="minor">
+      <a:schemeClr val="tx1"/>
+    </cs:fontRef>
+    <cs:spPr>
+      <a:ln w="28575" cap="rnd">
+        <a:solidFill>
+          <a:schemeClr val="phClr"/>
+        </a:solidFill>
+        <a:round/>
+      </a:ln>
+    </cs:spPr>
+  </cs:dataPointLine>
+  <cs:dataPointMarker>
+    <cs:lnRef idx="0">
+      <cs:styleClr val="auto"/>
+    </cs:lnRef>
+    <cs:fillRef idx="1">
+      <cs:styleClr val="auto"/>
+    </cs:fillRef>
+    <cs:effectRef idx="0"/>
+    <cs:fontRef idx="minor">
+      <a:schemeClr val="tx1"/>
+    </cs:fontRef>
+    <cs:spPr>
+      <a:solidFill>
+        <a:schemeClr val="phClr"/>
+      </a:solidFill>
+      <a:ln w="9525">
+        <a:solidFill>
+          <a:schemeClr val="phClr"/>
+        </a:solidFill>
+      </a:ln>
+    </cs:spPr>
+  </cs:dataPointMarker>
+  <cs:dataPointMarkerLayout symbol="circle" size="5"/>
+  <cs:dataPointWireframe>
+    <cs:lnRef idx="0">
+      <cs:styleClr val="auto"/>
+    </cs:lnRef>
+    <cs:fillRef idx="1"/>
+    <cs:effectRef idx="0"/>
+    <cs:fontRef idx="minor">
+      <a:schemeClr val="tx1"/>
+    </cs:fontRef>
+    <cs:spPr>
+      <a:ln w="9525" cap="rnd">
+        <a:solidFill>
+          <a:schemeClr val="phClr"/>
+        </a:solidFill>
+        <a:round/>
+      </a:ln>
+    </cs:spPr>
+  </cs:dataPointWireframe>
+  <cs:dataTable>
+    <cs:lnRef idx="0"/>
+    <cs:fillRef idx="0"/>
+    <cs:effectRef idx="0"/>
+    <cs:fontRef idx="minor">
+      <a:schemeClr val="tx1">
+        <a:lumMod val="65000"/>
+        <a:lumOff val="35000"/>
+      </a:schemeClr>
+    </cs:fontRef>
+    <cs:spPr>
+      <a:noFill/>
+      <a:ln w="9525" cap="flat" cmpd="sng" algn="ctr">
+        <a:solidFill>
+          <a:schemeClr val="tx1">
+            <a:lumMod val="15000"/>
+            <a:lumOff val="85000"/>
+          </a:schemeClr>
+        </a:solidFill>
+        <a:round/>
+      </a:ln>
+    </cs:spPr>
+    <cs:defRPr sz="900" kern="1200"/>
+  </cs:dataTable>
+  <cs:downBar>
+    <cs:lnRef idx="0"/>
+    <cs:fillRef idx="0"/>
+    <cs:effectRef idx="0"/>
+    <cs:fontRef idx="minor">
+      <a:schemeClr val="dk1"/>
+    </cs:fontRef>
+    <cs:spPr>
+      <a:solidFill>
+        <a:schemeClr val="dk1">
+          <a:lumMod val="65000"/>
+          <a:lumOff val="35000"/>
+        </a:schemeClr>
+      </a:solidFill>
+      <a:ln w="9525">
+        <a:solidFill>
+          <a:schemeClr val="tx1">
+            <a:lumMod val="65000"/>
+            <a:lumOff val="35000"/>
+          </a:schemeClr>
+        </a:solidFill>
+      </a:ln>
+    </cs:spPr>
+  </cs:downBar>
+  <cs:dropLine>
+    <cs:lnRef idx="0"/>
+    <cs:fillRef idx="0"/>
+    <cs:effectRef idx="0"/>
+    <cs:fontRef idx="minor">
+      <a:schemeClr val="tx1"/>
+    </cs:fontRef>
+    <cs:spPr>
+      <a:ln w="9525" cap="flat" cmpd="sng" algn="ctr">
+        <a:solidFill>
+          <a:schemeClr val="tx1">
+            <a:lumMod val="35000"/>
+            <a:lumOff val="65000"/>
+          </a:schemeClr>
+        </a:solidFill>
+        <a:round/>
+      </a:ln>
+    </cs:spPr>
+  </cs:dropLine>
+  <cs:errorBar>
+    <cs:lnRef idx="0"/>
+    <cs:fillRef idx="0"/>
+    <cs:effectRef idx="0"/>
+    <cs:fontRef idx="minor">
+      <a:schemeClr val="tx1"/>
+    </cs:fontRef>
+    <cs:spPr>
+      <a:ln w="9525" cap="flat" cmpd="sng" algn="ctr">
+        <a:solidFill>
+          <a:schemeClr val="tx1">
+            <a:lumMod val="65000"/>
+            <a:lumOff val="35000"/>
+          </a:schemeClr>
+        </a:solidFill>
+        <a:round/>
+      </a:ln>
+    </cs:spPr>
+  </cs:errorBar>
+  <cs:floor>
+    <cs:lnRef idx="0"/>
+    <cs:fillRef idx="0"/>
+    <cs:effectRef idx="0"/>
+    <cs:fontRef idx="minor">
+      <a:schemeClr val="tx1"/>
+    </cs:fontRef>
+    <cs:spPr>
+      <a:noFill/>
+      <a:ln>
+        <a:noFill/>
+      </a:ln>
+    </cs:spPr>
+  </cs:floor>
+  <cs:gridlineMajor>
+    <cs:lnRef idx="0"/>
+    <cs:fillRef idx="0"/>
+    <cs:effectRef idx="0"/>
+    <cs:fontRef idx="minor">
+      <a:schemeClr val="tx1"/>
+    </cs:fontRef>
+    <cs:spPr>
+      <a:ln w="9525" cap="flat" cmpd="sng" algn="ctr">
+        <a:solidFill>
+          <a:schemeClr val="tx1">
+            <a:lumMod val="15000"/>
+            <a:lumOff val="85000"/>
+          </a:schemeClr>
+        </a:solidFill>
+        <a:round/>
+      </a:ln>
+    </cs:spPr>
+  </cs:gridlineMajor>
+  <cs:gridlineMinor>
+    <cs:lnRef idx="0"/>
+    <cs:fillRef idx="0"/>
+    <cs:effectRef idx="0"/>
+    <cs:fontRef idx="minor">
+      <a:schemeClr val="tx1"/>
+    </cs:fontRef>
+    <cs:spPr>
+      <a:ln w="9525" cap="flat" cmpd="sng" algn="ctr">
+        <a:solidFill>
+          <a:schemeClr val="tx1">
+            <a:lumMod val="5000"/>
+            <a:lumOff val="95000"/>
+          </a:schemeClr>
+        </a:solidFill>
+        <a:round/>
+      </a:ln>
+    </cs:spPr>
+  </cs:gridlineMinor>
+  <cs:hiLoLine>
+    <cs:lnRef idx="0"/>
+    <cs:fillRef idx="0"/>
+    <cs:effectRef idx="0"/>
+    <cs:fontRef idx="minor">
+      <a:schemeClr val="tx1"/>
+    </cs:fontRef>
+    <cs:spPr>
+      <a:ln w="9525" cap="flat" cmpd="sng" algn="ctr">
+        <a:solidFill>
+          <a:schemeClr val="tx1">
+            <a:lumMod val="75000"/>
+            <a:lumOff val="25000"/>
+          </a:schemeClr>
+        </a:solidFill>
+        <a:round/>
+      </a:ln>
+    </cs:spPr>
+  </cs:hiLoLine>
+  <cs:leaderLine>
+    <cs:lnRef idx="0"/>
+    <cs:fillRef idx="0"/>
+    <cs:effectRef idx="0"/>
+    <cs:fontRef idx="minor">
+      <a:schemeClr val="tx1"/>
+    </cs:fontRef>
+    <cs:spPr>
+      <a:ln w="9525" cap="flat" cmpd="sng" algn="ctr">
+        <a:solidFill>
+          <a:schemeClr val="tx1">
+            <a:lumMod val="35000"/>
+            <a:lumOff val="65000"/>
+          </a:schemeClr>
+        </a:solidFill>
+        <a:round/>
+      </a:ln>
+    </cs:spPr>
+  </cs:leaderLine>
+  <cs:legend>
+    <cs:lnRef idx="0"/>
+    <cs:fillRef idx="0"/>
+    <cs:effectRef idx="0"/>
+    <cs:fontRef idx="minor">
+      <a:schemeClr val="tx1">
+        <a:lumMod val="65000"/>
+        <a:lumOff val="35000"/>
+      </a:schemeClr>
+    </cs:fontRef>
+    <cs:defRPr sz="900" kern="1200"/>
+  </cs:legend>
+  <cs:plotArea mods="allowNoFillOverride allowNoLineOverride">
+    <cs:lnRef idx="0"/>
+    <cs:fillRef idx="0"/>
+    <cs:effectRef idx="0"/>
+    <cs:fontRef idx="minor">
+      <a:schemeClr val="tx1"/>
+    </cs:fontRef>
+  </cs:plotArea>
+  <cs:plotArea3D mods="allowNoFillOverride allowNoLineOverride">
+    <cs:lnRef idx="0"/>
+    <cs:fillRef idx="0"/>
+    <cs:effectRef idx="0"/>
+    <cs:fontRef idx="minor">
+      <a:schemeClr val="tx1"/>
+    </cs:fontRef>
+  </cs:plotArea3D>
+  <cs:seriesAxis>
+    <cs:lnRef idx="0"/>
+    <cs:fillRef idx="0"/>
+    <cs:effectRef idx="0"/>
+    <cs:fontRef idx="minor">
+      <a:schemeClr val="tx1">
+        <a:lumMod val="65000"/>
+        <a:lumOff val="35000"/>
+      </a:schemeClr>
+    </cs:fontRef>
+    <cs:defRPr sz="900" kern="1200"/>
+  </cs:seriesAxis>
+  <cs:seriesLine>
+    <cs:lnRef idx="0"/>
+    <cs:fillRef idx="0"/>
+    <cs:effectRef idx="0"/>
+    <cs:fontRef idx="minor">
+      <a:schemeClr val="tx1"/>
+    </cs:fontRef>
+    <cs:spPr>
+      <a:ln w="9525" cap="flat" cmpd="sng" algn="ctr">
+        <a:solidFill>
+          <a:schemeClr val="tx1">
+            <a:lumMod val="35000"/>
+            <a:lumOff val="65000"/>
+          </a:schemeClr>
+        </a:solidFill>
+        <a:round/>
+      </a:ln>
+    </cs:spPr>
+  </cs:seriesLine>
+  <cs:title>
+    <cs:lnRef idx="0"/>
+    <cs:fillRef idx="0"/>
+    <cs:effectRef idx="0"/>
+    <cs:fontRef idx="minor">
+      <a:schemeClr val="tx1">
+        <a:lumMod val="65000"/>
+        <a:lumOff val="35000"/>
+      </a:schemeClr>
+    </cs:fontRef>
+    <cs:defRPr sz="1400" b="0" kern="1200" spc="0" baseline="0"/>
+  </cs:title>
+  <cs:trendline>
+    <cs:lnRef idx="0">
+      <cs:styleClr val="auto"/>
+    </cs:lnRef>
+    <cs:fillRef idx="0"/>
+    <cs:effectRef idx="0"/>
+    <cs:fontRef idx="minor">
+      <a:schemeClr val="tx1"/>
+    </cs:fontRef>
+    <cs:spPr>
+      <a:ln w="19050" cap="rnd">
+        <a:solidFill>
+          <a:schemeClr val="phClr"/>
+        </a:solidFill>
+        <a:prstDash val="sysDot"/>
+      </a:ln>
+    </cs:spPr>
+  </cs:trendline>
+  <cs:trendlineLabel>
+    <cs:lnRef idx="0"/>
+    <cs:fillRef idx="0"/>
+    <cs:effectRef idx="0"/>
+    <cs:fontRef idx="minor">
+      <a:schemeClr val="tx1">
+        <a:lumMod val="65000"/>
+        <a:lumOff val="35000"/>
+      </a:schemeClr>
+    </cs:fontRef>
+    <cs:defRPr sz="900" kern="1200"/>
+  </cs:trendlineLabel>
+  <cs:upBar>
+    <cs:lnRef idx="0"/>
+    <cs:fillRef idx="0"/>
+    <cs:effectRef idx="0"/>
+    <cs:fontRef idx="minor">
+      <a:schemeClr val="dk1"/>
+    </cs:fontRef>
+    <cs:spPr>
+      <a:solidFill>
+        <a:schemeClr val="lt1"/>
+      </a:solidFill>
+      <a:ln w="9525">
+        <a:solidFill>
+          <a:schemeClr val="tx1">
+            <a:lumMod val="15000"/>
+            <a:lumOff val="85000"/>
+          </a:schemeClr>
+        </a:solidFill>
+      </a:ln>
+    </cs:spPr>
+  </cs:upBar>
+  <cs:valueAxis>
+    <cs:lnRef idx="0"/>
+    <cs:fillRef idx="0"/>
+    <cs:effectRef idx="0"/>
+    <cs:fontRef idx="minor">
+      <a:schemeClr val="tx1">
+        <a:lumMod val="65000"/>
+        <a:lumOff val="35000"/>
+      </a:schemeClr>
+    </cs:fontRef>
+    <cs:defRPr sz="900" kern="1200"/>
+  </cs:valueAxis>
+  <cs:wall>
+    <cs:lnRef idx="0"/>
+    <cs:fillRef idx="0"/>
+    <cs:effectRef idx="0"/>
+    <cs:fontRef idx="minor">
+      <a:schemeClr val="tx1"/>
+    </cs:fontRef>
+    <cs:spPr>
+      <a:noFill/>
+      <a:ln>
+        <a:noFill/>
+      </a:ln>
+    </cs:spPr>
+  </cs:wall>
+</cs:chartStyle>
+</file>
+
+<file path=ppt/charts/style3.xml><?xml version="1.0" encoding="utf-8"?>
+<cs:chartStyle xmlns:cs="http://schemas.microsoft.com/office/drawing/2012/chartStyle" xmlns:a="http://schemas.openxmlformats.org/drawingml/2006/main" id="227">
+  <cs:axisTitle>
+    <cs:lnRef idx="0"/>
+    <cs:fillRef idx="0"/>
+    <cs:effectRef idx="0"/>
+    <cs:fontRef idx="minor">
+      <a:schemeClr val="tx1">
+        <a:lumMod val="65000"/>
+        <a:lumOff val="35000"/>
+      </a:schemeClr>
+    </cs:fontRef>
+    <cs:defRPr sz="1000" kern="1200"/>
+  </cs:axisTitle>
+  <cs:categoryAxis>
+    <cs:lnRef idx="0"/>
+    <cs:fillRef idx="0"/>
+    <cs:effectRef idx="0"/>
+    <cs:fontRef idx="minor">
+      <a:schemeClr val="tx1">
+        <a:lumMod val="65000"/>
+        <a:lumOff val="35000"/>
+      </a:schemeClr>
+    </cs:fontRef>
+    <cs:spPr>
+      <a:ln w="9525" cap="flat" cmpd="sng" algn="ctr">
+        <a:solidFill>
+          <a:schemeClr val="tx1">
+            <a:lumMod val="15000"/>
+            <a:lumOff val="85000"/>
+          </a:schemeClr>
+        </a:solidFill>
+        <a:round/>
+      </a:ln>
+    </cs:spPr>
+    <cs:defRPr sz="900" kern="1200"/>
+  </cs:categoryAxis>
+  <cs:chartArea mods="allowNoFillOverride allowNoLineOverride">
+    <cs:lnRef idx="0"/>
+    <cs:fillRef idx="0"/>
+    <cs:effectRef idx="0"/>
+    <cs:fontRef idx="minor">
+      <a:schemeClr val="tx1"/>
+    </cs:fontRef>
+    <cs:spPr>
+      <a:solidFill>
+        <a:schemeClr val="bg1"/>
+      </a:solidFill>
+      <a:ln w="9525" cap="flat" cmpd="sng" algn="ctr">
+        <a:solidFill>
+          <a:schemeClr val="tx1">
+            <a:lumMod val="15000"/>
+            <a:lumOff val="85000"/>
+          </a:schemeClr>
+        </a:solidFill>
+        <a:round/>
+      </a:ln>
+    </cs:spPr>
+    <cs:defRPr sz="1000" kern="1200"/>
+  </cs:chartArea>
+  <cs:dataLabel>
+    <cs:lnRef idx="0"/>
+    <cs:fillRef idx="0"/>
+    <cs:effectRef idx="0"/>
+    <cs:fontRef idx="minor">
+      <a:schemeClr val="tx1">
+        <a:lumMod val="75000"/>
+        <a:lumOff val="25000"/>
+      </a:schemeClr>
+    </cs:fontRef>
+    <cs:defRPr sz="900" kern="1200"/>
+  </cs:dataLabel>
+  <cs:dataLabelCallout>
+    <cs:lnRef idx="0"/>
+    <cs:fillRef idx="0"/>
+    <cs:effectRef idx="0"/>
+    <cs:fontRef idx="minor">
+      <a:schemeClr val="dk1">
+        <a:lumMod val="65000"/>
+        <a:lumOff val="35000"/>
+      </a:schemeClr>
+    </cs:fontRef>
+    <cs:spPr>
+      <a:solidFill>
+        <a:schemeClr val="lt1"/>
+      </a:solidFill>
+      <a:ln>
+        <a:solidFill>
+          <a:schemeClr val="dk1">
+            <a:lumMod val="25000"/>
+            <a:lumOff val="75000"/>
+          </a:schemeClr>
+        </a:solidFill>
+      </a:ln>
+    </cs:spPr>
+    <cs:defRPr sz="900" kern="1200"/>
+    <cs:bodyPr rot="0" spcFirstLastPara="1" vertOverflow="clip" horzOverflow="clip" vert="horz" wrap="square" lIns="36576" tIns="18288" rIns="36576" bIns="18288" anchor="ctr" anchorCtr="1">
+      <a:spAutoFit/>
+    </cs:bodyPr>
+  </cs:dataLabelCallout>
+  <cs:dataPoint>
+    <cs:lnRef idx="0"/>
+    <cs:fillRef idx="1">
+      <cs:styleClr val="auto"/>
+    </cs:fillRef>
+    <cs:effectRef idx="0"/>
+    <cs:fontRef idx="minor">
+      <a:schemeClr val="tx1"/>
+    </cs:fontRef>
+    <cs:spPr>
+      <a:solidFill>
+        <a:schemeClr val="phClr"/>
+      </a:solidFill>
+    </cs:spPr>
+  </cs:dataPoint>
+  <cs:dataPoint3D>
+    <cs:lnRef idx="0"/>
+    <cs:fillRef idx="1">
+      <cs:styleClr val="auto"/>
+    </cs:fillRef>
+    <cs:effectRef idx="0"/>
+    <cs:fontRef idx="minor">
+      <a:schemeClr val="tx1"/>
+    </cs:fontRef>
+    <cs:spPr>
+      <a:solidFill>
+        <a:schemeClr val="phClr"/>
+      </a:solidFill>
+    </cs:spPr>
+  </cs:dataPoint3D>
+  <cs:dataPointLine>
+    <cs:lnRef idx="0">
+      <cs:styleClr val="auto"/>
+    </cs:lnRef>
+    <cs:fillRef idx="1"/>
+    <cs:effectRef idx="0"/>
+    <cs:fontRef idx="minor">
+      <a:schemeClr val="tx1"/>
+    </cs:fontRef>
+    <cs:spPr>
+      <a:ln w="28575" cap="rnd">
+        <a:solidFill>
+          <a:schemeClr val="phClr"/>
+        </a:solidFill>
+        <a:round/>
+      </a:ln>
+    </cs:spPr>
+  </cs:dataPointLine>
+  <cs:dataPointMarker>
+    <cs:lnRef idx="0">
+      <cs:styleClr val="auto"/>
+    </cs:lnRef>
+    <cs:fillRef idx="1">
+      <cs:styleClr val="auto"/>
+    </cs:fillRef>
+    <cs:effectRef idx="0"/>
+    <cs:fontRef idx="minor">
+      <a:schemeClr val="tx1"/>
+    </cs:fontRef>
+    <cs:spPr>
+      <a:solidFill>
+        <a:schemeClr val="phClr"/>
+      </a:solidFill>
+      <a:ln w="9525">
+        <a:solidFill>
+          <a:schemeClr val="phClr"/>
+        </a:solidFill>
+      </a:ln>
+    </cs:spPr>
+  </cs:dataPointMarker>
+  <cs:dataPointMarkerLayout symbol="circle" size="5"/>
+  <cs:dataPointWireframe>
+    <cs:lnRef idx="0">
+      <cs:styleClr val="auto"/>
+    </cs:lnRef>
+    <cs:fillRef idx="1"/>
+    <cs:effectRef idx="0"/>
+    <cs:fontRef idx="minor">
+      <a:schemeClr val="tx1"/>
+    </cs:fontRef>
+    <cs:spPr>
+      <a:ln w="9525" cap="rnd">
+        <a:solidFill>
+          <a:schemeClr val="phClr"/>
+        </a:solidFill>
+        <a:round/>
+      </a:ln>
+    </cs:spPr>
+  </cs:dataPointWireframe>
+  <cs:dataTable>
+    <cs:lnRef idx="0"/>
+    <cs:fillRef idx="0"/>
+    <cs:effectRef idx="0"/>
+    <cs:fontRef idx="minor">
+      <a:schemeClr val="tx1">
+        <a:lumMod val="65000"/>
+        <a:lumOff val="35000"/>
+      </a:schemeClr>
+    </cs:fontRef>
+    <cs:spPr>
+      <a:noFill/>
+      <a:ln w="9525" cap="flat" cmpd="sng" algn="ctr">
+        <a:solidFill>
+          <a:schemeClr val="tx1">
+            <a:lumMod val="15000"/>
+            <a:lumOff val="85000"/>
+          </a:schemeClr>
+        </a:solidFill>
+        <a:round/>
+      </a:ln>
+    </cs:spPr>
+    <cs:defRPr sz="900" kern="1200"/>
+  </cs:dataTable>
+  <cs:downBar>
+    <cs:lnRef idx="0"/>
+    <cs:fillRef idx="0"/>
+    <cs:effectRef idx="0"/>
+    <cs:fontRef idx="minor">
+      <a:schemeClr val="dk1"/>
+    </cs:fontRef>
+    <cs:spPr>
+      <a:solidFill>
+        <a:schemeClr val="dk1">
+          <a:lumMod val="65000"/>
+          <a:lumOff val="35000"/>
+        </a:schemeClr>
+      </a:solidFill>
+      <a:ln w="9525">
+        <a:solidFill>
+          <a:schemeClr val="tx1">
+            <a:lumMod val="65000"/>
+            <a:lumOff val="35000"/>
+          </a:schemeClr>
+        </a:solidFill>
+      </a:ln>
+    </cs:spPr>
+  </cs:downBar>
+  <cs:dropLine>
+    <cs:lnRef idx="0"/>
+    <cs:fillRef idx="0"/>
+    <cs:effectRef idx="0"/>
+    <cs:fontRef idx="minor">
+      <a:schemeClr val="tx1"/>
+    </cs:fontRef>
+    <cs:spPr>
+      <a:ln w="9525" cap="flat" cmpd="sng" algn="ctr">
+        <a:solidFill>
+          <a:schemeClr val="tx1">
+            <a:lumMod val="35000"/>
+            <a:lumOff val="65000"/>
+          </a:schemeClr>
+        </a:solidFill>
+        <a:round/>
+      </a:ln>
+    </cs:spPr>
+  </cs:dropLine>
+  <cs:errorBar>
+    <cs:lnRef idx="0"/>
+    <cs:fillRef idx="0"/>
+    <cs:effectRef idx="0"/>
+    <cs:fontRef idx="minor">
+      <a:schemeClr val="tx1"/>
+    </cs:fontRef>
+    <cs:spPr>
+      <a:ln w="9525" cap="flat" cmpd="sng" algn="ctr">
+        <a:solidFill>
+          <a:schemeClr val="tx1">
+            <a:lumMod val="65000"/>
+            <a:lumOff val="35000"/>
+          </a:schemeClr>
+        </a:solidFill>
+        <a:round/>
+      </a:ln>
+    </cs:spPr>
+  </cs:errorBar>
+  <cs:floor>
+    <cs:lnRef idx="0"/>
+    <cs:fillRef idx="0"/>
+    <cs:effectRef idx="0"/>
+    <cs:fontRef idx="minor">
+      <a:schemeClr val="tx1"/>
+    </cs:fontRef>
+    <cs:spPr>
+      <a:noFill/>
+      <a:ln>
+        <a:noFill/>
+      </a:ln>
+    </cs:spPr>
+  </cs:floor>
+  <cs:gridlineMajor>
+    <cs:lnRef idx="0"/>
+    <cs:fillRef idx="0"/>
+    <cs:effectRef idx="0"/>
+    <cs:fontRef idx="minor">
+      <a:schemeClr val="tx1"/>
+    </cs:fontRef>
+    <cs:spPr>
+      <a:ln w="9525" cap="flat" cmpd="sng" algn="ctr">
+        <a:solidFill>
+          <a:schemeClr val="tx1">
+            <a:lumMod val="15000"/>
+            <a:lumOff val="85000"/>
+          </a:schemeClr>
+        </a:solidFill>
+        <a:round/>
+      </a:ln>
+    </cs:spPr>
+  </cs:gridlineMajor>
+  <cs:gridlineMinor>
+    <cs:lnRef idx="0"/>
+    <cs:fillRef idx="0"/>
+    <cs:effectRef idx="0"/>
+    <cs:fontRef idx="minor">
+      <a:schemeClr val="tx1"/>
+    </cs:fontRef>
+    <cs:spPr>
+      <a:ln w="9525" cap="flat" cmpd="sng" algn="ctr">
+        <a:solidFill>
+          <a:schemeClr val="tx1">
+            <a:lumMod val="5000"/>
+            <a:lumOff val="95000"/>
+          </a:schemeClr>
+        </a:solidFill>
+        <a:round/>
+      </a:ln>
+    </cs:spPr>
+  </cs:gridlineMinor>
+  <cs:hiLoLine>
+    <cs:lnRef idx="0"/>
+    <cs:fillRef idx="0"/>
+    <cs:effectRef idx="0"/>
+    <cs:fontRef idx="minor">
+      <a:schemeClr val="tx1"/>
+    </cs:fontRef>
+    <cs:spPr>
+      <a:ln w="9525" cap="flat" cmpd="sng" algn="ctr">
+        <a:solidFill>
+          <a:schemeClr val="tx1">
+            <a:lumMod val="75000"/>
+            <a:lumOff val="25000"/>
+          </a:schemeClr>
+        </a:solidFill>
+        <a:round/>
+      </a:ln>
+    </cs:spPr>
+  </cs:hiLoLine>
+  <cs:leaderLine>
+    <cs:lnRef idx="0"/>
+    <cs:fillRef idx="0"/>
+    <cs:effectRef idx="0"/>
+    <cs:fontRef idx="minor">
+      <a:schemeClr val="tx1"/>
+    </cs:fontRef>
+    <cs:spPr>
+      <a:ln w="9525" cap="flat" cmpd="sng" algn="ctr">
+        <a:solidFill>
+          <a:schemeClr val="tx1">
+            <a:lumMod val="35000"/>
+            <a:lumOff val="65000"/>
+          </a:schemeClr>
+        </a:solidFill>
+        <a:round/>
+      </a:ln>
+    </cs:spPr>
+  </cs:leaderLine>
+  <cs:legend>
+    <cs:lnRef idx="0"/>
+    <cs:fillRef idx="0"/>
+    <cs:effectRef idx="0"/>
+    <cs:fontRef idx="minor">
+      <a:schemeClr val="tx1">
+        <a:lumMod val="65000"/>
+        <a:lumOff val="35000"/>
+      </a:schemeClr>
+    </cs:fontRef>
+    <cs:defRPr sz="900" kern="1200"/>
+  </cs:legend>
+  <cs:plotArea mods="allowNoFillOverride allowNoLineOverride">
+    <cs:lnRef idx="0"/>
+    <cs:fillRef idx="0"/>
+    <cs:effectRef idx="0"/>
+    <cs:fontRef idx="minor">
+      <a:schemeClr val="tx1"/>
+    </cs:fontRef>
+  </cs:plotArea>
+  <cs:plotArea3D mods="allowNoFillOverride allowNoLineOverride">
+    <cs:lnRef idx="0"/>
+    <cs:fillRef idx="0"/>
+    <cs:effectRef idx="0"/>
+    <cs:fontRef idx="minor">
+      <a:schemeClr val="tx1"/>
+    </cs:fontRef>
+  </cs:plotArea3D>
+  <cs:seriesAxis>
+    <cs:lnRef idx="0"/>
+    <cs:fillRef idx="0"/>
+    <cs:effectRef idx="0"/>
+    <cs:fontRef idx="minor">
+      <a:schemeClr val="tx1">
+        <a:lumMod val="65000"/>
+        <a:lumOff val="35000"/>
+      </a:schemeClr>
+    </cs:fontRef>
+    <cs:defRPr sz="900" kern="1200"/>
+  </cs:seriesAxis>
+  <cs:seriesLine>
+    <cs:lnRef idx="0"/>
+    <cs:fillRef idx="0"/>
+    <cs:effectRef idx="0"/>
+    <cs:fontRef idx="minor">
+      <a:schemeClr val="tx1"/>
+    </cs:fontRef>
+    <cs:spPr>
+      <a:ln w="9525" cap="flat" cmpd="sng" algn="ctr">
+        <a:solidFill>
+          <a:schemeClr val="tx1">
+            <a:lumMod val="35000"/>
+            <a:lumOff val="65000"/>
+          </a:schemeClr>
+        </a:solidFill>
+        <a:round/>
+      </a:ln>
+    </cs:spPr>
+  </cs:seriesLine>
+  <cs:title>
+    <cs:lnRef idx="0"/>
+    <cs:fillRef idx="0"/>
+    <cs:effectRef idx="0"/>
+    <cs:fontRef idx="minor">
+      <a:schemeClr val="tx1">
+        <a:lumMod val="65000"/>
+        <a:lumOff val="35000"/>
+      </a:schemeClr>
+    </cs:fontRef>
+    <cs:defRPr sz="1400" b="0" kern="1200" spc="0" baseline="0"/>
+  </cs:title>
+  <cs:trendline>
+    <cs:lnRef idx="0">
+      <cs:styleClr val="auto"/>
+    </cs:lnRef>
+    <cs:fillRef idx="0"/>
+    <cs:effectRef idx="0"/>
+    <cs:fontRef idx="minor">
+      <a:schemeClr val="tx1"/>
+    </cs:fontRef>
+    <cs:spPr>
+      <a:ln w="19050" cap="rnd">
+        <a:solidFill>
+          <a:schemeClr val="phClr"/>
+        </a:solidFill>
+        <a:prstDash val="sysDot"/>
+      </a:ln>
+    </cs:spPr>
+  </cs:trendline>
+  <cs:trendlineLabel>
+    <cs:lnRef idx="0"/>
+    <cs:fillRef idx="0"/>
+    <cs:effectRef idx="0"/>
+    <cs:fontRef idx="minor">
+      <a:schemeClr val="tx1">
+        <a:lumMod val="65000"/>
+        <a:lumOff val="35000"/>
+      </a:schemeClr>
+    </cs:fontRef>
+    <cs:defRPr sz="900" kern="1200"/>
+  </cs:trendlineLabel>
+  <cs:upBar>
+    <cs:lnRef idx="0"/>
+    <cs:fillRef idx="0"/>
+    <cs:effectRef idx="0"/>
+    <cs:fontRef idx="minor">
+      <a:schemeClr val="dk1"/>
+    </cs:fontRef>
+    <cs:spPr>
+      <a:solidFill>
+        <a:schemeClr val="lt1"/>
+      </a:solidFill>
+      <a:ln w="9525">
+        <a:solidFill>
+          <a:schemeClr val="tx1">
+            <a:lumMod val="15000"/>
+            <a:lumOff val="85000"/>
+          </a:schemeClr>
+        </a:solidFill>
+      </a:ln>
+    </cs:spPr>
+  </cs:upBar>
+  <cs:valueAxis>
+    <cs:lnRef idx="0"/>
+    <cs:fillRef idx="0"/>
+    <cs:effectRef idx="0"/>
+    <cs:fontRef idx="minor">
+      <a:schemeClr val="tx1">
+        <a:lumMod val="65000"/>
+        <a:lumOff val="35000"/>
+      </a:schemeClr>
+    </cs:fontRef>
+    <cs:defRPr sz="900" kern="1200"/>
+  </cs:valueAxis>
+  <cs:wall>
+    <cs:lnRef idx="0"/>
+    <cs:fillRef idx="0"/>
+    <cs:effectRef idx="0"/>
+    <cs:fontRef idx="minor">
+      <a:schemeClr val="tx1"/>
+    </cs:fontRef>
+    <cs:spPr>
+      <a:noFill/>
+      <a:ln>
+        <a:noFill/>
+      </a:ln>
+    </cs:spPr>
+  </cs:wall>
+</cs:chartStyle>
+</file>
+
 <file path=ppt/notesMasters/notesMaster1.xml><?xml version="1.0" encoding="utf-8"?>
 <p:notesMaster xmlns:a="http://schemas.openxmlformats.org/drawingml/2006/main" xmlns:r="http://schemas.openxmlformats.org/officeDocument/2006/relationships" xmlns:p="http://schemas.openxmlformats.org/presentationml/2006/main">
   <p:cSld>
@@ -374,7 +3804,7 @@
           <a:p>
             <a:fld id="{E974C25D-0E4C-444C-B808-2243600218A3}" type="slidenum">
               <a:rPr lang="en-GB" smtClean="0"/>
-              <a:t>‹Nr.›</a:t>
+              <a:t>‹#›</a:t>
             </a:fld>
             <a:endParaRPr lang="en-GB"/>
           </a:p>
@@ -770,7 +4200,7 @@
           <a:p>
             <a:fld id="{EBB296B4-2820-4885-8A7F-8D02529B27C3}" type="slidenum">
               <a:rPr lang="en-GB" smtClean="0"/>
-              <a:t>‹Nr.›</a:t>
+              <a:t>‹#›</a:t>
             </a:fld>
             <a:endParaRPr lang="en-GB"/>
           </a:p>
@@ -970,7 +4400,7 @@
           <a:p>
             <a:fld id="{EBB296B4-2820-4885-8A7F-8D02529B27C3}" type="slidenum">
               <a:rPr lang="en-GB" smtClean="0"/>
-              <a:t>‹Nr.›</a:t>
+              <a:t>‹#›</a:t>
             </a:fld>
             <a:endParaRPr lang="en-GB"/>
           </a:p>
@@ -1180,7 +4610,7 @@
           <a:p>
             <a:fld id="{EBB296B4-2820-4885-8A7F-8D02529B27C3}" type="slidenum">
               <a:rPr lang="en-GB" smtClean="0"/>
-              <a:t>‹Nr.›</a:t>
+              <a:t>‹#›</a:t>
             </a:fld>
             <a:endParaRPr lang="en-GB"/>
           </a:p>
@@ -1380,7 +4810,7 @@
           <a:p>
             <a:fld id="{EBB296B4-2820-4885-8A7F-8D02529B27C3}" type="slidenum">
               <a:rPr lang="en-GB" smtClean="0"/>
-              <a:t>‹Nr.›</a:t>
+              <a:t>‹#›</a:t>
             </a:fld>
             <a:endParaRPr lang="en-GB"/>
           </a:p>
@@ -1656,7 +5086,7 @@
           <a:p>
             <a:fld id="{EBB296B4-2820-4885-8A7F-8D02529B27C3}" type="slidenum">
               <a:rPr lang="en-GB" smtClean="0"/>
-              <a:t>‹Nr.›</a:t>
+              <a:t>‹#›</a:t>
             </a:fld>
             <a:endParaRPr lang="en-GB"/>
           </a:p>
@@ -1924,7 +5354,7 @@
           <a:p>
             <a:fld id="{EBB296B4-2820-4885-8A7F-8D02529B27C3}" type="slidenum">
               <a:rPr lang="en-GB" smtClean="0"/>
-              <a:t>‹Nr.›</a:t>
+              <a:t>‹#›</a:t>
             </a:fld>
             <a:endParaRPr lang="en-GB"/>
           </a:p>
@@ -2339,7 +5769,7 @@
           <a:p>
             <a:fld id="{EBB296B4-2820-4885-8A7F-8D02529B27C3}" type="slidenum">
               <a:rPr lang="en-GB" smtClean="0"/>
-              <a:t>‹Nr.›</a:t>
+              <a:t>‹#›</a:t>
             </a:fld>
             <a:endParaRPr lang="en-GB"/>
           </a:p>
@@ -2481,7 +5911,7 @@
           <a:p>
             <a:fld id="{EBB296B4-2820-4885-8A7F-8D02529B27C3}" type="slidenum">
               <a:rPr lang="en-GB" smtClean="0"/>
-              <a:t>‹Nr.›</a:t>
+              <a:t>‹#›</a:t>
             </a:fld>
             <a:endParaRPr lang="en-GB"/>
           </a:p>
@@ -2594,7 +6024,7 @@
           <a:p>
             <a:fld id="{EBB296B4-2820-4885-8A7F-8D02529B27C3}" type="slidenum">
               <a:rPr lang="en-GB" smtClean="0"/>
-              <a:t>‹Nr.›</a:t>
+              <a:t>‹#›</a:t>
             </a:fld>
             <a:endParaRPr lang="en-GB"/>
           </a:p>
@@ -2907,7 +6337,7 @@
           <a:p>
             <a:fld id="{EBB296B4-2820-4885-8A7F-8D02529B27C3}" type="slidenum">
               <a:rPr lang="en-GB" smtClean="0"/>
-              <a:t>‹Nr.›</a:t>
+              <a:t>‹#›</a:t>
             </a:fld>
             <a:endParaRPr lang="en-GB"/>
           </a:p>
@@ -3196,7 +6626,7 @@
           <a:p>
             <a:fld id="{EBB296B4-2820-4885-8A7F-8D02529B27C3}" type="slidenum">
               <a:rPr lang="en-GB" smtClean="0"/>
-              <a:t>‹Nr.›</a:t>
+              <a:t>‹#›</a:t>
             </a:fld>
             <a:endParaRPr lang="en-GB"/>
           </a:p>
@@ -3475,7 +6905,7 @@
           <a:p>
             <a:fld id="{EBB296B4-2820-4885-8A7F-8D02529B27C3}" type="slidenum">
               <a:rPr lang="en-GB" smtClean="0"/>
-              <a:t>‹Nr.›</a:t>
+              <a:t>‹#›</a:t>
             </a:fld>
             <a:endParaRPr lang="en-GB"/>
           </a:p>
@@ -6282,196 +9712,6 @@
           <a:chExt cx="0" cy="0"/>
         </a:xfrm>
       </p:grpSpPr>
-      <p:sp>
-        <p:nvSpPr>
-          <p:cNvPr id="2" name="Title 1">
-            <a:extLst>
-              <a:ext uri="{FF2B5EF4-FFF2-40B4-BE49-F238E27FC236}">
-                <a16:creationId xmlns:a16="http://schemas.microsoft.com/office/drawing/2014/main" id="{53E3ADC3-4892-4BBF-B1DD-E02B7C39F61E}"/>
-              </a:ext>
-            </a:extLst>
-          </p:cNvPr>
-          <p:cNvSpPr>
-            <a:spLocks noGrp="1"/>
-          </p:cNvSpPr>
-          <p:nvPr>
-            <p:ph type="title"/>
-          </p:nvPr>
-        </p:nvSpPr>
-        <p:spPr>
-          <a:xfrm>
-            <a:off x="838200" y="973633"/>
-            <a:ext cx="10515600" cy="720304"/>
-          </a:xfrm>
-        </p:spPr>
-        <p:txBody>
-          <a:bodyPr/>
-          <a:lstStyle/>
-          <a:p>
-            <a:r>
-              <a:rPr lang="de-CH" u="sng" dirty="0" err="1"/>
-              <a:t>Metrics</a:t>
-            </a:r>
-            <a:endParaRPr lang="en-GB" u="sng" dirty="0"/>
-          </a:p>
-        </p:txBody>
-      </p:sp>
-      <p:sp>
-        <p:nvSpPr>
-          <p:cNvPr id="3" name="Content Placeholder 2">
-            <a:extLst>
-              <a:ext uri="{FF2B5EF4-FFF2-40B4-BE49-F238E27FC236}">
-                <a16:creationId xmlns:a16="http://schemas.microsoft.com/office/drawing/2014/main" id="{09009B8B-DD7D-4793-A3B6-127BE4759BB3}"/>
-              </a:ext>
-            </a:extLst>
-          </p:cNvPr>
-          <p:cNvSpPr>
-            <a:spLocks noGrp="1"/>
-          </p:cNvSpPr>
-          <p:nvPr>
-            <p:ph idx="1"/>
-          </p:nvPr>
-        </p:nvSpPr>
-        <p:spPr>
-          <a:xfrm>
-            <a:off x="838200" y="1693937"/>
-            <a:ext cx="5945554" cy="4992613"/>
-          </a:xfrm>
-        </p:spPr>
-        <p:txBody>
-          <a:bodyPr>
-            <a:normAutofit/>
-          </a:bodyPr>
-          <a:lstStyle/>
-          <a:p>
-            <a:r>
-              <a:rPr lang="de-CH" dirty="0"/>
-              <a:t>Lines </a:t>
-            </a:r>
-            <a:r>
-              <a:rPr lang="de-CH" dirty="0" err="1"/>
-              <a:t>of</a:t>
-            </a:r>
-            <a:r>
-              <a:rPr lang="de-CH" dirty="0"/>
-              <a:t> Code</a:t>
-            </a:r>
-          </a:p>
-          <a:p>
-            <a:pPr lvl="1"/>
-            <a:r>
-              <a:rPr lang="de-CH" sz="2000" dirty="0"/>
-              <a:t>Mit </a:t>
-            </a:r>
-            <a:r>
-              <a:rPr lang="en-GB" sz="2000" dirty="0" err="1"/>
-              <a:t>MetricsReloaded</a:t>
-            </a:r>
-            <a:r>
-              <a:rPr lang="en-GB" sz="2000" dirty="0"/>
-              <a:t> </a:t>
-            </a:r>
-            <a:r>
-              <a:rPr lang="en-GB" sz="2000" dirty="0" err="1"/>
-              <a:t>bestummen</a:t>
-            </a:r>
-            <a:endParaRPr lang="de-CH" sz="2000" dirty="0"/>
-          </a:p>
-          <a:p>
-            <a:pPr lvl="1"/>
-            <a:r>
-              <a:rPr lang="de-CH" sz="2000" dirty="0"/>
-              <a:t>Max 60 Character pro Zeile</a:t>
-            </a:r>
-          </a:p>
-          <a:p>
-            <a:pPr lvl="1"/>
-            <a:r>
-              <a:rPr lang="de-CH" sz="2000" dirty="0"/>
-              <a:t>Max 200 Zeilen pro Methode</a:t>
-            </a:r>
-          </a:p>
-          <a:p>
-            <a:pPr lvl="1"/>
-            <a:r>
-              <a:rPr lang="de-CH" sz="2000" dirty="0"/>
-              <a:t>Max 400 Zeilen pro Klasse</a:t>
-            </a:r>
-            <a:endParaRPr lang="en-GB" sz="2000" dirty="0"/>
-          </a:p>
-          <a:p>
-            <a:r>
-              <a:rPr lang="en-GB" dirty="0"/>
-              <a:t>Tight Class Cohesion</a:t>
-            </a:r>
-          </a:p>
-          <a:p>
-            <a:pPr lvl="1"/>
-            <a:r>
-              <a:rPr lang="de-CH" sz="2000" dirty="0"/>
-              <a:t>Bestimmt die Komplexität einer Klasse</a:t>
-            </a:r>
-          </a:p>
-          <a:p>
-            <a:pPr lvl="1"/>
-            <a:r>
-              <a:rPr lang="de-CH" sz="2000" dirty="0"/>
-              <a:t>Min &lt; Average &lt; Max</a:t>
-            </a:r>
-          </a:p>
-          <a:p>
-            <a:r>
-              <a:rPr lang="en-GB" dirty="0"/>
-              <a:t>Javadoc lines per method </a:t>
-            </a:r>
-          </a:p>
-          <a:p>
-            <a:pPr lvl="1"/>
-            <a:r>
-              <a:rPr lang="de-CH" sz="2000" dirty="0"/>
-              <a:t>Beschreibt wie lange eine </a:t>
-            </a:r>
-            <a:r>
-              <a:rPr lang="de-CH" sz="2000" dirty="0" err="1"/>
-              <a:t>JavaDoc</a:t>
-            </a:r>
-            <a:r>
-              <a:rPr lang="de-CH" sz="2000" dirty="0"/>
-              <a:t> sein soll</a:t>
-            </a:r>
-          </a:p>
-          <a:p>
-            <a:pPr lvl="1"/>
-            <a:r>
-              <a:rPr lang="de-CH" sz="2000" dirty="0"/>
-              <a:t>0: Keine </a:t>
-            </a:r>
-            <a:r>
-              <a:rPr lang="de-CH" sz="2000" dirty="0" err="1"/>
-              <a:t>JavaDoc</a:t>
-            </a:r>
-            <a:endParaRPr lang="de-CH" sz="2000" dirty="0"/>
-          </a:p>
-          <a:p>
-            <a:pPr lvl="1"/>
-            <a:r>
-              <a:rPr lang="de-CH" sz="2000" dirty="0"/>
-              <a:t>&lt;30: Nicht genügend für komplexe Methoden</a:t>
-            </a:r>
-          </a:p>
-          <a:p>
-            <a:pPr lvl="1"/>
-            <a:r>
-              <a:rPr lang="de-CH" sz="2000" dirty="0"/>
-              <a:t>&gt;70: Zuviel für einfachere Methoden</a:t>
-            </a:r>
-          </a:p>
-          <a:p>
-            <a:pPr lvl="1"/>
-            <a:endParaRPr lang="de-CH" dirty="0"/>
-          </a:p>
-        </p:txBody>
-      </p:sp>
       <p:cxnSp>
         <p:nvCxnSpPr>
           <p:cNvPr id="6" name="Straight Connector 5">
@@ -6573,53 +9813,36 @@
           </a:p>
         </p:txBody>
       </p:sp>
-      <p:pic>
-        <p:nvPicPr>
-          <p:cNvPr id="1026" name="Picture 2">
-            <a:extLst>
-              <a:ext uri="{FF2B5EF4-FFF2-40B4-BE49-F238E27FC236}">
-                <a16:creationId xmlns:a16="http://schemas.microsoft.com/office/drawing/2014/main" id="{32531B2B-7320-44E3-9DC1-2E8E1ADBAC06}"/>
-              </a:ext>
-            </a:extLst>
-          </p:cNvPr>
-          <p:cNvPicPr>
-            <a:picLocks noChangeAspect="1" noChangeArrowheads="1"/>
-          </p:cNvPicPr>
-          <p:nvPr/>
-        </p:nvPicPr>
-        <p:blipFill>
-          <a:blip r:embed="rId2">
-            <a:extLst>
-              <a:ext uri="{28A0092B-C50C-407E-A947-70E740481C1C}">
-                <a14:useLocalDpi xmlns:a14="http://schemas.microsoft.com/office/drawing/2010/main" val="0"/>
-              </a:ext>
-            </a:extLst>
-          </a:blip>
-          <a:srcRect/>
-          <a:stretch>
-            <a:fillRect/>
-          </a:stretch>
-        </p:blipFill>
-        <p:spPr bwMode="auto">
-          <a:xfrm>
-            <a:off x="7786687" y="1115354"/>
-            <a:ext cx="3567113" cy="5571196"/>
-          </a:xfrm>
-          <a:prstGeom prst="rect">
-            <a:avLst/>
-          </a:prstGeom>
-          <a:noFill/>
-          <a:extLst>
-            <a:ext uri="{909E8E84-426E-40DD-AFC4-6F175D3DCCD1}">
-              <a14:hiddenFill xmlns:a14="http://schemas.microsoft.com/office/drawing/2010/main">
-                <a:solidFill>
-                  <a:srgbClr val="FFFFFF"/>
-                </a:solidFill>
-              </a14:hiddenFill>
-            </a:ext>
-          </a:extLst>
-        </p:spPr>
-      </p:pic>
+      <p:graphicFrame>
+        <p:nvGraphicFramePr>
+          <p:cNvPr id="9" name="Chart 8">
+            <a:extLst>
+              <a:ext uri="{FF2B5EF4-FFF2-40B4-BE49-F238E27FC236}">
+                <a16:creationId xmlns:a16="http://schemas.microsoft.com/office/drawing/2014/main" id="{1A6DDEB4-E324-4761-8615-B54EA21CD69F}"/>
+              </a:ext>
+            </a:extLst>
+          </p:cNvPr>
+          <p:cNvGraphicFramePr>
+            <a:graphicFrameLocks/>
+          </p:cNvGraphicFramePr>
+          <p:nvPr>
+            <p:extLst>
+              <p:ext uri="{D42A27DB-BD31-4B8C-83A1-F6EECF244321}">
+                <p14:modId xmlns:p14="http://schemas.microsoft.com/office/powerpoint/2010/main" val="116040969"/>
+              </p:ext>
+            </p:extLst>
+          </p:nvPr>
+        </p:nvGraphicFramePr>
+        <p:xfrm>
+          <a:off x="3873374" y="1948990"/>
+          <a:ext cx="4445251" cy="2960019"/>
+        </p:xfrm>
+        <a:graphic>
+          <a:graphicData uri="http://schemas.openxmlformats.org/drawingml/2006/chart">
+            <c:chart xmlns:c="http://schemas.openxmlformats.org/drawingml/2006/chart" xmlns:r="http://schemas.openxmlformats.org/officeDocument/2006/relationships" r:id="rId2"/>
+          </a:graphicData>
+        </a:graphic>
+      </p:graphicFrame>
     </p:spTree>
     <p:extLst>
       <p:ext uri="{BB962C8B-B14F-4D97-AF65-F5344CB8AC3E}">
@@ -6650,6 +9873,363 @@
           <a:chExt cx="0" cy="0"/>
         </a:xfrm>
       </p:grpSpPr>
+      <p:cxnSp>
+        <p:nvCxnSpPr>
+          <p:cNvPr id="6" name="Straight Connector 5">
+            <a:extLst>
+              <a:ext uri="{FF2B5EF4-FFF2-40B4-BE49-F238E27FC236}">
+                <a16:creationId xmlns:a16="http://schemas.microsoft.com/office/drawing/2014/main" id="{79BBC210-9E9C-4C91-B5E1-2DC7B5AC2148}"/>
+              </a:ext>
+            </a:extLst>
+          </p:cNvPr>
+          <p:cNvCxnSpPr>
+            <a:cxnSpLocks/>
+          </p:cNvCxnSpPr>
+          <p:nvPr/>
+        </p:nvCxnSpPr>
+        <p:spPr>
+          <a:xfrm>
+            <a:off x="838200" y="922215"/>
+            <a:ext cx="10515600" cy="0"/>
+          </a:xfrm>
+          <a:prstGeom prst="line">
+            <a:avLst/>
+          </a:prstGeom>
+          <a:ln>
+            <a:solidFill>
+              <a:schemeClr val="tx1"/>
+            </a:solidFill>
+          </a:ln>
+        </p:spPr>
+        <p:style>
+          <a:lnRef idx="3">
+            <a:schemeClr val="dk1"/>
+          </a:lnRef>
+          <a:fillRef idx="0">
+            <a:schemeClr val="dk1"/>
+          </a:fillRef>
+          <a:effectRef idx="2">
+            <a:schemeClr val="dk1"/>
+          </a:effectRef>
+          <a:fontRef idx="minor">
+            <a:schemeClr val="tx1"/>
+          </a:fontRef>
+        </p:style>
+      </p:cxnSp>
+      <p:sp>
+        <p:nvSpPr>
+          <p:cNvPr id="7" name="Title 1">
+            <a:extLst>
+              <a:ext uri="{FF2B5EF4-FFF2-40B4-BE49-F238E27FC236}">
+                <a16:creationId xmlns:a16="http://schemas.microsoft.com/office/drawing/2014/main" id="{58ADC005-0F06-4240-96FB-324B87559EB0}"/>
+              </a:ext>
+            </a:extLst>
+          </p:cNvPr>
+          <p:cNvSpPr txBox="1">
+            <a:spLocks/>
+          </p:cNvSpPr>
+          <p:nvPr/>
+        </p:nvSpPr>
+        <p:spPr>
+          <a:xfrm>
+            <a:off x="838200" y="304801"/>
+            <a:ext cx="9144000" cy="789354"/>
+          </a:xfrm>
+          <a:prstGeom prst="rect">
+            <a:avLst/>
+          </a:prstGeom>
+        </p:spPr>
+        <p:txBody>
+          <a:bodyPr vert="horz" lIns="91440" tIns="45720" rIns="91440" bIns="45720" rtlCol="0" anchor="ctr">
+            <a:normAutofit fontScale="97500" lnSpcReduction="10000"/>
+          </a:bodyPr>
+          <a:lstStyle>
+            <a:lvl1pPr algn="l" defTabSz="914400" rtl="0" eaLnBrk="1" latinLnBrk="0" hangingPunct="1">
+              <a:lnSpc>
+                <a:spcPct val="90000"/>
+              </a:lnSpc>
+              <a:spcBef>
+                <a:spcPct val="0"/>
+              </a:spcBef>
+              <a:buNone/>
+              <a:defRPr sz="4400" kern="1200">
+                <a:solidFill>
+                  <a:schemeClr val="tx1"/>
+                </a:solidFill>
+                <a:latin typeface="+mj-lt"/>
+                <a:ea typeface="+mj-ea"/>
+                <a:cs typeface="+mj-cs"/>
+              </a:defRPr>
+            </a:lvl1pPr>
+          </a:lstStyle>
+          <a:p>
+            <a:r>
+              <a:rPr lang="en-GB" sz="5400" b="1" i="0" dirty="0">
+                <a:effectLst/>
+                <a:latin typeface="Roboto" panose="02000000000000000000" pitchFamily="2" charset="0"/>
+              </a:rPr>
+              <a:t>QA</a:t>
+            </a:r>
+            <a:endParaRPr lang="en-GB" sz="21500" b="1" dirty="0"/>
+          </a:p>
+        </p:txBody>
+      </p:sp>
+      <p:graphicFrame>
+        <p:nvGraphicFramePr>
+          <p:cNvPr id="9" name="Chart 8">
+            <a:extLst>
+              <a:ext uri="{FF2B5EF4-FFF2-40B4-BE49-F238E27FC236}">
+                <a16:creationId xmlns:a16="http://schemas.microsoft.com/office/drawing/2014/main" id="{FB7CFE9C-AF91-4B0C-8A59-8E1B9257B031}"/>
+              </a:ext>
+            </a:extLst>
+          </p:cNvPr>
+          <p:cNvGraphicFramePr>
+            <a:graphicFrameLocks/>
+          </p:cNvGraphicFramePr>
+          <p:nvPr>
+            <p:extLst>
+              <p:ext uri="{D42A27DB-BD31-4B8C-83A1-F6EECF244321}">
+                <p14:modId xmlns:p14="http://schemas.microsoft.com/office/powerpoint/2010/main" val="2284637915"/>
+              </p:ext>
+            </p:extLst>
+          </p:nvPr>
+        </p:nvGraphicFramePr>
+        <p:xfrm>
+          <a:off x="1220519" y="2009775"/>
+          <a:ext cx="3848100" cy="2838450"/>
+        </p:xfrm>
+        <a:graphic>
+          <a:graphicData uri="http://schemas.openxmlformats.org/drawingml/2006/chart">
+            <c:chart xmlns:c="http://schemas.openxmlformats.org/drawingml/2006/chart" xmlns:r="http://schemas.openxmlformats.org/officeDocument/2006/relationships" r:id="rId2"/>
+          </a:graphicData>
+        </a:graphic>
+      </p:graphicFrame>
+      <p:graphicFrame>
+        <p:nvGraphicFramePr>
+          <p:cNvPr id="10" name="Chart 9">
+            <a:extLst>
+              <a:ext uri="{FF2B5EF4-FFF2-40B4-BE49-F238E27FC236}">
+                <a16:creationId xmlns:a16="http://schemas.microsoft.com/office/drawing/2014/main" id="{FB7CFE9C-AF91-4B0C-8A59-8E1B9257B031}"/>
+              </a:ext>
+            </a:extLst>
+          </p:cNvPr>
+          <p:cNvGraphicFramePr/>
+          <p:nvPr>
+            <p:extLst>
+              <p:ext uri="{D42A27DB-BD31-4B8C-83A1-F6EECF244321}">
+                <p14:modId xmlns:p14="http://schemas.microsoft.com/office/powerpoint/2010/main" val="238175837"/>
+              </p:ext>
+            </p:extLst>
+          </p:nvPr>
+        </p:nvGraphicFramePr>
+        <p:xfrm>
+          <a:off x="7123383" y="2010239"/>
+          <a:ext cx="3848100" cy="2838450"/>
+        </p:xfrm>
+        <a:graphic>
+          <a:graphicData uri="http://schemas.openxmlformats.org/drawingml/2006/chart">
+            <c:chart xmlns:c="http://schemas.openxmlformats.org/drawingml/2006/chart" xmlns:r="http://schemas.openxmlformats.org/officeDocument/2006/relationships" r:id="rId3"/>
+          </a:graphicData>
+        </a:graphic>
+      </p:graphicFrame>
+    </p:spTree>
+    <p:extLst>
+      <p:ext uri="{BB962C8B-B14F-4D97-AF65-F5344CB8AC3E}">
+        <p14:creationId xmlns:p14="http://schemas.microsoft.com/office/powerpoint/2010/main" val="3567032271"/>
+      </p:ext>
+    </p:extLst>
+  </p:cSld>
+  <p:clrMapOvr>
+    <a:masterClrMapping/>
+  </p:clrMapOvr>
+</p:sld>
+</file>
+
+<file path=ppt/slides/slide17.xml><?xml version="1.0" encoding="utf-8"?>
+<p:sld xmlns:a="http://schemas.openxmlformats.org/drawingml/2006/main" xmlns:r="http://schemas.openxmlformats.org/officeDocument/2006/relationships" xmlns:p="http://schemas.openxmlformats.org/presentationml/2006/main">
+  <p:cSld>
+    <p:spTree>
+      <p:nvGrpSpPr>
+        <p:cNvPr id="1" name=""/>
+        <p:cNvGrpSpPr/>
+        <p:nvPr/>
+      </p:nvGrpSpPr>
+      <p:grpSpPr>
+        <a:xfrm>
+          <a:off x="0" y="0"/>
+          <a:ext cx="0" cy="0"/>
+          <a:chOff x="0" y="0"/>
+          <a:chExt cx="0" cy="0"/>
+        </a:xfrm>
+      </p:grpSpPr>
+      <p:cxnSp>
+        <p:nvCxnSpPr>
+          <p:cNvPr id="6" name="Straight Connector 5">
+            <a:extLst>
+              <a:ext uri="{FF2B5EF4-FFF2-40B4-BE49-F238E27FC236}">
+                <a16:creationId xmlns:a16="http://schemas.microsoft.com/office/drawing/2014/main" id="{79BBC210-9E9C-4C91-B5E1-2DC7B5AC2148}"/>
+              </a:ext>
+            </a:extLst>
+          </p:cNvPr>
+          <p:cNvCxnSpPr>
+            <a:cxnSpLocks/>
+          </p:cNvCxnSpPr>
+          <p:nvPr/>
+        </p:nvCxnSpPr>
+        <p:spPr>
+          <a:xfrm>
+            <a:off x="838200" y="922215"/>
+            <a:ext cx="10515600" cy="0"/>
+          </a:xfrm>
+          <a:prstGeom prst="line">
+            <a:avLst/>
+          </a:prstGeom>
+          <a:ln>
+            <a:solidFill>
+              <a:schemeClr val="tx1"/>
+            </a:solidFill>
+          </a:ln>
+        </p:spPr>
+        <p:style>
+          <a:lnRef idx="3">
+            <a:schemeClr val="dk1"/>
+          </a:lnRef>
+          <a:fillRef idx="0">
+            <a:schemeClr val="dk1"/>
+          </a:fillRef>
+          <a:effectRef idx="2">
+            <a:schemeClr val="dk1"/>
+          </a:effectRef>
+          <a:fontRef idx="minor">
+            <a:schemeClr val="tx1"/>
+          </a:fontRef>
+        </p:style>
+      </p:cxnSp>
+      <p:sp>
+        <p:nvSpPr>
+          <p:cNvPr id="7" name="Title 1">
+            <a:extLst>
+              <a:ext uri="{FF2B5EF4-FFF2-40B4-BE49-F238E27FC236}">
+                <a16:creationId xmlns:a16="http://schemas.microsoft.com/office/drawing/2014/main" id="{58ADC005-0F06-4240-96FB-324B87559EB0}"/>
+              </a:ext>
+            </a:extLst>
+          </p:cNvPr>
+          <p:cNvSpPr txBox="1">
+            <a:spLocks/>
+          </p:cNvSpPr>
+          <p:nvPr/>
+        </p:nvSpPr>
+        <p:spPr>
+          <a:xfrm>
+            <a:off x="838200" y="304801"/>
+            <a:ext cx="9144000" cy="789354"/>
+          </a:xfrm>
+          <a:prstGeom prst="rect">
+            <a:avLst/>
+          </a:prstGeom>
+        </p:spPr>
+        <p:txBody>
+          <a:bodyPr vert="horz" lIns="91440" tIns="45720" rIns="91440" bIns="45720" rtlCol="0" anchor="ctr">
+            <a:normAutofit fontScale="97500" lnSpcReduction="10000"/>
+          </a:bodyPr>
+          <a:lstStyle>
+            <a:lvl1pPr algn="l" defTabSz="914400" rtl="0" eaLnBrk="1" latinLnBrk="0" hangingPunct="1">
+              <a:lnSpc>
+                <a:spcPct val="90000"/>
+              </a:lnSpc>
+              <a:spcBef>
+                <a:spcPct val="0"/>
+              </a:spcBef>
+              <a:buNone/>
+              <a:defRPr sz="4400" kern="1200">
+                <a:solidFill>
+                  <a:schemeClr val="tx1"/>
+                </a:solidFill>
+                <a:latin typeface="+mj-lt"/>
+                <a:ea typeface="+mj-ea"/>
+                <a:cs typeface="+mj-cs"/>
+              </a:defRPr>
+            </a:lvl1pPr>
+          </a:lstStyle>
+          <a:p>
+            <a:r>
+              <a:rPr lang="en-GB" sz="5400" b="1" i="0" dirty="0">
+                <a:effectLst/>
+                <a:latin typeface="Roboto" panose="02000000000000000000" pitchFamily="2" charset="0"/>
+              </a:rPr>
+              <a:t>QA</a:t>
+            </a:r>
+            <a:endParaRPr lang="en-GB" sz="21500" b="1" dirty="0"/>
+          </a:p>
+        </p:txBody>
+      </p:sp>
+      <p:pic>
+        <p:nvPicPr>
+          <p:cNvPr id="5" name="Picture 4" descr="Chart, pie chart&#10;&#10;Description automatically generated">
+            <a:extLst>
+              <a:ext uri="{FF2B5EF4-FFF2-40B4-BE49-F238E27FC236}">
+                <a16:creationId xmlns:a16="http://schemas.microsoft.com/office/drawing/2014/main" id="{7F505A07-5DAF-B5BF-F9ED-0D1A57345749}"/>
+              </a:ext>
+            </a:extLst>
+          </p:cNvPr>
+          <p:cNvPicPr>
+            <a:picLocks noChangeAspect="1"/>
+          </p:cNvPicPr>
+          <p:nvPr/>
+        </p:nvPicPr>
+        <p:blipFill rotWithShape="1">
+          <a:blip r:embed="rId2"/>
+          <a:srcRect b="9490"/>
+          <a:stretch/>
+        </p:blipFill>
+        <p:spPr bwMode="auto">
+          <a:xfrm>
+            <a:off x="2306300" y="2262590"/>
+            <a:ext cx="7579399" cy="2332819"/>
+          </a:xfrm>
+          <a:prstGeom prst="rect">
+            <a:avLst/>
+          </a:prstGeom>
+          <a:ln>
+            <a:noFill/>
+          </a:ln>
+          <a:extLst>
+            <a:ext uri="{53640926-AAD7-44D8-BBD7-CCE9431645EC}">
+              <a14:shadowObscured xmlns:a14="http://schemas.microsoft.com/office/drawing/2010/main"/>
+            </a:ext>
+          </a:extLst>
+        </p:spPr>
+      </p:pic>
+    </p:spTree>
+    <p:extLst>
+      <p:ext uri="{BB962C8B-B14F-4D97-AF65-F5344CB8AC3E}">
+        <p14:creationId xmlns:p14="http://schemas.microsoft.com/office/powerpoint/2010/main" val="186643640"/>
+      </p:ext>
+    </p:extLst>
+  </p:cSld>
+  <p:clrMapOvr>
+    <a:masterClrMapping/>
+  </p:clrMapOvr>
+</p:sld>
+</file>
+
+<file path=ppt/slides/slide18.xml><?xml version="1.0" encoding="utf-8"?>
+<p:sld xmlns:a="http://schemas.openxmlformats.org/drawingml/2006/main" xmlns:r="http://schemas.openxmlformats.org/officeDocument/2006/relationships" xmlns:p="http://schemas.openxmlformats.org/presentationml/2006/main">
+  <p:cSld>
+    <p:spTree>
+      <p:nvGrpSpPr>
+        <p:cNvPr id="1" name=""/>
+        <p:cNvGrpSpPr/>
+        <p:nvPr/>
+      </p:nvGrpSpPr>
+      <p:grpSpPr>
+        <a:xfrm>
+          <a:off x="0" y="0"/>
+          <a:ext cx="0" cy="0"/>
+          <a:chOff x="0" y="0"/>
+          <a:chExt cx="0" cy="0"/>
+        </a:xfrm>
+      </p:grpSpPr>
       <p:sp>
         <p:nvSpPr>
           <p:cNvPr id="3" name="Content Placeholder 2">
@@ -6904,7 +10484,7 @@
 </p:sld>
 </file>
 
-<file path=ppt/slides/slide17.xml><?xml version="1.0" encoding="utf-8"?>
+<file path=ppt/slides/slide19.xml><?xml version="1.0" encoding="utf-8"?>
 <p:sld xmlns:a="http://schemas.openxmlformats.org/drawingml/2006/main" xmlns:r="http://schemas.openxmlformats.org/officeDocument/2006/relationships" xmlns:p="http://schemas.openxmlformats.org/presentationml/2006/main">
   <p:cSld>
     <p:spTree>
@@ -7184,345 +10764,6 @@
     <p:extLst>
       <p:ext uri="{BB962C8B-B14F-4D97-AF65-F5344CB8AC3E}">
         <p14:creationId xmlns:p14="http://schemas.microsoft.com/office/powerpoint/2010/main" val="2257962493"/>
-      </p:ext>
-    </p:extLst>
-  </p:cSld>
-  <p:clrMapOvr>
-    <a:masterClrMapping/>
-  </p:clrMapOvr>
-</p:sld>
-</file>
-
-<file path=ppt/slides/slide18.xml><?xml version="1.0" encoding="utf-8"?>
-<p:sld xmlns:a="http://schemas.openxmlformats.org/drawingml/2006/main" xmlns:r="http://schemas.openxmlformats.org/officeDocument/2006/relationships" xmlns:p="http://schemas.openxmlformats.org/presentationml/2006/main">
-  <p:cSld>
-    <p:spTree>
-      <p:nvGrpSpPr>
-        <p:cNvPr id="1" name=""/>
-        <p:cNvGrpSpPr/>
-        <p:nvPr/>
-      </p:nvGrpSpPr>
-      <p:grpSpPr>
-        <a:xfrm>
-          <a:off x="0" y="0"/>
-          <a:ext cx="0" cy="0"/>
-          <a:chOff x="0" y="0"/>
-          <a:chExt cx="0" cy="0"/>
-        </a:xfrm>
-      </p:grpSpPr>
-      <p:cxnSp>
-        <p:nvCxnSpPr>
-          <p:cNvPr id="6" name="Straight Connector 5">
-            <a:extLst>
-              <a:ext uri="{FF2B5EF4-FFF2-40B4-BE49-F238E27FC236}">
-                <a16:creationId xmlns:a16="http://schemas.microsoft.com/office/drawing/2014/main" id="{79BBC210-9E9C-4C91-B5E1-2DC7B5AC2148}"/>
-              </a:ext>
-            </a:extLst>
-          </p:cNvPr>
-          <p:cNvCxnSpPr>
-            <a:cxnSpLocks/>
-          </p:cNvCxnSpPr>
-          <p:nvPr/>
-        </p:nvCxnSpPr>
-        <p:spPr>
-          <a:xfrm>
-            <a:off x="838200" y="922215"/>
-            <a:ext cx="10515600" cy="0"/>
-          </a:xfrm>
-          <a:prstGeom prst="line">
-            <a:avLst/>
-          </a:prstGeom>
-          <a:ln>
-            <a:solidFill>
-              <a:schemeClr val="tx1"/>
-            </a:solidFill>
-          </a:ln>
-        </p:spPr>
-        <p:style>
-          <a:lnRef idx="3">
-            <a:schemeClr val="dk1"/>
-          </a:lnRef>
-          <a:fillRef idx="0">
-            <a:schemeClr val="dk1"/>
-          </a:fillRef>
-          <a:effectRef idx="2">
-            <a:schemeClr val="dk1"/>
-          </a:effectRef>
-          <a:fontRef idx="minor">
-            <a:schemeClr val="tx1"/>
-          </a:fontRef>
-        </p:style>
-      </p:cxnSp>
-      <p:sp>
-        <p:nvSpPr>
-          <p:cNvPr id="7" name="Title 1">
-            <a:extLst>
-              <a:ext uri="{FF2B5EF4-FFF2-40B4-BE49-F238E27FC236}">
-                <a16:creationId xmlns:a16="http://schemas.microsoft.com/office/drawing/2014/main" id="{58ADC005-0F06-4240-96FB-324B87559EB0}"/>
-              </a:ext>
-            </a:extLst>
-          </p:cNvPr>
-          <p:cNvSpPr txBox="1">
-            <a:spLocks/>
-          </p:cNvSpPr>
-          <p:nvPr/>
-        </p:nvSpPr>
-        <p:spPr>
-          <a:xfrm>
-            <a:off x="838200" y="304801"/>
-            <a:ext cx="9144000" cy="789354"/>
-          </a:xfrm>
-          <a:prstGeom prst="rect">
-            <a:avLst/>
-          </a:prstGeom>
-        </p:spPr>
-        <p:txBody>
-          <a:bodyPr vert="horz" lIns="91440" tIns="45720" rIns="91440" bIns="45720" rtlCol="0" anchor="ctr">
-            <a:normAutofit fontScale="97500" lnSpcReduction="10000"/>
-          </a:bodyPr>
-          <a:lstStyle>
-            <a:lvl1pPr algn="l" defTabSz="914400" rtl="0" eaLnBrk="1" latinLnBrk="0" hangingPunct="1">
-              <a:lnSpc>
-                <a:spcPct val="90000"/>
-              </a:lnSpc>
-              <a:spcBef>
-                <a:spcPct val="0"/>
-              </a:spcBef>
-              <a:buNone/>
-              <a:defRPr sz="4400" kern="1200">
-                <a:solidFill>
-                  <a:schemeClr val="tx1"/>
-                </a:solidFill>
-                <a:latin typeface="+mj-lt"/>
-                <a:ea typeface="+mj-ea"/>
-                <a:cs typeface="+mj-cs"/>
-              </a:defRPr>
-            </a:lvl1pPr>
-          </a:lstStyle>
-          <a:p>
-            <a:r>
-              <a:rPr lang="en-GB" sz="5400" b="1" i="0" dirty="0">
-                <a:effectLst/>
-                <a:latin typeface="Roboto" panose="02000000000000000000" pitchFamily="2" charset="0"/>
-              </a:rPr>
-              <a:t>Demo</a:t>
-            </a:r>
-            <a:endParaRPr lang="en-GB" sz="21500" b="1" dirty="0"/>
-          </a:p>
-        </p:txBody>
-      </p:sp>
-    </p:spTree>
-    <p:extLst>
-      <p:ext uri="{BB962C8B-B14F-4D97-AF65-F5344CB8AC3E}">
-        <p14:creationId xmlns:p14="http://schemas.microsoft.com/office/powerpoint/2010/main" val="3559228247"/>
-      </p:ext>
-    </p:extLst>
-  </p:cSld>
-  <p:clrMapOvr>
-    <a:masterClrMapping/>
-  </p:clrMapOvr>
-</p:sld>
-</file>
-
-<file path=ppt/slides/slide19.xml><?xml version="1.0" encoding="utf-8"?>
-<p:sld xmlns:a="http://schemas.openxmlformats.org/drawingml/2006/main" xmlns:r="http://schemas.openxmlformats.org/officeDocument/2006/relationships" xmlns:p="http://schemas.openxmlformats.org/presentationml/2006/main">
-  <p:cSld>
-    <p:spTree>
-      <p:nvGrpSpPr>
-        <p:cNvPr id="1" name=""/>
-        <p:cNvGrpSpPr/>
-        <p:nvPr/>
-      </p:nvGrpSpPr>
-      <p:grpSpPr>
-        <a:xfrm>
-          <a:off x="0" y="0"/>
-          <a:ext cx="0" cy="0"/>
-          <a:chOff x="0" y="0"/>
-          <a:chExt cx="0" cy="0"/>
-        </a:xfrm>
-      </p:grpSpPr>
-      <p:cxnSp>
-        <p:nvCxnSpPr>
-          <p:cNvPr id="6" name="Straight Connector 5">
-            <a:extLst>
-              <a:ext uri="{FF2B5EF4-FFF2-40B4-BE49-F238E27FC236}">
-                <a16:creationId xmlns:a16="http://schemas.microsoft.com/office/drawing/2014/main" id="{79BBC210-9E9C-4C91-B5E1-2DC7B5AC2148}"/>
-              </a:ext>
-            </a:extLst>
-          </p:cNvPr>
-          <p:cNvCxnSpPr>
-            <a:cxnSpLocks/>
-          </p:cNvCxnSpPr>
-          <p:nvPr/>
-        </p:nvCxnSpPr>
-        <p:spPr>
-          <a:xfrm>
-            <a:off x="838200" y="922215"/>
-            <a:ext cx="10515600" cy="0"/>
-          </a:xfrm>
-          <a:prstGeom prst="line">
-            <a:avLst/>
-          </a:prstGeom>
-          <a:ln>
-            <a:solidFill>
-              <a:schemeClr val="tx1"/>
-            </a:solidFill>
-          </a:ln>
-        </p:spPr>
-        <p:style>
-          <a:lnRef idx="3">
-            <a:schemeClr val="dk1"/>
-          </a:lnRef>
-          <a:fillRef idx="0">
-            <a:schemeClr val="dk1"/>
-          </a:fillRef>
-          <a:effectRef idx="2">
-            <a:schemeClr val="dk1"/>
-          </a:effectRef>
-          <a:fontRef idx="minor">
-            <a:schemeClr val="tx1"/>
-          </a:fontRef>
-        </p:style>
-      </p:cxnSp>
-      <p:sp>
-        <p:nvSpPr>
-          <p:cNvPr id="7" name="Title 1">
-            <a:extLst>
-              <a:ext uri="{FF2B5EF4-FFF2-40B4-BE49-F238E27FC236}">
-                <a16:creationId xmlns:a16="http://schemas.microsoft.com/office/drawing/2014/main" id="{58ADC005-0F06-4240-96FB-324B87559EB0}"/>
-              </a:ext>
-            </a:extLst>
-          </p:cNvPr>
-          <p:cNvSpPr txBox="1">
-            <a:spLocks/>
-          </p:cNvSpPr>
-          <p:nvPr/>
-        </p:nvSpPr>
-        <p:spPr>
-          <a:xfrm>
-            <a:off x="838200" y="304801"/>
-            <a:ext cx="9144000" cy="789354"/>
-          </a:xfrm>
-          <a:prstGeom prst="rect">
-            <a:avLst/>
-          </a:prstGeom>
-        </p:spPr>
-        <p:txBody>
-          <a:bodyPr vert="horz" lIns="91440" tIns="45720" rIns="91440" bIns="45720" rtlCol="0" anchor="ctr">
-            <a:normAutofit fontScale="97500" lnSpcReduction="10000"/>
-          </a:bodyPr>
-          <a:lstStyle>
-            <a:lvl1pPr algn="l" defTabSz="914400" rtl="0" eaLnBrk="1" latinLnBrk="0" hangingPunct="1">
-              <a:lnSpc>
-                <a:spcPct val="90000"/>
-              </a:lnSpc>
-              <a:spcBef>
-                <a:spcPct val="0"/>
-              </a:spcBef>
-              <a:buNone/>
-              <a:defRPr sz="4400" kern="1200">
-                <a:solidFill>
-                  <a:schemeClr val="tx1"/>
-                </a:solidFill>
-                <a:latin typeface="+mj-lt"/>
-                <a:ea typeface="+mj-ea"/>
-                <a:cs typeface="+mj-cs"/>
-              </a:defRPr>
-            </a:lvl1pPr>
-          </a:lstStyle>
-          <a:p>
-            <a:r>
-              <a:rPr lang="en-GB" sz="5400" b="1" i="0" dirty="0">
-                <a:effectLst/>
-                <a:latin typeface="Roboto" panose="02000000000000000000" pitchFamily="2" charset="0"/>
-              </a:rPr>
-              <a:t>End</a:t>
-            </a:r>
-            <a:endParaRPr lang="en-GB" sz="21500" b="1" dirty="0"/>
-          </a:p>
-        </p:txBody>
-      </p:sp>
-      <p:sp>
-        <p:nvSpPr>
-          <p:cNvPr id="2" name="TextBox 1">
-            <a:extLst>
-              <a:ext uri="{FF2B5EF4-FFF2-40B4-BE49-F238E27FC236}">
-                <a16:creationId xmlns:a16="http://schemas.microsoft.com/office/drawing/2014/main" id="{7C252658-962B-4445-B131-1F3D2B53F7C8}"/>
-              </a:ext>
-            </a:extLst>
-          </p:cNvPr>
-          <p:cNvSpPr txBox="1"/>
-          <p:nvPr/>
-        </p:nvSpPr>
-        <p:spPr>
-          <a:xfrm>
-            <a:off x="1400175" y="3994931"/>
-            <a:ext cx="2495550" cy="1200329"/>
-          </a:xfrm>
-          <a:prstGeom prst="rect">
-            <a:avLst/>
-          </a:prstGeom>
-          <a:noFill/>
-        </p:spPr>
-        <p:txBody>
-          <a:bodyPr wrap="square" rtlCol="0">
-            <a:spAutoFit/>
-          </a:bodyPr>
-          <a:lstStyle/>
-          <a:p>
-            <a:r>
-              <a:rPr lang="de-CH" sz="3600" dirty="0"/>
-              <a:t>Fragen?</a:t>
-            </a:r>
-          </a:p>
-          <a:p>
-            <a:r>
-              <a:rPr lang="de-CH" sz="3600" dirty="0"/>
-              <a:t>Questions?</a:t>
-            </a:r>
-            <a:endParaRPr lang="en-GB" sz="3600" dirty="0"/>
-          </a:p>
-        </p:txBody>
-      </p:sp>
-      <p:sp>
-        <p:nvSpPr>
-          <p:cNvPr id="5" name="TextBox 4">
-            <a:extLst>
-              <a:ext uri="{FF2B5EF4-FFF2-40B4-BE49-F238E27FC236}">
-                <a16:creationId xmlns:a16="http://schemas.microsoft.com/office/drawing/2014/main" id="{712AA9B8-0755-40D9-883C-18567E24BCD1}"/>
-              </a:ext>
-            </a:extLst>
-          </p:cNvPr>
-          <p:cNvSpPr txBox="1"/>
-          <p:nvPr/>
-        </p:nvSpPr>
-        <p:spPr>
-          <a:xfrm>
-            <a:off x="838200" y="1539630"/>
-            <a:ext cx="8515351" cy="707886"/>
-          </a:xfrm>
-          <a:prstGeom prst="rect">
-            <a:avLst/>
-          </a:prstGeom>
-          <a:noFill/>
-        </p:spPr>
-        <p:txBody>
-          <a:bodyPr wrap="square" rtlCol="0">
-            <a:spAutoFit/>
-          </a:bodyPr>
-          <a:lstStyle/>
-          <a:p>
-            <a:r>
-              <a:rPr lang="de-CH" sz="4000" dirty="0"/>
-              <a:t>Vielen Dank für ihre Aufmerksamkeit.</a:t>
-            </a:r>
-          </a:p>
-        </p:txBody>
-      </p:sp>
-    </p:spTree>
-    <p:extLst>
-      <p:ext uri="{BB962C8B-B14F-4D97-AF65-F5344CB8AC3E}">
-        <p14:creationId xmlns:p14="http://schemas.microsoft.com/office/powerpoint/2010/main" val="131537078"/>
       </p:ext>
     </p:extLst>
   </p:cSld>
@@ -7724,6 +10965,345 @@
     <p:extLst>
       <p:ext uri="{BB962C8B-B14F-4D97-AF65-F5344CB8AC3E}">
         <p14:creationId xmlns:p14="http://schemas.microsoft.com/office/powerpoint/2010/main" val="528734155"/>
+      </p:ext>
+    </p:extLst>
+  </p:cSld>
+  <p:clrMapOvr>
+    <a:masterClrMapping/>
+  </p:clrMapOvr>
+</p:sld>
+</file>
+
+<file path=ppt/slides/slide20.xml><?xml version="1.0" encoding="utf-8"?>
+<p:sld xmlns:a="http://schemas.openxmlformats.org/drawingml/2006/main" xmlns:r="http://schemas.openxmlformats.org/officeDocument/2006/relationships" xmlns:p="http://schemas.openxmlformats.org/presentationml/2006/main">
+  <p:cSld>
+    <p:spTree>
+      <p:nvGrpSpPr>
+        <p:cNvPr id="1" name=""/>
+        <p:cNvGrpSpPr/>
+        <p:nvPr/>
+      </p:nvGrpSpPr>
+      <p:grpSpPr>
+        <a:xfrm>
+          <a:off x="0" y="0"/>
+          <a:ext cx="0" cy="0"/>
+          <a:chOff x="0" y="0"/>
+          <a:chExt cx="0" cy="0"/>
+        </a:xfrm>
+      </p:grpSpPr>
+      <p:cxnSp>
+        <p:nvCxnSpPr>
+          <p:cNvPr id="6" name="Straight Connector 5">
+            <a:extLst>
+              <a:ext uri="{FF2B5EF4-FFF2-40B4-BE49-F238E27FC236}">
+                <a16:creationId xmlns:a16="http://schemas.microsoft.com/office/drawing/2014/main" id="{79BBC210-9E9C-4C91-B5E1-2DC7B5AC2148}"/>
+              </a:ext>
+            </a:extLst>
+          </p:cNvPr>
+          <p:cNvCxnSpPr>
+            <a:cxnSpLocks/>
+          </p:cNvCxnSpPr>
+          <p:nvPr/>
+        </p:nvCxnSpPr>
+        <p:spPr>
+          <a:xfrm>
+            <a:off x="838200" y="922215"/>
+            <a:ext cx="10515600" cy="0"/>
+          </a:xfrm>
+          <a:prstGeom prst="line">
+            <a:avLst/>
+          </a:prstGeom>
+          <a:ln>
+            <a:solidFill>
+              <a:schemeClr val="tx1"/>
+            </a:solidFill>
+          </a:ln>
+        </p:spPr>
+        <p:style>
+          <a:lnRef idx="3">
+            <a:schemeClr val="dk1"/>
+          </a:lnRef>
+          <a:fillRef idx="0">
+            <a:schemeClr val="dk1"/>
+          </a:fillRef>
+          <a:effectRef idx="2">
+            <a:schemeClr val="dk1"/>
+          </a:effectRef>
+          <a:fontRef idx="minor">
+            <a:schemeClr val="tx1"/>
+          </a:fontRef>
+        </p:style>
+      </p:cxnSp>
+      <p:sp>
+        <p:nvSpPr>
+          <p:cNvPr id="7" name="Title 1">
+            <a:extLst>
+              <a:ext uri="{FF2B5EF4-FFF2-40B4-BE49-F238E27FC236}">
+                <a16:creationId xmlns:a16="http://schemas.microsoft.com/office/drawing/2014/main" id="{58ADC005-0F06-4240-96FB-324B87559EB0}"/>
+              </a:ext>
+            </a:extLst>
+          </p:cNvPr>
+          <p:cNvSpPr txBox="1">
+            <a:spLocks/>
+          </p:cNvSpPr>
+          <p:nvPr/>
+        </p:nvSpPr>
+        <p:spPr>
+          <a:xfrm>
+            <a:off x="838200" y="304801"/>
+            <a:ext cx="9144000" cy="789354"/>
+          </a:xfrm>
+          <a:prstGeom prst="rect">
+            <a:avLst/>
+          </a:prstGeom>
+        </p:spPr>
+        <p:txBody>
+          <a:bodyPr vert="horz" lIns="91440" tIns="45720" rIns="91440" bIns="45720" rtlCol="0" anchor="ctr">
+            <a:normAutofit fontScale="97500" lnSpcReduction="10000"/>
+          </a:bodyPr>
+          <a:lstStyle>
+            <a:lvl1pPr algn="l" defTabSz="914400" rtl="0" eaLnBrk="1" latinLnBrk="0" hangingPunct="1">
+              <a:lnSpc>
+                <a:spcPct val="90000"/>
+              </a:lnSpc>
+              <a:spcBef>
+                <a:spcPct val="0"/>
+              </a:spcBef>
+              <a:buNone/>
+              <a:defRPr sz="4400" kern="1200">
+                <a:solidFill>
+                  <a:schemeClr val="tx1"/>
+                </a:solidFill>
+                <a:latin typeface="+mj-lt"/>
+                <a:ea typeface="+mj-ea"/>
+                <a:cs typeface="+mj-cs"/>
+              </a:defRPr>
+            </a:lvl1pPr>
+          </a:lstStyle>
+          <a:p>
+            <a:r>
+              <a:rPr lang="en-GB" sz="5400" b="1" i="0" dirty="0">
+                <a:effectLst/>
+                <a:latin typeface="Roboto" panose="02000000000000000000" pitchFamily="2" charset="0"/>
+              </a:rPr>
+              <a:t>Demo</a:t>
+            </a:r>
+            <a:endParaRPr lang="en-GB" sz="21500" b="1" dirty="0"/>
+          </a:p>
+        </p:txBody>
+      </p:sp>
+    </p:spTree>
+    <p:extLst>
+      <p:ext uri="{BB962C8B-B14F-4D97-AF65-F5344CB8AC3E}">
+        <p14:creationId xmlns:p14="http://schemas.microsoft.com/office/powerpoint/2010/main" val="3559228247"/>
+      </p:ext>
+    </p:extLst>
+  </p:cSld>
+  <p:clrMapOvr>
+    <a:masterClrMapping/>
+  </p:clrMapOvr>
+</p:sld>
+</file>
+
+<file path=ppt/slides/slide21.xml><?xml version="1.0" encoding="utf-8"?>
+<p:sld xmlns:a="http://schemas.openxmlformats.org/drawingml/2006/main" xmlns:r="http://schemas.openxmlformats.org/officeDocument/2006/relationships" xmlns:p="http://schemas.openxmlformats.org/presentationml/2006/main">
+  <p:cSld>
+    <p:spTree>
+      <p:nvGrpSpPr>
+        <p:cNvPr id="1" name=""/>
+        <p:cNvGrpSpPr/>
+        <p:nvPr/>
+      </p:nvGrpSpPr>
+      <p:grpSpPr>
+        <a:xfrm>
+          <a:off x="0" y="0"/>
+          <a:ext cx="0" cy="0"/>
+          <a:chOff x="0" y="0"/>
+          <a:chExt cx="0" cy="0"/>
+        </a:xfrm>
+      </p:grpSpPr>
+      <p:cxnSp>
+        <p:nvCxnSpPr>
+          <p:cNvPr id="6" name="Straight Connector 5">
+            <a:extLst>
+              <a:ext uri="{FF2B5EF4-FFF2-40B4-BE49-F238E27FC236}">
+                <a16:creationId xmlns:a16="http://schemas.microsoft.com/office/drawing/2014/main" id="{79BBC210-9E9C-4C91-B5E1-2DC7B5AC2148}"/>
+              </a:ext>
+            </a:extLst>
+          </p:cNvPr>
+          <p:cNvCxnSpPr>
+            <a:cxnSpLocks/>
+          </p:cNvCxnSpPr>
+          <p:nvPr/>
+        </p:nvCxnSpPr>
+        <p:spPr>
+          <a:xfrm>
+            <a:off x="838200" y="922215"/>
+            <a:ext cx="10515600" cy="0"/>
+          </a:xfrm>
+          <a:prstGeom prst="line">
+            <a:avLst/>
+          </a:prstGeom>
+          <a:ln>
+            <a:solidFill>
+              <a:schemeClr val="tx1"/>
+            </a:solidFill>
+          </a:ln>
+        </p:spPr>
+        <p:style>
+          <a:lnRef idx="3">
+            <a:schemeClr val="dk1"/>
+          </a:lnRef>
+          <a:fillRef idx="0">
+            <a:schemeClr val="dk1"/>
+          </a:fillRef>
+          <a:effectRef idx="2">
+            <a:schemeClr val="dk1"/>
+          </a:effectRef>
+          <a:fontRef idx="minor">
+            <a:schemeClr val="tx1"/>
+          </a:fontRef>
+        </p:style>
+      </p:cxnSp>
+      <p:sp>
+        <p:nvSpPr>
+          <p:cNvPr id="7" name="Title 1">
+            <a:extLst>
+              <a:ext uri="{FF2B5EF4-FFF2-40B4-BE49-F238E27FC236}">
+                <a16:creationId xmlns:a16="http://schemas.microsoft.com/office/drawing/2014/main" id="{58ADC005-0F06-4240-96FB-324B87559EB0}"/>
+              </a:ext>
+            </a:extLst>
+          </p:cNvPr>
+          <p:cNvSpPr txBox="1">
+            <a:spLocks/>
+          </p:cNvSpPr>
+          <p:nvPr/>
+        </p:nvSpPr>
+        <p:spPr>
+          <a:xfrm>
+            <a:off x="838200" y="304801"/>
+            <a:ext cx="9144000" cy="789354"/>
+          </a:xfrm>
+          <a:prstGeom prst="rect">
+            <a:avLst/>
+          </a:prstGeom>
+        </p:spPr>
+        <p:txBody>
+          <a:bodyPr vert="horz" lIns="91440" tIns="45720" rIns="91440" bIns="45720" rtlCol="0" anchor="ctr">
+            <a:normAutofit fontScale="97500" lnSpcReduction="10000"/>
+          </a:bodyPr>
+          <a:lstStyle>
+            <a:lvl1pPr algn="l" defTabSz="914400" rtl="0" eaLnBrk="1" latinLnBrk="0" hangingPunct="1">
+              <a:lnSpc>
+                <a:spcPct val="90000"/>
+              </a:lnSpc>
+              <a:spcBef>
+                <a:spcPct val="0"/>
+              </a:spcBef>
+              <a:buNone/>
+              <a:defRPr sz="4400" kern="1200">
+                <a:solidFill>
+                  <a:schemeClr val="tx1"/>
+                </a:solidFill>
+                <a:latin typeface="+mj-lt"/>
+                <a:ea typeface="+mj-ea"/>
+                <a:cs typeface="+mj-cs"/>
+              </a:defRPr>
+            </a:lvl1pPr>
+          </a:lstStyle>
+          <a:p>
+            <a:r>
+              <a:rPr lang="en-GB" sz="5400" b="1" i="0" dirty="0">
+                <a:effectLst/>
+                <a:latin typeface="Roboto" panose="02000000000000000000" pitchFamily="2" charset="0"/>
+              </a:rPr>
+              <a:t>End</a:t>
+            </a:r>
+            <a:endParaRPr lang="en-GB" sz="21500" b="1" dirty="0"/>
+          </a:p>
+        </p:txBody>
+      </p:sp>
+      <p:sp>
+        <p:nvSpPr>
+          <p:cNvPr id="2" name="TextBox 1">
+            <a:extLst>
+              <a:ext uri="{FF2B5EF4-FFF2-40B4-BE49-F238E27FC236}">
+                <a16:creationId xmlns:a16="http://schemas.microsoft.com/office/drawing/2014/main" id="{7C252658-962B-4445-B131-1F3D2B53F7C8}"/>
+              </a:ext>
+            </a:extLst>
+          </p:cNvPr>
+          <p:cNvSpPr txBox="1"/>
+          <p:nvPr/>
+        </p:nvSpPr>
+        <p:spPr>
+          <a:xfrm>
+            <a:off x="1400175" y="3994931"/>
+            <a:ext cx="2495550" cy="1200329"/>
+          </a:xfrm>
+          <a:prstGeom prst="rect">
+            <a:avLst/>
+          </a:prstGeom>
+          <a:noFill/>
+        </p:spPr>
+        <p:txBody>
+          <a:bodyPr wrap="square" rtlCol="0">
+            <a:spAutoFit/>
+          </a:bodyPr>
+          <a:lstStyle/>
+          <a:p>
+            <a:r>
+              <a:rPr lang="de-CH" sz="3600" dirty="0"/>
+              <a:t>Fragen?</a:t>
+            </a:r>
+          </a:p>
+          <a:p>
+            <a:r>
+              <a:rPr lang="de-CH" sz="3600" dirty="0"/>
+              <a:t>Questions?</a:t>
+            </a:r>
+            <a:endParaRPr lang="en-GB" sz="3600" dirty="0"/>
+          </a:p>
+        </p:txBody>
+      </p:sp>
+      <p:sp>
+        <p:nvSpPr>
+          <p:cNvPr id="5" name="TextBox 4">
+            <a:extLst>
+              <a:ext uri="{FF2B5EF4-FFF2-40B4-BE49-F238E27FC236}">
+                <a16:creationId xmlns:a16="http://schemas.microsoft.com/office/drawing/2014/main" id="{712AA9B8-0755-40D9-883C-18567E24BCD1}"/>
+              </a:ext>
+            </a:extLst>
+          </p:cNvPr>
+          <p:cNvSpPr txBox="1"/>
+          <p:nvPr/>
+        </p:nvSpPr>
+        <p:spPr>
+          <a:xfrm>
+            <a:off x="838200" y="1539630"/>
+            <a:ext cx="8515351" cy="707886"/>
+          </a:xfrm>
+          <a:prstGeom prst="rect">
+            <a:avLst/>
+          </a:prstGeom>
+          <a:noFill/>
+        </p:spPr>
+        <p:txBody>
+          <a:bodyPr wrap="square" rtlCol="0">
+            <a:spAutoFit/>
+          </a:bodyPr>
+          <a:lstStyle/>
+          <a:p>
+            <a:r>
+              <a:rPr lang="de-CH" sz="4000" dirty="0"/>
+              <a:t>Vielen Dank für ihre Aufmerksamkeit.</a:t>
+            </a:r>
+          </a:p>
+        </p:txBody>
+      </p:sp>
+    </p:spTree>
+    <p:extLst>
+      <p:ext uri="{BB962C8B-B14F-4D97-AF65-F5344CB8AC3E}">
+        <p14:creationId xmlns:p14="http://schemas.microsoft.com/office/powerpoint/2010/main" val="131537078"/>
       </p:ext>
     </p:extLst>
   </p:cSld>

</xml_diff>

<commit_message>
Updated Presentation pptx and pdg
</commit_message>
<xml_diff>
--- a/documents/Milestone_5_-_Presentation.pptx
+++ b/documents/Milestone_5_-_Presentation.pptx
@@ -138,7 +138,7 @@
 <file path=ppt/charts/chart1.xml><?xml version="1.0" encoding="utf-8"?>
 <c:chartSpace xmlns:c="http://schemas.openxmlformats.org/drawingml/2006/chart" xmlns:a="http://schemas.openxmlformats.org/drawingml/2006/main" xmlns:r="http://schemas.openxmlformats.org/officeDocument/2006/relationships" xmlns:c16r2="http://schemas.microsoft.com/office/drawing/2015/06/chart">
   <c:date1904 val="0"/>
-  <c:lang val="en-US"/>
+  <c:lang val="de-DE"/>
   <c:roundedCorners val="0"/>
   <mc:AlternateContent xmlns:mc="http://schemas.openxmlformats.org/markup-compatibility/2006">
     <mc:Choice xmlns:c14="http://schemas.microsoft.com/office/drawing/2007/8/2/chart" Requires="c14">
@@ -203,7 +203,7 @@
               <a:cs typeface="+mn-cs"/>
             </a:defRPr>
           </a:pPr>
-          <a:endParaRPr lang="en-US"/>
+          <a:endParaRPr lang="de-DE"/>
         </a:p>
       </c:txPr>
     </c:title>
@@ -495,7 +495,7 @@
                   <a:cs typeface="+mn-cs"/>
                 </a:defRPr>
               </a:pPr>
-              <a:endParaRPr lang="en-US"/>
+              <a:endParaRPr lang="de-DE"/>
             </a:p>
           </c:txPr>
         </c:title>
@@ -533,7 +533,7 @@
                 <a:cs typeface="+mn-cs"/>
               </a:defRPr>
             </a:pPr>
-            <a:endParaRPr lang="en-US"/>
+            <a:endParaRPr lang="de-DE"/>
           </a:p>
         </c:txPr>
         <c:crossAx val="1117434688"/>
@@ -575,7 +575,7 @@
               <a:cs typeface="+mn-cs"/>
             </a:defRPr>
           </a:pPr>
-          <a:endParaRPr lang="en-US"/>
+          <a:endParaRPr lang="de-DE"/>
         </a:p>
       </c:txPr>
     </c:legend>
@@ -604,7 +604,7 @@
       <a:pPr>
         <a:defRPr/>
       </a:pPr>
-      <a:endParaRPr lang="en-US"/>
+      <a:endParaRPr lang="de-DE"/>
     </a:p>
   </c:txPr>
   <c:externalData r:id="rId3">
@@ -616,7 +616,7 @@
 <file path=ppt/charts/chart2.xml><?xml version="1.0" encoding="utf-8"?>
 <c:chartSpace xmlns:c="http://schemas.openxmlformats.org/drawingml/2006/chart" xmlns:a="http://schemas.openxmlformats.org/drawingml/2006/main" xmlns:r="http://schemas.openxmlformats.org/officeDocument/2006/relationships" xmlns:c16r2="http://schemas.microsoft.com/office/drawing/2015/06/chart">
   <c:date1904 val="0"/>
-  <c:lang val="en-US"/>
+  <c:lang val="de-DE"/>
   <c:roundedCorners val="0"/>
   <mc:AlternateContent xmlns:mc="http://schemas.openxmlformats.org/markup-compatibility/2006">
     <mc:Choice xmlns:c14="http://schemas.microsoft.com/office/drawing/2007/8/2/chart" Requires="c14">
@@ -685,7 +685,7 @@
               <a:cs typeface="+mn-cs"/>
             </a:defRPr>
           </a:pPr>
-          <a:endParaRPr lang="en-US"/>
+          <a:endParaRPr lang="de-DE"/>
         </a:p>
       </c:txPr>
     </c:title>
@@ -1006,7 +1006,7 @@
                   <a:cs typeface="+mn-cs"/>
                 </a:defRPr>
               </a:pPr>
-              <a:endParaRPr lang="en-US"/>
+              <a:endParaRPr lang="de-DE"/>
             </a:p>
           </c:txPr>
         </c:title>
@@ -1044,7 +1044,7 @@
                 <a:cs typeface="+mn-cs"/>
               </a:defRPr>
             </a:pPr>
-            <a:endParaRPr lang="en-US"/>
+            <a:endParaRPr lang="de-DE"/>
           </a:p>
         </c:txPr>
         <c:crossAx val="1113314224"/>
@@ -1133,7 +1133,7 @@
                   <a:cs typeface="+mn-cs"/>
                 </a:defRPr>
               </a:pPr>
-              <a:endParaRPr lang="en-US"/>
+              <a:endParaRPr lang="de-DE"/>
             </a:p>
           </c:txPr>
         </c:title>
@@ -1165,7 +1165,7 @@
                 <a:cs typeface="+mn-cs"/>
               </a:defRPr>
             </a:pPr>
-            <a:endParaRPr lang="en-US"/>
+            <a:endParaRPr lang="de-DE"/>
           </a:p>
         </c:txPr>
         <c:crossAx val="1019361072"/>
@@ -1217,7 +1217,7 @@
               <a:cs typeface="+mn-cs"/>
             </a:defRPr>
           </a:pPr>
-          <a:endParaRPr lang="en-US"/>
+          <a:endParaRPr lang="de-DE"/>
         </a:p>
       </c:txPr>
     </c:legend>
@@ -1246,7 +1246,7 @@
       <a:pPr>
         <a:defRPr/>
       </a:pPr>
-      <a:endParaRPr lang="en-US"/>
+      <a:endParaRPr lang="de-DE"/>
     </a:p>
   </c:txPr>
   <c:externalData r:id="rId3">
@@ -1258,7 +1258,7 @@
 <file path=ppt/charts/chart3.xml><?xml version="1.0" encoding="utf-8"?>
 <c:chartSpace xmlns:c="http://schemas.openxmlformats.org/drawingml/2006/chart" xmlns:a="http://schemas.openxmlformats.org/drawingml/2006/main" xmlns:r="http://schemas.openxmlformats.org/officeDocument/2006/relationships" xmlns:c16r2="http://schemas.microsoft.com/office/drawing/2015/06/chart">
   <c:date1904 val="0"/>
-  <c:lang val="en-US"/>
+  <c:lang val="de-DE"/>
   <c:roundedCorners val="0"/>
   <mc:AlternateContent xmlns:mc="http://schemas.openxmlformats.org/markup-compatibility/2006">
     <mc:Choice xmlns:c14="http://schemas.microsoft.com/office/drawing/2007/8/2/chart" Requires="c14">
@@ -1335,7 +1335,7 @@
               <a:cs typeface="+mn-cs"/>
             </a:defRPr>
           </a:pPr>
-          <a:endParaRPr lang="en-US"/>
+          <a:endParaRPr lang="de-DE"/>
         </a:p>
       </c:txPr>
     </c:title>
@@ -1656,7 +1656,7 @@
                   <a:cs typeface="+mn-cs"/>
                 </a:defRPr>
               </a:pPr>
-              <a:endParaRPr lang="en-US"/>
+              <a:endParaRPr lang="de-DE"/>
             </a:p>
           </c:txPr>
         </c:title>
@@ -1694,7 +1694,7 @@
                 <a:cs typeface="+mn-cs"/>
               </a:defRPr>
             </a:pPr>
-            <a:endParaRPr lang="en-US"/>
+            <a:endParaRPr lang="de-DE"/>
           </a:p>
         </c:txPr>
         <c:crossAx val="1113314224"/>
@@ -1783,7 +1783,7 @@
                   <a:cs typeface="+mn-cs"/>
                 </a:defRPr>
               </a:pPr>
-              <a:endParaRPr lang="en-US"/>
+              <a:endParaRPr lang="de-DE"/>
             </a:p>
           </c:txPr>
         </c:title>
@@ -1815,7 +1815,7 @@
                 <a:cs typeface="+mn-cs"/>
               </a:defRPr>
             </a:pPr>
-            <a:endParaRPr lang="en-US"/>
+            <a:endParaRPr lang="de-DE"/>
           </a:p>
         </c:txPr>
         <c:crossAx val="1019361072"/>
@@ -1857,7 +1857,7 @@
               <a:cs typeface="+mn-cs"/>
             </a:defRPr>
           </a:pPr>
-          <a:endParaRPr lang="en-US"/>
+          <a:endParaRPr lang="de-DE"/>
         </a:p>
       </c:txPr>
     </c:legend>
@@ -1886,7 +1886,7 @@
       <a:pPr>
         <a:defRPr/>
       </a:pPr>
-      <a:endParaRPr lang="en-US"/>
+      <a:endParaRPr lang="de-DE"/>
     </a:p>
   </c:txPr>
   <c:externalData r:id="rId3">
@@ -3804,7 +3804,7 @@
           <a:p>
             <a:fld id="{E974C25D-0E4C-444C-B808-2243600218A3}" type="slidenum">
               <a:rPr lang="en-GB" smtClean="0"/>
-              <a:t>‹#›</a:t>
+              <a:t>‹Nr.›</a:t>
             </a:fld>
             <a:endParaRPr lang="en-GB"/>
           </a:p>
@@ -4200,7 +4200,7 @@
           <a:p>
             <a:fld id="{EBB296B4-2820-4885-8A7F-8D02529B27C3}" type="slidenum">
               <a:rPr lang="en-GB" smtClean="0"/>
-              <a:t>‹#›</a:t>
+              <a:t>‹Nr.›</a:t>
             </a:fld>
             <a:endParaRPr lang="en-GB"/>
           </a:p>
@@ -4400,7 +4400,7 @@
           <a:p>
             <a:fld id="{EBB296B4-2820-4885-8A7F-8D02529B27C3}" type="slidenum">
               <a:rPr lang="en-GB" smtClean="0"/>
-              <a:t>‹#›</a:t>
+              <a:t>‹Nr.›</a:t>
             </a:fld>
             <a:endParaRPr lang="en-GB"/>
           </a:p>
@@ -4610,7 +4610,7 @@
           <a:p>
             <a:fld id="{EBB296B4-2820-4885-8A7F-8D02529B27C3}" type="slidenum">
               <a:rPr lang="en-GB" smtClean="0"/>
-              <a:t>‹#›</a:t>
+              <a:t>‹Nr.›</a:t>
             </a:fld>
             <a:endParaRPr lang="en-GB"/>
           </a:p>
@@ -4810,7 +4810,7 @@
           <a:p>
             <a:fld id="{EBB296B4-2820-4885-8A7F-8D02529B27C3}" type="slidenum">
               <a:rPr lang="en-GB" smtClean="0"/>
-              <a:t>‹#›</a:t>
+              <a:t>‹Nr.›</a:t>
             </a:fld>
             <a:endParaRPr lang="en-GB"/>
           </a:p>
@@ -5086,7 +5086,7 @@
           <a:p>
             <a:fld id="{EBB296B4-2820-4885-8A7F-8D02529B27C3}" type="slidenum">
               <a:rPr lang="en-GB" smtClean="0"/>
-              <a:t>‹#›</a:t>
+              <a:t>‹Nr.›</a:t>
             </a:fld>
             <a:endParaRPr lang="en-GB"/>
           </a:p>
@@ -5354,7 +5354,7 @@
           <a:p>
             <a:fld id="{EBB296B4-2820-4885-8A7F-8D02529B27C3}" type="slidenum">
               <a:rPr lang="en-GB" smtClean="0"/>
-              <a:t>‹#›</a:t>
+              <a:t>‹Nr.›</a:t>
             </a:fld>
             <a:endParaRPr lang="en-GB"/>
           </a:p>
@@ -5769,7 +5769,7 @@
           <a:p>
             <a:fld id="{EBB296B4-2820-4885-8A7F-8D02529B27C3}" type="slidenum">
               <a:rPr lang="en-GB" smtClean="0"/>
-              <a:t>‹#›</a:t>
+              <a:t>‹Nr.›</a:t>
             </a:fld>
             <a:endParaRPr lang="en-GB"/>
           </a:p>
@@ -5911,7 +5911,7 @@
           <a:p>
             <a:fld id="{EBB296B4-2820-4885-8A7F-8D02529B27C3}" type="slidenum">
               <a:rPr lang="en-GB" smtClean="0"/>
-              <a:t>‹#›</a:t>
+              <a:t>‹Nr.›</a:t>
             </a:fld>
             <a:endParaRPr lang="en-GB"/>
           </a:p>
@@ -6024,7 +6024,7 @@
           <a:p>
             <a:fld id="{EBB296B4-2820-4885-8A7F-8D02529B27C3}" type="slidenum">
               <a:rPr lang="en-GB" smtClean="0"/>
-              <a:t>‹#›</a:t>
+              <a:t>‹Nr.›</a:t>
             </a:fld>
             <a:endParaRPr lang="en-GB"/>
           </a:p>
@@ -6337,7 +6337,7 @@
           <a:p>
             <a:fld id="{EBB296B4-2820-4885-8A7F-8D02529B27C3}" type="slidenum">
               <a:rPr lang="en-GB" smtClean="0"/>
-              <a:t>‹#›</a:t>
+              <a:t>‹Nr.›</a:t>
             </a:fld>
             <a:endParaRPr lang="en-GB"/>
           </a:p>
@@ -6626,7 +6626,7 @@
           <a:p>
             <a:fld id="{EBB296B4-2820-4885-8A7F-8D02529B27C3}" type="slidenum">
               <a:rPr lang="en-GB" smtClean="0"/>
-              <a:t>‹#›</a:t>
+              <a:t>‹Nr.›</a:t>
             </a:fld>
             <a:endParaRPr lang="en-GB"/>
           </a:p>
@@ -6905,7 +6905,7 @@
           <a:p>
             <a:fld id="{EBB296B4-2820-4885-8A7F-8D02529B27C3}" type="slidenum">
               <a:rPr lang="en-GB" smtClean="0"/>
-              <a:t>‹#›</a:t>
+              <a:t>‹Nr.›</a:t>
             </a:fld>
             <a:endParaRPr lang="en-GB"/>
           </a:p>
@@ -10249,11 +10249,13 @@
         <p:spPr>
           <a:xfrm>
             <a:off x="838200" y="1213270"/>
-            <a:ext cx="8410575" cy="5016079"/>
+            <a:ext cx="9580123" cy="5016079"/>
           </a:xfrm>
         </p:spPr>
         <p:txBody>
-          <a:bodyPr/>
+          <a:bodyPr>
+            <a:normAutofit fontScale="92500" lnSpcReduction="20000"/>
+          </a:bodyPr>
           <a:lstStyle/>
           <a:p>
             <a:r>
@@ -10283,7 +10285,10 @@
               <a:rPr lang="de-CH" dirty="0" err="1"/>
               <a:t>Metrics</a:t>
             </a:r>
-            <a:endParaRPr lang="de-CH" dirty="0"/>
+            <a:r>
+              <a:rPr lang="de-CH" dirty="0"/>
+              <a:t>	</a:t>
+            </a:r>
           </a:p>
           <a:p>
             <a:pPr lvl="1"/>
@@ -10293,7 +10298,7 @@
             </a:r>
             <a:r>
               <a:rPr lang="de-CH" dirty="0"/>
-              <a:t> –&gt; Kommunikation, Protokoll</a:t>
+              <a:t> -&gt; Kommunikation, Protokoll	</a:t>
             </a:r>
           </a:p>
           <a:p>
@@ -10304,7 +10309,78 @@
             </a:r>
             <a:r>
               <a:rPr lang="de-CH" dirty="0" err="1"/>
-              <a:t>with</a:t>
+              <a:t>With</a:t>
+            </a:r>
+            <a:r>
+              <a:rPr lang="de-CH" dirty="0"/>
+              <a:t> Me -&gt; Pair </a:t>
+            </a:r>
+            <a:r>
+              <a:rPr lang="de-CH" dirty="0" err="1"/>
+              <a:t>Programming</a:t>
+            </a:r>
+            <a:r>
+              <a:rPr lang="de-CH" dirty="0"/>
+              <a:t>	</a:t>
+            </a:r>
+          </a:p>
+          <a:p>
+            <a:pPr lvl="1"/>
+            <a:r>
+              <a:rPr lang="de-CH" dirty="0" err="1"/>
+              <a:t>DrawIO</a:t>
+            </a:r>
+            <a:r>
+              <a:rPr lang="de-CH" dirty="0"/>
+              <a:t> -&gt; Visualisierung von Systemen	</a:t>
+            </a:r>
+          </a:p>
+          <a:p>
+            <a:pPr lvl="1"/>
+            <a:r>
+              <a:rPr lang="de-CH" dirty="0" err="1"/>
+              <a:t>Jacoco</a:t>
+            </a:r>
+            <a:r>
+              <a:rPr lang="de-CH" dirty="0"/>
+              <a:t> -&gt; berechnet einige </a:t>
+            </a:r>
+            <a:r>
+              <a:rPr lang="de-CH" dirty="0" err="1"/>
+              <a:t>Metrics</a:t>
+            </a:r>
+            <a:endParaRPr lang="de-CH" dirty="0"/>
+          </a:p>
+          <a:p>
+            <a:r>
+              <a:rPr lang="de-CH" dirty="0" err="1"/>
+              <a:t>Processes</a:t>
+            </a:r>
+            <a:r>
+              <a:rPr lang="de-CH" dirty="0"/>
+              <a:t>:</a:t>
+            </a:r>
+          </a:p>
+          <a:p>
+            <a:pPr lvl="1"/>
+            <a:r>
+              <a:rPr lang="de-CH" dirty="0" err="1"/>
+              <a:t>Abstraktation</a:t>
+            </a:r>
+            <a:r>
+              <a:rPr lang="de-CH" dirty="0"/>
+              <a:t> -&gt; Modular und generisches System	</a:t>
+            </a:r>
+          </a:p>
+          <a:p>
+            <a:pPr lvl="1"/>
+            <a:r>
+              <a:rPr lang="de-CH" dirty="0"/>
+              <a:t>Model </a:t>
+            </a:r>
+            <a:r>
+              <a:rPr lang="de-CH" dirty="0" err="1"/>
+              <a:t>view</a:t>
             </a:r>
             <a:r>
               <a:rPr lang="de-CH" dirty="0"/>
@@ -10312,61 +10388,86 @@
             </a:r>
             <a:r>
               <a:rPr lang="de-CH" dirty="0" err="1"/>
-              <a:t>me</a:t>
+              <a:t>client</a:t>
             </a:r>
             <a:r>
               <a:rPr lang="de-CH" dirty="0"/>
-              <a:t> -&gt; Pair </a:t>
+              <a:t> Architektur -&gt; </a:t>
             </a:r>
             <a:r>
               <a:rPr lang="de-CH" dirty="0" err="1"/>
-              <a:t>programming</a:t>
+              <a:t>Gui</a:t>
+            </a:r>
+            <a:r>
+              <a:rPr lang="de-CH" dirty="0"/>
+              <a:t> Konstruieren	</a:t>
+            </a:r>
+          </a:p>
+          <a:p>
+            <a:pPr lvl="1"/>
+            <a:r>
+              <a:rPr lang="de-CH" dirty="0" err="1"/>
+              <a:t>Spezifisierung</a:t>
+            </a:r>
+            <a:r>
+              <a:rPr lang="de-CH" dirty="0"/>
+              <a:t> -&gt; verschiedene Klassen mit speziellen Funktionen</a:t>
+            </a:r>
+          </a:p>
+          <a:p>
+            <a:r>
+              <a:rPr lang="de-CH" dirty="0"/>
+              <a:t>Libraries:</a:t>
+            </a:r>
+          </a:p>
+          <a:p>
+            <a:pPr lvl="1"/>
+            <a:r>
+              <a:rPr lang="de-CH" dirty="0"/>
+              <a:t>JavaFX -&gt; User Interface	</a:t>
+            </a:r>
+          </a:p>
+          <a:p>
+            <a:pPr lvl="1"/>
+            <a:r>
+              <a:rPr lang="de-CH" dirty="0" err="1"/>
+              <a:t>JUnit</a:t>
+            </a:r>
+            <a:r>
+              <a:rPr lang="de-CH" dirty="0"/>
+              <a:t> -&gt; testen	</a:t>
+            </a:r>
+          </a:p>
+          <a:p>
+            <a:pPr lvl="1"/>
+            <a:r>
+              <a:rPr lang="de-CH" dirty="0" err="1"/>
+              <a:t>Mockit</a:t>
+            </a:r>
+            <a:r>
+              <a:rPr lang="de-CH" dirty="0"/>
+              <a:t> -&gt; Erweiterung fürs testen	</a:t>
+            </a:r>
+          </a:p>
+          <a:p>
+            <a:pPr lvl="1"/>
+            <a:r>
+              <a:rPr lang="de-CH" dirty="0"/>
+              <a:t>Log4J -&gt; </a:t>
+            </a:r>
+            <a:r>
+              <a:rPr lang="de-CH" dirty="0" err="1"/>
+              <a:t>Logging</a:t>
+            </a:r>
+            <a:r>
+              <a:rPr lang="de-CH" dirty="0"/>
+              <a:t> und </a:t>
+            </a:r>
+            <a:r>
+              <a:rPr lang="de-CH" dirty="0" err="1"/>
+              <a:t>Fehlersuches</a:t>
             </a:r>
             <a:endParaRPr lang="de-CH" dirty="0"/>
-          </a:p>
-          <a:p>
-            <a:r>
-              <a:rPr lang="de-CH" dirty="0" err="1"/>
-              <a:t>Processes</a:t>
-            </a:r>
-            <a:r>
-              <a:rPr lang="de-CH" dirty="0"/>
-              <a:t>:</a:t>
-            </a:r>
-          </a:p>
-          <a:p>
-            <a:pPr lvl="1"/>
-            <a:r>
-              <a:rPr lang="de-CH" dirty="0"/>
-              <a:t>Abstrakte Klassen -&gt; Modulares System</a:t>
-            </a:r>
-          </a:p>
-          <a:p>
-            <a:pPr lvl="1"/>
-            <a:r>
-              <a:rPr lang="de-CH" dirty="0"/>
-              <a:t>Model </a:t>
-            </a:r>
-            <a:r>
-              <a:rPr lang="de-CH" dirty="0" err="1"/>
-              <a:t>view</a:t>
-            </a:r>
-            <a:r>
-              <a:rPr lang="de-CH" dirty="0"/>
-              <a:t> </a:t>
-            </a:r>
-            <a:r>
-              <a:rPr lang="de-CH" dirty="0" err="1"/>
-              <a:t>client</a:t>
-            </a:r>
-            <a:r>
-              <a:rPr lang="de-CH" dirty="0"/>
-              <a:t> Architektur -&gt; GUI konstruieren. </a:t>
-            </a:r>
-            <a:endParaRPr lang="en-GB" dirty="0"/>
-          </a:p>
-          <a:p>
-            <a:endParaRPr lang="en-GB" dirty="0"/>
           </a:p>
         </p:txBody>
       </p:sp>

</xml_diff>